<commit_message>
Analysis of pther instruments and VIXM predictor advance
</commit_message>
<xml_diff>
--- a/Adaboost_ML_Model.pptx
+++ b/Adaboost_ML_Model.pptx
@@ -11,6 +11,11 @@
     <p:sldId id="258" r:id="rId5"/>
     <p:sldId id="259" r:id="rId6"/>
     <p:sldId id="261" r:id="rId7"/>
+    <p:sldId id="265" r:id="rId8"/>
+    <p:sldId id="266" r:id="rId9"/>
+    <p:sldId id="267" r:id="rId10"/>
+    <p:sldId id="263" r:id="rId11"/>
+    <p:sldId id="264" r:id="rId12"/>
   </p:sldIdLst>
   <p:sldSz cx="12192000" cy="6858000"/>
   <p:notesSz cx="6858000" cy="9144000"/>
@@ -264,7 +269,7 @@
           <a:p>
             <a:fld id="{BBFFCB5F-4F0A-CB44-880D-39F70B426E1D}" type="datetimeFigureOut">
               <a:rPr lang="en-US" smtClean="0"/>
-              <a:t>11/19/21</a:t>
+              <a:t>11/21/21</a:t>
             </a:fld>
             <a:endParaRPr lang="en-US"/>
           </a:p>
@@ -462,7 +467,7 @@
           <a:p>
             <a:fld id="{BBFFCB5F-4F0A-CB44-880D-39F70B426E1D}" type="datetimeFigureOut">
               <a:rPr lang="en-US" smtClean="0"/>
-              <a:t>11/19/21</a:t>
+              <a:t>11/21/21</a:t>
             </a:fld>
             <a:endParaRPr lang="en-US"/>
           </a:p>
@@ -670,7 +675,7 @@
           <a:p>
             <a:fld id="{BBFFCB5F-4F0A-CB44-880D-39F70B426E1D}" type="datetimeFigureOut">
               <a:rPr lang="en-US" smtClean="0"/>
-              <a:t>11/19/21</a:t>
+              <a:t>11/21/21</a:t>
             </a:fld>
             <a:endParaRPr lang="en-US"/>
           </a:p>
@@ -868,7 +873,7 @@
           <a:p>
             <a:fld id="{BBFFCB5F-4F0A-CB44-880D-39F70B426E1D}" type="datetimeFigureOut">
               <a:rPr lang="en-US" smtClean="0"/>
-              <a:t>11/19/21</a:t>
+              <a:t>11/21/21</a:t>
             </a:fld>
             <a:endParaRPr lang="en-US"/>
           </a:p>
@@ -1143,7 +1148,7 @@
           <a:p>
             <a:fld id="{BBFFCB5F-4F0A-CB44-880D-39F70B426E1D}" type="datetimeFigureOut">
               <a:rPr lang="en-US" smtClean="0"/>
-              <a:t>11/19/21</a:t>
+              <a:t>11/21/21</a:t>
             </a:fld>
             <a:endParaRPr lang="en-US"/>
           </a:p>
@@ -1408,7 +1413,7 @@
           <a:p>
             <a:fld id="{BBFFCB5F-4F0A-CB44-880D-39F70B426E1D}" type="datetimeFigureOut">
               <a:rPr lang="en-US" smtClean="0"/>
-              <a:t>11/19/21</a:t>
+              <a:t>11/21/21</a:t>
             </a:fld>
             <a:endParaRPr lang="en-US"/>
           </a:p>
@@ -1820,7 +1825,7 @@
           <a:p>
             <a:fld id="{BBFFCB5F-4F0A-CB44-880D-39F70B426E1D}" type="datetimeFigureOut">
               <a:rPr lang="en-US" smtClean="0"/>
-              <a:t>11/19/21</a:t>
+              <a:t>11/21/21</a:t>
             </a:fld>
             <a:endParaRPr lang="en-US"/>
           </a:p>
@@ -1961,7 +1966,7 @@
           <a:p>
             <a:fld id="{BBFFCB5F-4F0A-CB44-880D-39F70B426E1D}" type="datetimeFigureOut">
               <a:rPr lang="en-US" smtClean="0"/>
-              <a:t>11/19/21</a:t>
+              <a:t>11/21/21</a:t>
             </a:fld>
             <a:endParaRPr lang="en-US"/>
           </a:p>
@@ -2074,7 +2079,7 @@
           <a:p>
             <a:fld id="{BBFFCB5F-4F0A-CB44-880D-39F70B426E1D}" type="datetimeFigureOut">
               <a:rPr lang="en-US" smtClean="0"/>
-              <a:t>11/19/21</a:t>
+              <a:t>11/21/21</a:t>
             </a:fld>
             <a:endParaRPr lang="en-US"/>
           </a:p>
@@ -2385,7 +2390,7 @@
           <a:p>
             <a:fld id="{BBFFCB5F-4F0A-CB44-880D-39F70B426E1D}" type="datetimeFigureOut">
               <a:rPr lang="en-US" smtClean="0"/>
-              <a:t>11/19/21</a:t>
+              <a:t>11/21/21</a:t>
             </a:fld>
             <a:endParaRPr lang="en-US"/>
           </a:p>
@@ -2673,7 +2678,7 @@
           <a:p>
             <a:fld id="{BBFFCB5F-4F0A-CB44-880D-39F70B426E1D}" type="datetimeFigureOut">
               <a:rPr lang="en-US" smtClean="0"/>
-              <a:t>11/19/21</a:t>
+              <a:t>11/21/21</a:t>
             </a:fld>
             <a:endParaRPr lang="en-US"/>
           </a:p>
@@ -2914,7 +2919,7 @@
           <a:p>
             <a:fld id="{BBFFCB5F-4F0A-CB44-880D-39F70B426E1D}" type="datetimeFigureOut">
               <a:rPr lang="en-US" smtClean="0"/>
-              <a:t>11/19/21</a:t>
+              <a:t>11/21/21</a:t>
             </a:fld>
             <a:endParaRPr lang="en-US"/>
           </a:p>
@@ -3409,6 +3414,226 @@
 </p:sld>
 </file>
 
+<file path=ppt/slides/slide10.xml><?xml version="1.0" encoding="utf-8"?>
+<p:sld xmlns:a="http://schemas.openxmlformats.org/drawingml/2006/main" xmlns:r="http://schemas.openxmlformats.org/officeDocument/2006/relationships" xmlns:p="http://schemas.openxmlformats.org/presentationml/2006/main">
+  <p:cSld>
+    <p:spTree>
+      <p:nvGrpSpPr>
+        <p:cNvPr id="1" name=""/>
+        <p:cNvGrpSpPr/>
+        <p:nvPr/>
+      </p:nvGrpSpPr>
+      <p:grpSpPr>
+        <a:xfrm>
+          <a:off x="0" y="0"/>
+          <a:ext cx="0" cy="0"/>
+          <a:chOff x="0" y="0"/>
+          <a:chExt cx="0" cy="0"/>
+        </a:xfrm>
+      </p:grpSpPr>
+      <p:pic>
+        <p:nvPicPr>
+          <p:cNvPr id="5" name="Picture 4">
+            <a:extLst>
+              <a:ext uri="{FF2B5EF4-FFF2-40B4-BE49-F238E27FC236}">
+                <a16:creationId xmlns:a16="http://schemas.microsoft.com/office/drawing/2014/main" id="{0DED4CFD-DE15-B64E-8D68-F55C6732DD03}"/>
+              </a:ext>
+            </a:extLst>
+          </p:cNvPr>
+          <p:cNvPicPr>
+            <a:picLocks noChangeAspect="1"/>
+          </p:cNvPicPr>
+          <p:nvPr/>
+        </p:nvPicPr>
+        <p:blipFill>
+          <a:blip r:embed="rId2"/>
+          <a:stretch>
+            <a:fillRect/>
+          </a:stretch>
+        </p:blipFill>
+        <p:spPr>
+          <a:xfrm>
+            <a:off x="130969" y="0"/>
+            <a:ext cx="4564062" cy="3806428"/>
+          </a:xfrm>
+          <a:prstGeom prst="rect">
+            <a:avLst/>
+          </a:prstGeom>
+        </p:spPr>
+      </p:pic>
+      <p:sp>
+        <p:nvSpPr>
+          <p:cNvPr id="6" name="TextBox 5">
+            <a:extLst>
+              <a:ext uri="{FF2B5EF4-FFF2-40B4-BE49-F238E27FC236}">
+                <a16:creationId xmlns:a16="http://schemas.microsoft.com/office/drawing/2014/main" id="{587C4911-A0A9-E047-BB4E-6CE72CEA7E02}"/>
+              </a:ext>
+            </a:extLst>
+          </p:cNvPr>
+          <p:cNvSpPr txBox="1"/>
+          <p:nvPr/>
+        </p:nvSpPr>
+        <p:spPr>
+          <a:xfrm>
+            <a:off x="7715250" y="1414463"/>
+            <a:ext cx="3143250" cy="1200329"/>
+          </a:xfrm>
+          <a:prstGeom prst="rect">
+            <a:avLst/>
+          </a:prstGeom>
+          <a:noFill/>
+        </p:spPr>
+        <p:txBody>
+          <a:bodyPr wrap="square" rtlCol="0">
+            <a:spAutoFit/>
+          </a:bodyPr>
+          <a:lstStyle/>
+          <a:p>
+            <a:r>
+              <a:rPr lang="en-US" dirty="0"/>
+              <a:t>Possible to have this plots as transparent, or black background for the presentation?</a:t>
+            </a:r>
+          </a:p>
+        </p:txBody>
+      </p:sp>
+      <p:pic>
+        <p:nvPicPr>
+          <p:cNvPr id="7" name="Picture 6">
+            <a:extLst>
+              <a:ext uri="{FF2B5EF4-FFF2-40B4-BE49-F238E27FC236}">
+                <a16:creationId xmlns:a16="http://schemas.microsoft.com/office/drawing/2014/main" id="{51713B82-D96E-8040-9D52-116826551091}"/>
+              </a:ext>
+            </a:extLst>
+          </p:cNvPr>
+          <p:cNvPicPr>
+            <a:picLocks noChangeAspect="1"/>
+          </p:cNvPicPr>
+          <p:nvPr/>
+        </p:nvPicPr>
+        <p:blipFill>
+          <a:blip r:embed="rId3"/>
+          <a:stretch>
+            <a:fillRect/>
+          </a:stretch>
+        </p:blipFill>
+        <p:spPr>
+          <a:xfrm>
+            <a:off x="912813" y="4023883"/>
+            <a:ext cx="9779000" cy="2641600"/>
+          </a:xfrm>
+          <a:prstGeom prst="rect">
+            <a:avLst/>
+          </a:prstGeom>
+        </p:spPr>
+      </p:pic>
+    </p:spTree>
+    <p:extLst>
+      <p:ext uri="{BB962C8B-B14F-4D97-AF65-F5344CB8AC3E}">
+        <p14:creationId xmlns:p14="http://schemas.microsoft.com/office/powerpoint/2010/main" val="1043689192"/>
+      </p:ext>
+    </p:extLst>
+  </p:cSld>
+  <p:clrMapOvr>
+    <a:masterClrMapping/>
+  </p:clrMapOvr>
+</p:sld>
+</file>
+
+<file path=ppt/slides/slide11.xml><?xml version="1.0" encoding="utf-8"?>
+<p:sld xmlns:a="http://schemas.openxmlformats.org/drawingml/2006/main" xmlns:r="http://schemas.openxmlformats.org/officeDocument/2006/relationships" xmlns:p="http://schemas.openxmlformats.org/presentationml/2006/main">
+  <p:cSld>
+    <p:spTree>
+      <p:nvGrpSpPr>
+        <p:cNvPr id="1" name=""/>
+        <p:cNvGrpSpPr/>
+        <p:nvPr/>
+      </p:nvGrpSpPr>
+      <p:grpSpPr>
+        <a:xfrm>
+          <a:off x="0" y="0"/>
+          <a:ext cx="0" cy="0"/>
+          <a:chOff x="0" y="0"/>
+          <a:chExt cx="0" cy="0"/>
+        </a:xfrm>
+      </p:grpSpPr>
+      <p:sp>
+        <p:nvSpPr>
+          <p:cNvPr id="6" name="TextBox 5">
+            <a:extLst>
+              <a:ext uri="{FF2B5EF4-FFF2-40B4-BE49-F238E27FC236}">
+                <a16:creationId xmlns:a16="http://schemas.microsoft.com/office/drawing/2014/main" id="{DA0C425D-7653-DC42-B344-566D787C3EAA}"/>
+              </a:ext>
+            </a:extLst>
+          </p:cNvPr>
+          <p:cNvSpPr txBox="1"/>
+          <p:nvPr/>
+        </p:nvSpPr>
+        <p:spPr>
+          <a:xfrm>
+            <a:off x="2728913" y="4514850"/>
+            <a:ext cx="5943600" cy="369332"/>
+          </a:xfrm>
+          <a:prstGeom prst="rect">
+            <a:avLst/>
+          </a:prstGeom>
+          <a:noFill/>
+        </p:spPr>
+        <p:txBody>
+          <a:bodyPr wrap="square" rtlCol="0">
+            <a:spAutoFit/>
+          </a:bodyPr>
+          <a:lstStyle/>
+          <a:p>
+            <a:r>
+              <a:rPr lang="en-US" dirty="0"/>
+              <a:t>How to add the values on the key points permanently</a:t>
+            </a:r>
+          </a:p>
+        </p:txBody>
+      </p:sp>
+      <p:pic>
+        <p:nvPicPr>
+          <p:cNvPr id="7" name="Picture 6">
+            <a:extLst>
+              <a:ext uri="{FF2B5EF4-FFF2-40B4-BE49-F238E27FC236}">
+                <a16:creationId xmlns:a16="http://schemas.microsoft.com/office/drawing/2014/main" id="{9F9452FE-06E4-D44B-9DFA-705221BEEFEB}"/>
+              </a:ext>
+            </a:extLst>
+          </p:cNvPr>
+          <p:cNvPicPr>
+            <a:picLocks noChangeAspect="1"/>
+          </p:cNvPicPr>
+          <p:nvPr/>
+        </p:nvPicPr>
+        <p:blipFill>
+          <a:blip r:embed="rId2"/>
+          <a:stretch>
+            <a:fillRect/>
+          </a:stretch>
+        </p:blipFill>
+        <p:spPr>
+          <a:xfrm>
+            <a:off x="1541463" y="609600"/>
+            <a:ext cx="8318500" cy="3467100"/>
+          </a:xfrm>
+          <a:prstGeom prst="rect">
+            <a:avLst/>
+          </a:prstGeom>
+        </p:spPr>
+      </p:pic>
+    </p:spTree>
+    <p:extLst>
+      <p:ext uri="{BB962C8B-B14F-4D97-AF65-F5344CB8AC3E}">
+        <p14:creationId xmlns:p14="http://schemas.microsoft.com/office/powerpoint/2010/main" val="4257812291"/>
+      </p:ext>
+    </p:extLst>
+  </p:cSld>
+  <p:clrMapOvr>
+    <a:masterClrMapping/>
+  </p:clrMapOvr>
+</p:sld>
+</file>
+
 <file path=ppt/slides/slide2.xml><?xml version="1.0" encoding="utf-8"?>
 <p:sld xmlns:a="http://schemas.openxmlformats.org/drawingml/2006/main" xmlns:r="http://schemas.openxmlformats.org/officeDocument/2006/relationships" xmlns:p="http://schemas.openxmlformats.org/presentationml/2006/main">
   <p:cSld>
@@ -3898,6 +4123,13 @@
             <a:r>
               <a:rPr lang="en-US" dirty="0"/>
               <a:t>VIX close, volatility, volume</a:t>
+            </a:r>
+          </a:p>
+          <a:p>
+            <a:pPr algn="ctr"/>
+            <a:r>
+              <a:rPr lang="en-US" dirty="0"/>
+              <a:t>(DONE)</a:t>
             </a:r>
           </a:p>
         </p:txBody>
@@ -4674,10 +4906,1450 @@
           </a:prstGeom>
         </p:spPr>
       </p:pic>
+      <p:sp>
+        <p:nvSpPr>
+          <p:cNvPr id="2" name="TextBox 1">
+            <a:extLst>
+              <a:ext uri="{FF2B5EF4-FFF2-40B4-BE49-F238E27FC236}">
+                <a16:creationId xmlns:a16="http://schemas.microsoft.com/office/drawing/2014/main" id="{54D0AF56-E731-294F-A3DF-EC8EAAE81888}"/>
+              </a:ext>
+            </a:extLst>
+          </p:cNvPr>
+          <p:cNvSpPr txBox="1"/>
+          <p:nvPr/>
+        </p:nvSpPr>
+        <p:spPr>
+          <a:xfrm>
+            <a:off x="195200" y="6178074"/>
+            <a:ext cx="6086521" cy="646331"/>
+          </a:xfrm>
+          <a:prstGeom prst="rect">
+            <a:avLst/>
+          </a:prstGeom>
+          <a:noFill/>
+        </p:spPr>
+        <p:txBody>
+          <a:bodyPr wrap="square" rtlCol="0">
+            <a:spAutoFit/>
+          </a:bodyPr>
+          <a:lstStyle/>
+          <a:p>
+            <a:r>
+              <a:rPr lang="en-US" dirty="0"/>
+              <a:t>Sometimes Tue/Wed appear as key variables in tunning, but not always</a:t>
+            </a:r>
+          </a:p>
+        </p:txBody>
+      </p:sp>
     </p:spTree>
     <p:extLst>
       <p:ext uri="{BB962C8B-B14F-4D97-AF65-F5344CB8AC3E}">
         <p14:creationId xmlns:p14="http://schemas.microsoft.com/office/powerpoint/2010/main" val="4049607312"/>
+      </p:ext>
+    </p:extLst>
+  </p:cSld>
+  <p:clrMapOvr>
+    <a:masterClrMapping/>
+  </p:clrMapOvr>
+</p:sld>
+</file>
+
+<file path=ppt/slides/slide7.xml><?xml version="1.0" encoding="utf-8"?>
+<p:sld xmlns:a="http://schemas.openxmlformats.org/drawingml/2006/main" xmlns:r="http://schemas.openxmlformats.org/officeDocument/2006/relationships" xmlns:p="http://schemas.openxmlformats.org/presentationml/2006/main">
+  <p:cSld>
+    <p:spTree>
+      <p:nvGrpSpPr>
+        <p:cNvPr id="1" name=""/>
+        <p:cNvGrpSpPr/>
+        <p:nvPr/>
+      </p:nvGrpSpPr>
+      <p:grpSpPr>
+        <a:xfrm>
+          <a:off x="0" y="0"/>
+          <a:ext cx="0" cy="0"/>
+          <a:chOff x="0" y="0"/>
+          <a:chExt cx="0" cy="0"/>
+        </a:xfrm>
+      </p:grpSpPr>
+      <p:sp>
+        <p:nvSpPr>
+          <p:cNvPr id="2" name="Title 1">
+            <a:extLst>
+              <a:ext uri="{FF2B5EF4-FFF2-40B4-BE49-F238E27FC236}">
+                <a16:creationId xmlns:a16="http://schemas.microsoft.com/office/drawing/2014/main" id="{C4FBB35E-6040-CC47-BF4D-E361C970C2A4}"/>
+              </a:ext>
+            </a:extLst>
+          </p:cNvPr>
+          <p:cNvSpPr>
+            <a:spLocks noGrp="1"/>
+          </p:cNvSpPr>
+          <p:nvPr>
+            <p:ph type="title"/>
+          </p:nvPr>
+        </p:nvSpPr>
+        <p:spPr>
+          <a:xfrm>
+            <a:off x="358344" y="133239"/>
+            <a:ext cx="10515600" cy="1325563"/>
+          </a:xfrm>
+        </p:spPr>
+        <p:txBody>
+          <a:bodyPr/>
+          <a:lstStyle/>
+          <a:p>
+            <a:r>
+              <a:rPr lang="en-US" dirty="0"/>
+              <a:t>Missing items: 1) Predictive Function</a:t>
+            </a:r>
+          </a:p>
+        </p:txBody>
+      </p:sp>
+      <p:sp>
+        <p:nvSpPr>
+          <p:cNvPr id="5" name="Rectangle 4">
+            <a:extLst>
+              <a:ext uri="{FF2B5EF4-FFF2-40B4-BE49-F238E27FC236}">
+                <a16:creationId xmlns:a16="http://schemas.microsoft.com/office/drawing/2014/main" id="{99C7405A-BCFA-8248-A908-1679E7593155}"/>
+              </a:ext>
+            </a:extLst>
+          </p:cNvPr>
+          <p:cNvSpPr/>
+          <p:nvPr/>
+        </p:nvSpPr>
+        <p:spPr>
+          <a:xfrm>
+            <a:off x="3212757" y="1977081"/>
+            <a:ext cx="3101546" cy="3237464"/>
+          </a:xfrm>
+          <a:prstGeom prst="rect">
+            <a:avLst/>
+          </a:prstGeom>
+        </p:spPr>
+        <p:style>
+          <a:lnRef idx="2">
+            <a:schemeClr val="accent1">
+              <a:shade val="50000"/>
+            </a:schemeClr>
+          </a:lnRef>
+          <a:fillRef idx="1">
+            <a:schemeClr val="accent1"/>
+          </a:fillRef>
+          <a:effectRef idx="0">
+            <a:schemeClr val="accent1"/>
+          </a:effectRef>
+          <a:fontRef idx="minor">
+            <a:schemeClr val="lt1"/>
+          </a:fontRef>
+        </p:style>
+        <p:txBody>
+          <a:bodyPr rtlCol="0" anchor="ctr"/>
+          <a:lstStyle/>
+          <a:p>
+            <a:pPr algn="ctr"/>
+            <a:r>
+              <a:rPr lang="en-US" sz="2800" b="1" dirty="0"/>
+              <a:t>Prediction Function</a:t>
+            </a:r>
+          </a:p>
+          <a:p>
+            <a:pPr algn="ctr"/>
+            <a:r>
+              <a:rPr lang="en-US" dirty="0"/>
+              <a:t>Close prices</a:t>
+            </a:r>
+          </a:p>
+          <a:p>
+            <a:pPr algn="ctr"/>
+            <a:r>
+              <a:rPr lang="en-US" dirty="0"/>
+              <a:t>Volume</a:t>
+            </a:r>
+          </a:p>
+          <a:p>
+            <a:pPr algn="ctr"/>
+            <a:r>
+              <a:rPr lang="en-US" dirty="0"/>
+              <a:t>Squared returns</a:t>
+            </a:r>
+          </a:p>
+          <a:p>
+            <a:pPr algn="ctr"/>
+            <a:r>
+              <a:rPr lang="en-US" dirty="0"/>
+              <a:t>Returns</a:t>
+            </a:r>
+          </a:p>
+          <a:p>
+            <a:pPr algn="ctr"/>
+            <a:r>
+              <a:rPr lang="en-US" dirty="0" err="1"/>
+              <a:t>Garch</a:t>
+            </a:r>
+            <a:r>
+              <a:rPr lang="en-US" dirty="0"/>
+              <a:t> models</a:t>
+            </a:r>
+          </a:p>
+          <a:p>
+            <a:pPr algn="ctr"/>
+            <a:r>
+              <a:rPr lang="en-US" dirty="0"/>
+              <a:t>PC lagged</a:t>
+            </a:r>
+          </a:p>
+          <a:p>
+            <a:pPr algn="ctr"/>
+            <a:r>
+              <a:rPr lang="en-US" dirty="0"/>
+              <a:t>Volatilities</a:t>
+            </a:r>
+          </a:p>
+          <a:p>
+            <a:pPr algn="ctr"/>
+            <a:r>
+              <a:rPr lang="en-US" dirty="0"/>
+              <a:t>More</a:t>
+            </a:r>
+          </a:p>
+          <a:p>
+            <a:pPr algn="ctr"/>
+            <a:endParaRPr lang="en-US" dirty="0"/>
+          </a:p>
+        </p:txBody>
+      </p:sp>
+      <p:cxnSp>
+        <p:nvCxnSpPr>
+          <p:cNvPr id="7" name="Straight Arrow Connector 6">
+            <a:extLst>
+              <a:ext uri="{FF2B5EF4-FFF2-40B4-BE49-F238E27FC236}">
+                <a16:creationId xmlns:a16="http://schemas.microsoft.com/office/drawing/2014/main" id="{70E28E0D-06C0-504A-A999-DC9C4636F741}"/>
+              </a:ext>
+            </a:extLst>
+          </p:cNvPr>
+          <p:cNvCxnSpPr/>
+          <p:nvPr/>
+        </p:nvCxnSpPr>
+        <p:spPr>
+          <a:xfrm>
+            <a:off x="2001795" y="2514601"/>
+            <a:ext cx="1124464" cy="0"/>
+          </a:xfrm>
+          <a:prstGeom prst="straightConnector1">
+            <a:avLst/>
+          </a:prstGeom>
+          <a:ln>
+            <a:tailEnd type="triangle"/>
+          </a:ln>
+        </p:spPr>
+        <p:style>
+          <a:lnRef idx="1">
+            <a:schemeClr val="accent1"/>
+          </a:lnRef>
+          <a:fillRef idx="0">
+            <a:schemeClr val="accent1"/>
+          </a:fillRef>
+          <a:effectRef idx="0">
+            <a:schemeClr val="accent1"/>
+          </a:effectRef>
+          <a:fontRef idx="minor">
+            <a:schemeClr val="tx1"/>
+          </a:fontRef>
+        </p:style>
+      </p:cxnSp>
+      <p:cxnSp>
+        <p:nvCxnSpPr>
+          <p:cNvPr id="8" name="Straight Arrow Connector 7">
+            <a:extLst>
+              <a:ext uri="{FF2B5EF4-FFF2-40B4-BE49-F238E27FC236}">
+                <a16:creationId xmlns:a16="http://schemas.microsoft.com/office/drawing/2014/main" id="{089B0013-24AE-E84B-8CAE-0270D396AB88}"/>
+              </a:ext>
+            </a:extLst>
+          </p:cNvPr>
+          <p:cNvCxnSpPr/>
+          <p:nvPr/>
+        </p:nvCxnSpPr>
+        <p:spPr>
+          <a:xfrm>
+            <a:off x="6314303" y="2520780"/>
+            <a:ext cx="1124464" cy="0"/>
+          </a:xfrm>
+          <a:prstGeom prst="straightConnector1">
+            <a:avLst/>
+          </a:prstGeom>
+          <a:ln>
+            <a:tailEnd type="triangle"/>
+          </a:ln>
+        </p:spPr>
+        <p:style>
+          <a:lnRef idx="1">
+            <a:schemeClr val="accent1"/>
+          </a:lnRef>
+          <a:fillRef idx="0">
+            <a:schemeClr val="accent1"/>
+          </a:fillRef>
+          <a:effectRef idx="0">
+            <a:schemeClr val="accent1"/>
+          </a:effectRef>
+          <a:fontRef idx="minor">
+            <a:schemeClr val="tx1"/>
+          </a:fontRef>
+        </p:style>
+      </p:cxnSp>
+      <p:sp>
+        <p:nvSpPr>
+          <p:cNvPr id="9" name="TextBox 8">
+            <a:extLst>
+              <a:ext uri="{FF2B5EF4-FFF2-40B4-BE49-F238E27FC236}">
+                <a16:creationId xmlns:a16="http://schemas.microsoft.com/office/drawing/2014/main" id="{E5634BAA-A335-2142-87FC-0B3C6843D8FE}"/>
+              </a:ext>
+            </a:extLst>
+          </p:cNvPr>
+          <p:cNvSpPr txBox="1"/>
+          <p:nvPr/>
+        </p:nvSpPr>
+        <p:spPr>
+          <a:xfrm>
+            <a:off x="358346" y="2145269"/>
+            <a:ext cx="1643449" cy="369332"/>
+          </a:xfrm>
+          <a:prstGeom prst="rect">
+            <a:avLst/>
+          </a:prstGeom>
+          <a:noFill/>
+        </p:spPr>
+        <p:txBody>
+          <a:bodyPr wrap="square" rtlCol="0">
+            <a:spAutoFit/>
+          </a:bodyPr>
+          <a:lstStyle/>
+          <a:p>
+            <a:r>
+              <a:rPr lang="en-US" dirty="0"/>
+              <a:t>Ticker list</a:t>
+            </a:r>
+          </a:p>
+        </p:txBody>
+      </p:sp>
+      <p:sp>
+        <p:nvSpPr>
+          <p:cNvPr id="10" name="TextBox 9">
+            <a:extLst>
+              <a:ext uri="{FF2B5EF4-FFF2-40B4-BE49-F238E27FC236}">
+                <a16:creationId xmlns:a16="http://schemas.microsoft.com/office/drawing/2014/main" id="{6B6084E1-2B48-FF41-8456-897E46732414}"/>
+              </a:ext>
+            </a:extLst>
+          </p:cNvPr>
+          <p:cNvSpPr txBox="1"/>
+          <p:nvPr/>
+        </p:nvSpPr>
+        <p:spPr>
+          <a:xfrm>
+            <a:off x="358346" y="2699267"/>
+            <a:ext cx="1643449" cy="646331"/>
+          </a:xfrm>
+          <a:prstGeom prst="rect">
+            <a:avLst/>
+          </a:prstGeom>
+          <a:noFill/>
+        </p:spPr>
+        <p:txBody>
+          <a:bodyPr wrap="square" rtlCol="0">
+            <a:spAutoFit/>
+          </a:bodyPr>
+          <a:lstStyle/>
+          <a:p>
+            <a:r>
+              <a:rPr lang="en-US" dirty="0" err="1"/>
+              <a:t>Adaboost</a:t>
+            </a:r>
+            <a:r>
+              <a:rPr lang="en-US" dirty="0"/>
+              <a:t> parameters</a:t>
+            </a:r>
+          </a:p>
+        </p:txBody>
+      </p:sp>
+      <p:sp>
+        <p:nvSpPr>
+          <p:cNvPr id="11" name="TextBox 10">
+            <a:extLst>
+              <a:ext uri="{FF2B5EF4-FFF2-40B4-BE49-F238E27FC236}">
+                <a16:creationId xmlns:a16="http://schemas.microsoft.com/office/drawing/2014/main" id="{267BF45A-FF35-694F-AC63-EFC3DBD9F24F}"/>
+              </a:ext>
+            </a:extLst>
+          </p:cNvPr>
+          <p:cNvSpPr txBox="1"/>
+          <p:nvPr/>
+        </p:nvSpPr>
+        <p:spPr>
+          <a:xfrm>
+            <a:off x="7525265" y="2032001"/>
+            <a:ext cx="1643449" cy="923330"/>
+          </a:xfrm>
+          <a:prstGeom prst="rect">
+            <a:avLst/>
+          </a:prstGeom>
+          <a:noFill/>
+        </p:spPr>
+        <p:txBody>
+          <a:bodyPr wrap="square" rtlCol="0">
+            <a:spAutoFit/>
+          </a:bodyPr>
+          <a:lstStyle/>
+          <a:p>
+            <a:r>
+              <a:rPr lang="en-US" dirty="0"/>
+              <a:t>Predictions (</a:t>
+            </a:r>
+            <a:r>
+              <a:rPr lang="en-US" dirty="0" err="1"/>
+              <a:t>y_hat</a:t>
+            </a:r>
+            <a:r>
+              <a:rPr lang="en-US" dirty="0"/>
+              <a:t>)</a:t>
+            </a:r>
+          </a:p>
+          <a:p>
+            <a:r>
+              <a:rPr lang="en-US" dirty="0"/>
+              <a:t>X</a:t>
+            </a:r>
+          </a:p>
+        </p:txBody>
+      </p:sp>
+      <p:sp>
+        <p:nvSpPr>
+          <p:cNvPr id="13" name="TextBox 12">
+            <a:extLst>
+              <a:ext uri="{FF2B5EF4-FFF2-40B4-BE49-F238E27FC236}">
+                <a16:creationId xmlns:a16="http://schemas.microsoft.com/office/drawing/2014/main" id="{6A84E670-2461-F340-AFF2-274DD54A79F2}"/>
+              </a:ext>
+            </a:extLst>
+          </p:cNvPr>
+          <p:cNvSpPr txBox="1"/>
+          <p:nvPr/>
+        </p:nvSpPr>
+        <p:spPr>
+          <a:xfrm>
+            <a:off x="358345" y="3697068"/>
+            <a:ext cx="1643449" cy="646331"/>
+          </a:xfrm>
+          <a:prstGeom prst="rect">
+            <a:avLst/>
+          </a:prstGeom>
+          <a:noFill/>
+        </p:spPr>
+        <p:txBody>
+          <a:bodyPr wrap="square" rtlCol="0">
+            <a:spAutoFit/>
+          </a:bodyPr>
+          <a:lstStyle/>
+          <a:p>
+            <a:r>
+              <a:rPr lang="en-US" dirty="0"/>
+              <a:t>Start date</a:t>
+            </a:r>
+          </a:p>
+          <a:p>
+            <a:r>
+              <a:rPr lang="en-US" dirty="0"/>
+              <a:t>End Date</a:t>
+            </a:r>
+          </a:p>
+        </p:txBody>
+      </p:sp>
+      <p:sp>
+        <p:nvSpPr>
+          <p:cNvPr id="14" name="TextBox 13">
+            <a:extLst>
+              <a:ext uri="{FF2B5EF4-FFF2-40B4-BE49-F238E27FC236}">
+                <a16:creationId xmlns:a16="http://schemas.microsoft.com/office/drawing/2014/main" id="{C9768AE3-0252-1749-8466-F686511CF51B}"/>
+              </a:ext>
+            </a:extLst>
+          </p:cNvPr>
+          <p:cNvSpPr txBox="1"/>
+          <p:nvPr/>
+        </p:nvSpPr>
+        <p:spPr>
+          <a:xfrm>
+            <a:off x="358344" y="4586063"/>
+            <a:ext cx="1643449" cy="923330"/>
+          </a:xfrm>
+          <a:prstGeom prst="rect">
+            <a:avLst/>
+          </a:prstGeom>
+          <a:noFill/>
+        </p:spPr>
+        <p:txBody>
+          <a:bodyPr wrap="square" rtlCol="0">
+            <a:spAutoFit/>
+          </a:bodyPr>
+          <a:lstStyle/>
+          <a:p>
+            <a:r>
+              <a:rPr lang="en-US" dirty="0"/>
+              <a:t>Months for training (for train/test split)</a:t>
+            </a:r>
+          </a:p>
+        </p:txBody>
+      </p:sp>
+    </p:spTree>
+    <p:extLst>
+      <p:ext uri="{BB962C8B-B14F-4D97-AF65-F5344CB8AC3E}">
+        <p14:creationId xmlns:p14="http://schemas.microsoft.com/office/powerpoint/2010/main" val="668658428"/>
+      </p:ext>
+    </p:extLst>
+  </p:cSld>
+  <p:clrMapOvr>
+    <a:masterClrMapping/>
+  </p:clrMapOvr>
+</p:sld>
+</file>
+
+<file path=ppt/slides/slide8.xml><?xml version="1.0" encoding="utf-8"?>
+<p:sld xmlns:a="http://schemas.openxmlformats.org/drawingml/2006/main" xmlns:r="http://schemas.openxmlformats.org/officeDocument/2006/relationships" xmlns:p="http://schemas.openxmlformats.org/presentationml/2006/main">
+  <p:cSld>
+    <p:spTree>
+      <p:nvGrpSpPr>
+        <p:cNvPr id="1" name=""/>
+        <p:cNvGrpSpPr/>
+        <p:nvPr/>
+      </p:nvGrpSpPr>
+      <p:grpSpPr>
+        <a:xfrm>
+          <a:off x="0" y="0"/>
+          <a:ext cx="0" cy="0"/>
+          <a:chOff x="0" y="0"/>
+          <a:chExt cx="0" cy="0"/>
+        </a:xfrm>
+      </p:grpSpPr>
+      <p:sp>
+        <p:nvSpPr>
+          <p:cNvPr id="5" name="Title 4">
+            <a:extLst>
+              <a:ext uri="{FF2B5EF4-FFF2-40B4-BE49-F238E27FC236}">
+                <a16:creationId xmlns:a16="http://schemas.microsoft.com/office/drawing/2014/main" id="{033B78F1-892C-1A40-B14A-E7D785E893C4}"/>
+              </a:ext>
+            </a:extLst>
+          </p:cNvPr>
+          <p:cNvSpPr>
+            <a:spLocks noGrp="1"/>
+          </p:cNvSpPr>
+          <p:nvPr>
+            <p:ph type="title"/>
+          </p:nvPr>
+        </p:nvSpPr>
+        <p:spPr/>
+        <p:txBody>
+          <a:bodyPr/>
+          <a:lstStyle/>
+          <a:p>
+            <a:r>
+              <a:rPr lang="en-US" dirty="0"/>
+              <a:t>2) Tunning function</a:t>
+            </a:r>
+          </a:p>
+        </p:txBody>
+      </p:sp>
+      <p:sp>
+        <p:nvSpPr>
+          <p:cNvPr id="10" name="Rectangle 9">
+            <a:extLst>
+              <a:ext uri="{FF2B5EF4-FFF2-40B4-BE49-F238E27FC236}">
+                <a16:creationId xmlns:a16="http://schemas.microsoft.com/office/drawing/2014/main" id="{4C23B152-D3F0-0E4C-BD20-CC625C7AECDD}"/>
+              </a:ext>
+            </a:extLst>
+          </p:cNvPr>
+          <p:cNvSpPr/>
+          <p:nvPr/>
+        </p:nvSpPr>
+        <p:spPr>
+          <a:xfrm>
+            <a:off x="3873850" y="1937781"/>
+            <a:ext cx="3101546" cy="3237464"/>
+          </a:xfrm>
+          <a:prstGeom prst="rect">
+            <a:avLst/>
+          </a:prstGeom>
+        </p:spPr>
+        <p:style>
+          <a:lnRef idx="2">
+            <a:schemeClr val="accent1">
+              <a:shade val="50000"/>
+            </a:schemeClr>
+          </a:lnRef>
+          <a:fillRef idx="1">
+            <a:schemeClr val="accent1"/>
+          </a:fillRef>
+          <a:effectRef idx="0">
+            <a:schemeClr val="accent1"/>
+          </a:effectRef>
+          <a:fontRef idx="minor">
+            <a:schemeClr val="lt1"/>
+          </a:fontRef>
+        </p:style>
+        <p:txBody>
+          <a:bodyPr rtlCol="0" anchor="ctr"/>
+          <a:lstStyle/>
+          <a:p>
+            <a:pPr algn="ctr"/>
+            <a:r>
+              <a:rPr lang="en-US" sz="2800" b="1" dirty="0"/>
+              <a:t>Tunning Function</a:t>
+            </a:r>
+          </a:p>
+          <a:p>
+            <a:pPr algn="ctr"/>
+            <a:endParaRPr lang="en-US" dirty="0"/>
+          </a:p>
+        </p:txBody>
+      </p:sp>
+      <p:cxnSp>
+        <p:nvCxnSpPr>
+          <p:cNvPr id="11" name="Straight Arrow Connector 10">
+            <a:extLst>
+              <a:ext uri="{FF2B5EF4-FFF2-40B4-BE49-F238E27FC236}">
+                <a16:creationId xmlns:a16="http://schemas.microsoft.com/office/drawing/2014/main" id="{1E1DF40A-E274-CC40-8EAA-31E73F873AF8}"/>
+              </a:ext>
+            </a:extLst>
+          </p:cNvPr>
+          <p:cNvCxnSpPr/>
+          <p:nvPr/>
+        </p:nvCxnSpPr>
+        <p:spPr>
+          <a:xfrm>
+            <a:off x="2508423" y="2613455"/>
+            <a:ext cx="1124464" cy="0"/>
+          </a:xfrm>
+          <a:prstGeom prst="straightConnector1">
+            <a:avLst/>
+          </a:prstGeom>
+          <a:ln>
+            <a:tailEnd type="triangle"/>
+          </a:ln>
+        </p:spPr>
+        <p:style>
+          <a:lnRef idx="1">
+            <a:schemeClr val="accent1"/>
+          </a:lnRef>
+          <a:fillRef idx="0">
+            <a:schemeClr val="accent1"/>
+          </a:fillRef>
+          <a:effectRef idx="0">
+            <a:schemeClr val="accent1"/>
+          </a:effectRef>
+          <a:fontRef idx="minor">
+            <a:schemeClr val="tx1"/>
+          </a:fontRef>
+        </p:style>
+      </p:cxnSp>
+      <p:cxnSp>
+        <p:nvCxnSpPr>
+          <p:cNvPr id="12" name="Straight Arrow Connector 11">
+            <a:extLst>
+              <a:ext uri="{FF2B5EF4-FFF2-40B4-BE49-F238E27FC236}">
+                <a16:creationId xmlns:a16="http://schemas.microsoft.com/office/drawing/2014/main" id="{7FE3C7AF-3AAB-C84C-AC65-9D8993A953C7}"/>
+              </a:ext>
+            </a:extLst>
+          </p:cNvPr>
+          <p:cNvCxnSpPr/>
+          <p:nvPr/>
+        </p:nvCxnSpPr>
+        <p:spPr>
+          <a:xfrm>
+            <a:off x="7216352" y="2520780"/>
+            <a:ext cx="1124464" cy="0"/>
+          </a:xfrm>
+          <a:prstGeom prst="straightConnector1">
+            <a:avLst/>
+          </a:prstGeom>
+          <a:ln>
+            <a:tailEnd type="triangle"/>
+          </a:ln>
+        </p:spPr>
+        <p:style>
+          <a:lnRef idx="1">
+            <a:schemeClr val="accent1"/>
+          </a:lnRef>
+          <a:fillRef idx="0">
+            <a:schemeClr val="accent1"/>
+          </a:fillRef>
+          <a:effectRef idx="0">
+            <a:schemeClr val="accent1"/>
+          </a:effectRef>
+          <a:fontRef idx="minor">
+            <a:schemeClr val="tx1"/>
+          </a:fontRef>
+        </p:style>
+      </p:cxnSp>
+      <p:sp>
+        <p:nvSpPr>
+          <p:cNvPr id="15" name="TextBox 14">
+            <a:extLst>
+              <a:ext uri="{FF2B5EF4-FFF2-40B4-BE49-F238E27FC236}">
+                <a16:creationId xmlns:a16="http://schemas.microsoft.com/office/drawing/2014/main" id="{D9B08230-DFF5-284C-BD8A-5602F4D7B711}"/>
+              </a:ext>
+            </a:extLst>
+          </p:cNvPr>
+          <p:cNvSpPr txBox="1"/>
+          <p:nvPr/>
+        </p:nvSpPr>
+        <p:spPr>
+          <a:xfrm>
+            <a:off x="8489095" y="2032001"/>
+            <a:ext cx="2323070" cy="2308324"/>
+          </a:xfrm>
+          <a:prstGeom prst="rect">
+            <a:avLst/>
+          </a:prstGeom>
+          <a:noFill/>
+        </p:spPr>
+        <p:txBody>
+          <a:bodyPr wrap="square" rtlCol="0">
+            <a:spAutoFit/>
+          </a:bodyPr>
+          <a:lstStyle/>
+          <a:p>
+            <a:r>
+              <a:rPr lang="en-US" dirty="0"/>
+              <a:t>Best </a:t>
+            </a:r>
+            <a:r>
+              <a:rPr lang="en-US" dirty="0" err="1"/>
+              <a:t>n_estimators</a:t>
+            </a:r>
+            <a:endParaRPr lang="en-US" dirty="0"/>
+          </a:p>
+          <a:p>
+            <a:r>
+              <a:rPr lang="en-US" dirty="0"/>
+              <a:t>Depth</a:t>
+            </a:r>
+          </a:p>
+          <a:p>
+            <a:r>
+              <a:rPr lang="en-US" dirty="0"/>
+              <a:t>Learning rate</a:t>
+            </a:r>
+          </a:p>
+          <a:p>
+            <a:endParaRPr lang="en-US" dirty="0"/>
+          </a:p>
+          <a:p>
+            <a:r>
+              <a:rPr lang="en-US" dirty="0"/>
+              <a:t>Accuracy results</a:t>
+            </a:r>
+          </a:p>
+          <a:p>
+            <a:r>
+              <a:rPr lang="en-US" dirty="0"/>
+              <a:t>Profitability</a:t>
+            </a:r>
+          </a:p>
+          <a:p>
+            <a:endParaRPr lang="en-US" dirty="0"/>
+          </a:p>
+          <a:p>
+            <a:r>
+              <a:rPr lang="en-US" dirty="0"/>
+              <a:t>Table of best results</a:t>
+            </a:r>
+          </a:p>
+        </p:txBody>
+      </p:sp>
+      <p:sp>
+        <p:nvSpPr>
+          <p:cNvPr id="26" name="TextBox 25">
+            <a:extLst>
+              <a:ext uri="{FF2B5EF4-FFF2-40B4-BE49-F238E27FC236}">
+                <a16:creationId xmlns:a16="http://schemas.microsoft.com/office/drawing/2014/main" id="{70C20D53-87CB-964B-A53D-25FFDE52D8E4}"/>
+              </a:ext>
+            </a:extLst>
+          </p:cNvPr>
+          <p:cNvSpPr txBox="1"/>
+          <p:nvPr/>
+        </p:nvSpPr>
+        <p:spPr>
+          <a:xfrm>
+            <a:off x="284206" y="1874022"/>
+            <a:ext cx="2323070" cy="646331"/>
+          </a:xfrm>
+          <a:prstGeom prst="rect">
+            <a:avLst/>
+          </a:prstGeom>
+          <a:noFill/>
+        </p:spPr>
+        <p:txBody>
+          <a:bodyPr wrap="square" rtlCol="0">
+            <a:spAutoFit/>
+          </a:bodyPr>
+          <a:lstStyle/>
+          <a:p>
+            <a:r>
+              <a:rPr lang="en-US" dirty="0" err="1"/>
+              <a:t>X_train_scaled</a:t>
+            </a:r>
+            <a:r>
+              <a:rPr lang="en-US" dirty="0"/>
+              <a:t>, </a:t>
+            </a:r>
+            <a:r>
+              <a:rPr lang="en-US" dirty="0" err="1"/>
+              <a:t>Y_train_scaled</a:t>
+            </a:r>
+            <a:endParaRPr lang="en-US" dirty="0"/>
+          </a:p>
+        </p:txBody>
+      </p:sp>
+      <p:sp>
+        <p:nvSpPr>
+          <p:cNvPr id="27" name="TextBox 26">
+            <a:extLst>
+              <a:ext uri="{FF2B5EF4-FFF2-40B4-BE49-F238E27FC236}">
+                <a16:creationId xmlns:a16="http://schemas.microsoft.com/office/drawing/2014/main" id="{BC0D9DE9-18FD-374F-B8DA-EE164B2A270A}"/>
+              </a:ext>
+            </a:extLst>
+          </p:cNvPr>
+          <p:cNvSpPr txBox="1"/>
+          <p:nvPr/>
+        </p:nvSpPr>
+        <p:spPr>
+          <a:xfrm>
+            <a:off x="284206" y="3556513"/>
+            <a:ext cx="3348681" cy="2031325"/>
+          </a:xfrm>
+          <a:prstGeom prst="rect">
+            <a:avLst/>
+          </a:prstGeom>
+          <a:noFill/>
+        </p:spPr>
+        <p:txBody>
+          <a:bodyPr wrap="square" rtlCol="0">
+            <a:spAutoFit/>
+          </a:bodyPr>
+          <a:lstStyle/>
+          <a:p>
+            <a:endParaRPr lang="en-US" dirty="0"/>
+          </a:p>
+          <a:p>
+            <a:endParaRPr lang="en-US" dirty="0"/>
+          </a:p>
+          <a:p>
+            <a:endParaRPr lang="en-US" dirty="0"/>
+          </a:p>
+          <a:p>
+            <a:r>
+              <a:rPr lang="en-US" dirty="0"/>
+              <a:t>Ranges for the tunning</a:t>
+            </a:r>
+          </a:p>
+          <a:p>
+            <a:r>
+              <a:rPr lang="en-US" dirty="0" err="1"/>
+              <a:t>N_estimators</a:t>
+            </a:r>
+            <a:r>
+              <a:rPr lang="en-US" dirty="0"/>
+              <a:t> between 1 and 50</a:t>
+            </a:r>
+          </a:p>
+          <a:p>
+            <a:r>
+              <a:rPr lang="en-US" dirty="0"/>
+              <a:t>Depth between 1 and 5</a:t>
+            </a:r>
+          </a:p>
+          <a:p>
+            <a:r>
+              <a:rPr lang="en-US" dirty="0" err="1"/>
+              <a:t>Learning_rate</a:t>
+            </a:r>
+            <a:r>
+              <a:rPr lang="en-US" dirty="0"/>
+              <a:t> between 0.1 and 2</a:t>
+            </a:r>
+          </a:p>
+        </p:txBody>
+      </p:sp>
+      <p:sp>
+        <p:nvSpPr>
+          <p:cNvPr id="28" name="Rectangle 27">
+            <a:extLst>
+              <a:ext uri="{FF2B5EF4-FFF2-40B4-BE49-F238E27FC236}">
+                <a16:creationId xmlns:a16="http://schemas.microsoft.com/office/drawing/2014/main" id="{9B022923-6CD3-4742-B6C7-CB9F755EFD94}"/>
+              </a:ext>
+            </a:extLst>
+          </p:cNvPr>
+          <p:cNvSpPr/>
+          <p:nvPr/>
+        </p:nvSpPr>
+        <p:spPr>
+          <a:xfrm>
+            <a:off x="284205" y="2955025"/>
+            <a:ext cx="3478431" cy="1200329"/>
+          </a:xfrm>
+          <a:prstGeom prst="rect">
+            <a:avLst/>
+          </a:prstGeom>
+        </p:spPr>
+        <p:txBody>
+          <a:bodyPr wrap="square">
+            <a:spAutoFit/>
+          </a:bodyPr>
+          <a:lstStyle/>
+          <a:p>
+            <a:r>
+              <a:rPr lang="en-US" dirty="0"/>
+              <a:t>Threshold for results</a:t>
+            </a:r>
+          </a:p>
+          <a:p>
+            <a:r>
+              <a:rPr lang="en-US" dirty="0" err="1"/>
+              <a:t>Ej</a:t>
+            </a:r>
+            <a:r>
+              <a:rPr lang="en-US" dirty="0"/>
+              <a:t>. Prof&gt;300%</a:t>
+            </a:r>
+          </a:p>
+          <a:p>
+            <a:r>
+              <a:rPr lang="en-US" dirty="0" err="1"/>
+              <a:t>Accuracy_score</a:t>
+            </a:r>
+            <a:r>
+              <a:rPr lang="en-US" dirty="0"/>
+              <a:t>&gt;50%</a:t>
+            </a:r>
+          </a:p>
+          <a:p>
+            <a:r>
+              <a:rPr lang="en-US" dirty="0"/>
+              <a:t>And for several measurements...</a:t>
+            </a:r>
+          </a:p>
+        </p:txBody>
+      </p:sp>
+    </p:spTree>
+    <p:extLst>
+      <p:ext uri="{BB962C8B-B14F-4D97-AF65-F5344CB8AC3E}">
+        <p14:creationId xmlns:p14="http://schemas.microsoft.com/office/powerpoint/2010/main" val="1767701103"/>
+      </p:ext>
+    </p:extLst>
+  </p:cSld>
+  <p:clrMapOvr>
+    <a:masterClrMapping/>
+  </p:clrMapOvr>
+</p:sld>
+</file>
+
+<file path=ppt/slides/slide9.xml><?xml version="1.0" encoding="utf-8"?>
+<p:sld xmlns:a="http://schemas.openxmlformats.org/drawingml/2006/main" xmlns:r="http://schemas.openxmlformats.org/officeDocument/2006/relationships" xmlns:p="http://schemas.openxmlformats.org/presentationml/2006/main">
+  <p:cSld>
+    <p:spTree>
+      <p:nvGrpSpPr>
+        <p:cNvPr id="1" name=""/>
+        <p:cNvGrpSpPr/>
+        <p:nvPr/>
+      </p:nvGrpSpPr>
+      <p:grpSpPr>
+        <a:xfrm>
+          <a:off x="0" y="0"/>
+          <a:ext cx="0" cy="0"/>
+          <a:chOff x="0" y="0"/>
+          <a:chExt cx="0" cy="0"/>
+        </a:xfrm>
+      </p:grpSpPr>
+      <p:sp>
+        <p:nvSpPr>
+          <p:cNvPr id="4" name="Rectangle 3">
+            <a:extLst>
+              <a:ext uri="{FF2B5EF4-FFF2-40B4-BE49-F238E27FC236}">
+                <a16:creationId xmlns:a16="http://schemas.microsoft.com/office/drawing/2014/main" id="{3115F3E8-BAA6-6D4E-8FB3-DD2CA133CF3A}"/>
+              </a:ext>
+            </a:extLst>
+          </p:cNvPr>
+          <p:cNvSpPr/>
+          <p:nvPr/>
+        </p:nvSpPr>
+        <p:spPr>
+          <a:xfrm>
+            <a:off x="1128713" y="1328738"/>
+            <a:ext cx="2689526" cy="2243137"/>
+          </a:xfrm>
+          <a:prstGeom prst="rect">
+            <a:avLst/>
+          </a:prstGeom>
+        </p:spPr>
+        <p:style>
+          <a:lnRef idx="2">
+            <a:schemeClr val="accent1">
+              <a:shade val="50000"/>
+            </a:schemeClr>
+          </a:lnRef>
+          <a:fillRef idx="1">
+            <a:schemeClr val="accent1"/>
+          </a:fillRef>
+          <a:effectRef idx="0">
+            <a:schemeClr val="accent1"/>
+          </a:effectRef>
+          <a:fontRef idx="minor">
+            <a:schemeClr val="lt1"/>
+          </a:fontRef>
+        </p:style>
+        <p:txBody>
+          <a:bodyPr rtlCol="0" anchor="ctr"/>
+          <a:lstStyle/>
+          <a:p>
+            <a:pPr algn="ctr"/>
+            <a:r>
+              <a:rPr lang="en-US" dirty="0" err="1"/>
+              <a:t>X_filtered</a:t>
+            </a:r>
+            <a:endParaRPr lang="en-US" dirty="0"/>
+          </a:p>
+        </p:txBody>
+      </p:sp>
+      <p:sp>
+        <p:nvSpPr>
+          <p:cNvPr id="5" name="Rectangle 4">
+            <a:extLst>
+              <a:ext uri="{FF2B5EF4-FFF2-40B4-BE49-F238E27FC236}">
+                <a16:creationId xmlns:a16="http://schemas.microsoft.com/office/drawing/2014/main" id="{B906ACDE-9E18-8648-BA83-88BC40B2C7ED}"/>
+              </a:ext>
+            </a:extLst>
+          </p:cNvPr>
+          <p:cNvSpPr/>
+          <p:nvPr/>
+        </p:nvSpPr>
+        <p:spPr>
+          <a:xfrm>
+            <a:off x="5029201" y="1328738"/>
+            <a:ext cx="1210962" cy="2243137"/>
+          </a:xfrm>
+          <a:prstGeom prst="rect">
+            <a:avLst/>
+          </a:prstGeom>
+          <a:solidFill>
+            <a:schemeClr val="accent2"/>
+          </a:solidFill>
+        </p:spPr>
+        <p:style>
+          <a:lnRef idx="2">
+            <a:schemeClr val="accent1">
+              <a:shade val="50000"/>
+            </a:schemeClr>
+          </a:lnRef>
+          <a:fillRef idx="1">
+            <a:schemeClr val="accent1"/>
+          </a:fillRef>
+          <a:effectRef idx="0">
+            <a:schemeClr val="accent1"/>
+          </a:effectRef>
+          <a:fontRef idx="minor">
+            <a:schemeClr val="lt1"/>
+          </a:fontRef>
+        </p:style>
+        <p:txBody>
+          <a:bodyPr rtlCol="0" anchor="ctr"/>
+          <a:lstStyle/>
+          <a:p>
+            <a:pPr algn="ctr"/>
+            <a:r>
+              <a:rPr lang="en-US" dirty="0"/>
+              <a:t>VIX prediction</a:t>
+            </a:r>
+          </a:p>
+        </p:txBody>
+      </p:sp>
+      <p:sp>
+        <p:nvSpPr>
+          <p:cNvPr id="6" name="Rectangle 5">
+            <a:extLst>
+              <a:ext uri="{FF2B5EF4-FFF2-40B4-BE49-F238E27FC236}">
+                <a16:creationId xmlns:a16="http://schemas.microsoft.com/office/drawing/2014/main" id="{89A52A67-229C-794B-BCB4-9E2EAEBC341D}"/>
+              </a:ext>
+            </a:extLst>
+          </p:cNvPr>
+          <p:cNvSpPr/>
+          <p:nvPr/>
+        </p:nvSpPr>
+        <p:spPr>
+          <a:xfrm>
+            <a:off x="8263462" y="1328737"/>
+            <a:ext cx="1210962" cy="2243137"/>
+          </a:xfrm>
+          <a:prstGeom prst="rect">
+            <a:avLst/>
+          </a:prstGeom>
+        </p:spPr>
+        <p:style>
+          <a:lnRef idx="2">
+            <a:schemeClr val="accent1">
+              <a:shade val="50000"/>
+            </a:schemeClr>
+          </a:lnRef>
+          <a:fillRef idx="1">
+            <a:schemeClr val="accent1"/>
+          </a:fillRef>
+          <a:effectRef idx="0">
+            <a:schemeClr val="accent1"/>
+          </a:effectRef>
+          <a:fontRef idx="minor">
+            <a:schemeClr val="lt1"/>
+          </a:fontRef>
+        </p:style>
+        <p:txBody>
+          <a:bodyPr rtlCol="0" anchor="ctr"/>
+          <a:lstStyle/>
+          <a:p>
+            <a:pPr algn="ctr"/>
+            <a:r>
+              <a:rPr lang="en-US" dirty="0"/>
+              <a:t>VIXM&gt;0</a:t>
+            </a:r>
+          </a:p>
+        </p:txBody>
+      </p:sp>
+      <p:sp>
+        <p:nvSpPr>
+          <p:cNvPr id="7" name="Left Brace 6">
+            <a:extLst>
+              <a:ext uri="{FF2B5EF4-FFF2-40B4-BE49-F238E27FC236}">
+                <a16:creationId xmlns:a16="http://schemas.microsoft.com/office/drawing/2014/main" id="{3CBE76A8-585F-3B4C-ADBC-BA981EF51621}"/>
+              </a:ext>
+            </a:extLst>
+          </p:cNvPr>
+          <p:cNvSpPr/>
+          <p:nvPr/>
+        </p:nvSpPr>
+        <p:spPr>
+          <a:xfrm rot="16200000">
+            <a:off x="3379767" y="1349780"/>
+            <a:ext cx="638303" cy="5082489"/>
+          </a:xfrm>
+          <a:prstGeom prst="leftBrace">
+            <a:avLst/>
+          </a:prstGeom>
+          <a:ln w="38100"/>
+        </p:spPr>
+        <p:style>
+          <a:lnRef idx="1">
+            <a:schemeClr val="accent2"/>
+          </a:lnRef>
+          <a:fillRef idx="0">
+            <a:schemeClr val="accent2"/>
+          </a:fillRef>
+          <a:effectRef idx="0">
+            <a:schemeClr val="accent2"/>
+          </a:effectRef>
+          <a:fontRef idx="minor">
+            <a:schemeClr val="tx1"/>
+          </a:fontRef>
+        </p:style>
+        <p:txBody>
+          <a:bodyPr rtlCol="0" anchor="ctr"/>
+          <a:lstStyle/>
+          <a:p>
+            <a:pPr algn="ctr"/>
+            <a:endParaRPr lang="en-US"/>
+          </a:p>
+        </p:txBody>
+      </p:sp>
+      <p:sp>
+        <p:nvSpPr>
+          <p:cNvPr id="8" name="TextBox 7">
+            <a:extLst>
+              <a:ext uri="{FF2B5EF4-FFF2-40B4-BE49-F238E27FC236}">
+                <a16:creationId xmlns:a16="http://schemas.microsoft.com/office/drawing/2014/main" id="{9D530900-C9A7-5849-A7F0-E3E294E6D24A}"/>
+              </a:ext>
+            </a:extLst>
+          </p:cNvPr>
+          <p:cNvSpPr txBox="1"/>
+          <p:nvPr/>
+        </p:nvSpPr>
+        <p:spPr>
+          <a:xfrm>
+            <a:off x="3534031" y="4349578"/>
+            <a:ext cx="988539" cy="584775"/>
+          </a:xfrm>
+          <a:prstGeom prst="rect">
+            <a:avLst/>
+          </a:prstGeom>
+          <a:noFill/>
+        </p:spPr>
+        <p:txBody>
+          <a:bodyPr wrap="square" rtlCol="0">
+            <a:spAutoFit/>
+          </a:bodyPr>
+          <a:lstStyle/>
+          <a:p>
+            <a:r>
+              <a:rPr lang="en-US" sz="3200" b="1" dirty="0"/>
+              <a:t>X</a:t>
+            </a:r>
+          </a:p>
+        </p:txBody>
+      </p:sp>
+      <p:sp>
+        <p:nvSpPr>
+          <p:cNvPr id="9" name="TextBox 8">
+            <a:extLst>
+              <a:ext uri="{FF2B5EF4-FFF2-40B4-BE49-F238E27FC236}">
+                <a16:creationId xmlns:a16="http://schemas.microsoft.com/office/drawing/2014/main" id="{703C7E53-DD04-C043-A58E-A3482BDED68A}"/>
+              </a:ext>
+            </a:extLst>
+          </p:cNvPr>
+          <p:cNvSpPr txBox="1"/>
+          <p:nvPr/>
+        </p:nvSpPr>
+        <p:spPr>
+          <a:xfrm>
+            <a:off x="5003649" y="128408"/>
+            <a:ext cx="4245125" cy="1200329"/>
+          </a:xfrm>
+          <a:prstGeom prst="rect">
+            <a:avLst/>
+          </a:prstGeom>
+          <a:noFill/>
+        </p:spPr>
+        <p:txBody>
+          <a:bodyPr wrap="square" rtlCol="0">
+            <a:spAutoFit/>
+          </a:bodyPr>
+          <a:lstStyle/>
+          <a:p>
+            <a:r>
+              <a:rPr lang="en-US" b="1" dirty="0">
+                <a:solidFill>
+                  <a:schemeClr val="accent2">
+                    <a:lumMod val="75000"/>
+                  </a:schemeClr>
+                </a:solidFill>
+              </a:rPr>
+              <a:t>2. Create Function to predict VIX. Arguments are tickers and </a:t>
+            </a:r>
+            <a:r>
+              <a:rPr lang="en-US" b="1" dirty="0" err="1">
+                <a:solidFill>
+                  <a:schemeClr val="accent2">
+                    <a:lumMod val="75000"/>
+                  </a:schemeClr>
+                </a:solidFill>
+              </a:rPr>
+              <a:t>adaboost</a:t>
+            </a:r>
+            <a:r>
+              <a:rPr lang="en-US" b="1" dirty="0">
+                <a:solidFill>
+                  <a:schemeClr val="accent2">
+                    <a:lumMod val="75000"/>
+                  </a:schemeClr>
+                </a:solidFill>
+              </a:rPr>
+              <a:t> parameters. Good to apply modular concept for functions</a:t>
+            </a:r>
+          </a:p>
+        </p:txBody>
+      </p:sp>
+      <p:sp>
+        <p:nvSpPr>
+          <p:cNvPr id="10" name="TextBox 9">
+            <a:extLst>
+              <a:ext uri="{FF2B5EF4-FFF2-40B4-BE49-F238E27FC236}">
+                <a16:creationId xmlns:a16="http://schemas.microsoft.com/office/drawing/2014/main" id="{43F38730-AEA5-5D42-8DA6-9572737982E2}"/>
+              </a:ext>
+            </a:extLst>
+          </p:cNvPr>
+          <p:cNvSpPr txBox="1"/>
+          <p:nvPr/>
+        </p:nvSpPr>
+        <p:spPr>
+          <a:xfrm>
+            <a:off x="8263462" y="4362393"/>
+            <a:ext cx="1210962" cy="584775"/>
+          </a:xfrm>
+          <a:prstGeom prst="rect">
+            <a:avLst/>
+          </a:prstGeom>
+          <a:noFill/>
+        </p:spPr>
+        <p:txBody>
+          <a:bodyPr wrap="square" rtlCol="0">
+            <a:spAutoFit/>
+          </a:bodyPr>
+          <a:lstStyle/>
+          <a:p>
+            <a:pPr algn="ctr"/>
+            <a:r>
+              <a:rPr lang="en-US" sz="3200" b="1" dirty="0"/>
+              <a:t>Y</a:t>
+            </a:r>
+          </a:p>
+        </p:txBody>
+      </p:sp>
+      <p:sp>
+        <p:nvSpPr>
+          <p:cNvPr id="11" name="TextBox 10">
+            <a:extLst>
+              <a:ext uri="{FF2B5EF4-FFF2-40B4-BE49-F238E27FC236}">
+                <a16:creationId xmlns:a16="http://schemas.microsoft.com/office/drawing/2014/main" id="{FABD6CAC-70E2-1D4A-B2F4-C4DD4D9FE3C1}"/>
+              </a:ext>
+            </a:extLst>
+          </p:cNvPr>
+          <p:cNvSpPr txBox="1"/>
+          <p:nvPr/>
+        </p:nvSpPr>
+        <p:spPr>
+          <a:xfrm>
+            <a:off x="944454" y="5073755"/>
+            <a:ext cx="10442683" cy="1200329"/>
+          </a:xfrm>
+          <a:prstGeom prst="rect">
+            <a:avLst/>
+          </a:prstGeom>
+          <a:noFill/>
+        </p:spPr>
+        <p:txBody>
+          <a:bodyPr wrap="square" rtlCol="0">
+            <a:spAutoFit/>
+          </a:bodyPr>
+          <a:lstStyle/>
+          <a:p>
+            <a:r>
+              <a:rPr lang="en-US" b="1" dirty="0"/>
+              <a:t>3. Study on seasonality of VIXM in prophet (PAOLA - DONE)</a:t>
+            </a:r>
+          </a:p>
+          <a:p>
+            <a:r>
+              <a:rPr lang="en-US" b="1" dirty="0"/>
+              <a:t>4. Create VIXM </a:t>
+            </a:r>
+            <a:r>
+              <a:rPr lang="en-US" b="1" dirty="0" err="1"/>
+              <a:t>jupyter</a:t>
+            </a:r>
+            <a:r>
+              <a:rPr lang="en-US" b="1" dirty="0"/>
+              <a:t> lab code to run VIXM prediction (PAOLA)</a:t>
+            </a:r>
+          </a:p>
+          <a:p>
+            <a:r>
+              <a:rPr lang="en-US" b="1" dirty="0"/>
+              <a:t>5. Tunning VIXM model to get maximum accuracy &amp; profitability (as of now we have only care about accuracy metrics) (make as a function)</a:t>
+            </a:r>
+          </a:p>
+        </p:txBody>
+      </p:sp>
+      <p:sp>
+        <p:nvSpPr>
+          <p:cNvPr id="12" name="TextBox 11">
+            <a:extLst>
+              <a:ext uri="{FF2B5EF4-FFF2-40B4-BE49-F238E27FC236}">
+                <a16:creationId xmlns:a16="http://schemas.microsoft.com/office/drawing/2014/main" id="{0CAE652C-6765-FB44-9133-4FABE5B8B8FB}"/>
+              </a:ext>
+            </a:extLst>
+          </p:cNvPr>
+          <p:cNvSpPr txBox="1"/>
+          <p:nvPr/>
+        </p:nvSpPr>
+        <p:spPr>
+          <a:xfrm>
+            <a:off x="626912" y="128408"/>
+            <a:ext cx="4245125" cy="1200329"/>
+          </a:xfrm>
+          <a:prstGeom prst="rect">
+            <a:avLst/>
+          </a:prstGeom>
+          <a:noFill/>
+        </p:spPr>
+        <p:txBody>
+          <a:bodyPr wrap="square" rtlCol="0">
+            <a:spAutoFit/>
+          </a:bodyPr>
+          <a:lstStyle/>
+          <a:p>
+            <a:r>
+              <a:rPr lang="en-US" b="1" dirty="0"/>
+              <a:t>0. filter model for important variables – DONE</a:t>
+            </a:r>
+          </a:p>
+          <a:p>
+            <a:r>
+              <a:rPr lang="en-US" b="1" dirty="0"/>
+              <a:t>1. Learn to include tuning model per depth of decision trees. DONE</a:t>
+            </a:r>
+          </a:p>
+        </p:txBody>
+      </p:sp>
+      <p:sp>
+        <p:nvSpPr>
+          <p:cNvPr id="13" name="Rectangle 12">
+            <a:extLst>
+              <a:ext uri="{FF2B5EF4-FFF2-40B4-BE49-F238E27FC236}">
+                <a16:creationId xmlns:a16="http://schemas.microsoft.com/office/drawing/2014/main" id="{434A01DD-04A7-1749-B0BD-811D9529E946}"/>
+              </a:ext>
+            </a:extLst>
+          </p:cNvPr>
+          <p:cNvSpPr/>
+          <p:nvPr/>
+        </p:nvSpPr>
+        <p:spPr>
+          <a:xfrm>
+            <a:off x="3818239" y="1324609"/>
+            <a:ext cx="1210962" cy="2243137"/>
+          </a:xfrm>
+          <a:prstGeom prst="rect">
+            <a:avLst/>
+          </a:prstGeom>
+          <a:solidFill>
+            <a:schemeClr val="accent2"/>
+          </a:solidFill>
+        </p:spPr>
+        <p:style>
+          <a:lnRef idx="2">
+            <a:schemeClr val="accent1">
+              <a:shade val="50000"/>
+            </a:schemeClr>
+          </a:lnRef>
+          <a:fillRef idx="1">
+            <a:schemeClr val="accent1"/>
+          </a:fillRef>
+          <a:effectRef idx="0">
+            <a:schemeClr val="accent1"/>
+          </a:effectRef>
+          <a:fontRef idx="minor">
+            <a:schemeClr val="lt1"/>
+          </a:fontRef>
+        </p:style>
+        <p:txBody>
+          <a:bodyPr rtlCol="0" anchor="ctr"/>
+          <a:lstStyle/>
+          <a:p>
+            <a:pPr algn="ctr"/>
+            <a:r>
+              <a:rPr lang="en-US" dirty="0"/>
+              <a:t>VIX close, volatility, volume</a:t>
+            </a:r>
+          </a:p>
+          <a:p>
+            <a:pPr algn="ctr"/>
+            <a:r>
+              <a:rPr lang="en-US" dirty="0"/>
+              <a:t>(DONE)</a:t>
+            </a:r>
+          </a:p>
+        </p:txBody>
+      </p:sp>
+    </p:spTree>
+    <p:extLst>
+      <p:ext uri="{BB962C8B-B14F-4D97-AF65-F5344CB8AC3E}">
+        <p14:creationId xmlns:p14="http://schemas.microsoft.com/office/powerpoint/2010/main" val="396654740"/>
       </p:ext>
     </p:extLst>
   </p:cSld>

</xml_diff>

<commit_message>
csv file for jason added to Github
</commit_message>
<xml_diff>
--- a/Adaboost_ML_Model.pptx
+++ b/Adaboost_ML_Model.pptx
@@ -13,9 +13,12 @@
     <p:sldId id="261" r:id="rId7"/>
     <p:sldId id="265" r:id="rId8"/>
     <p:sldId id="266" r:id="rId9"/>
-    <p:sldId id="267" r:id="rId10"/>
-    <p:sldId id="263" r:id="rId11"/>
-    <p:sldId id="264" r:id="rId12"/>
+    <p:sldId id="269" r:id="rId10"/>
+    <p:sldId id="271" r:id="rId11"/>
+    <p:sldId id="268" r:id="rId12"/>
+    <p:sldId id="267" r:id="rId13"/>
+    <p:sldId id="263" r:id="rId14"/>
+    <p:sldId id="264" r:id="rId15"/>
   </p:sldIdLst>
   <p:sldSz cx="12192000" cy="6858000"/>
   <p:notesSz cx="6858000" cy="9144000"/>
@@ -120,6 +123,2729 @@
     </p:ext>
   </p:extLst>
 </p:presentation>
+</file>
+
+<file path=ppt/diagrams/colors1.xml><?xml version="1.0" encoding="utf-8"?>
+<dgm:colorsDef xmlns:dgm="http://schemas.openxmlformats.org/drawingml/2006/diagram" xmlns:a="http://schemas.openxmlformats.org/drawingml/2006/main" uniqueId="urn:microsoft.com/office/officeart/2005/8/colors/accent1_2">
+  <dgm:title val=""/>
+  <dgm:desc val=""/>
+  <dgm:catLst>
+    <dgm:cat type="accent1" pri="11200"/>
+  </dgm:catLst>
+  <dgm:styleLbl name="node0">
+    <dgm:fillClrLst meth="repeat">
+      <a:schemeClr val="accent1"/>
+    </dgm:fillClrLst>
+    <dgm:linClrLst meth="repeat">
+      <a:schemeClr val="lt1"/>
+    </dgm:linClrLst>
+    <dgm:effectClrLst/>
+    <dgm:txLinClrLst/>
+    <dgm:txFillClrLst/>
+    <dgm:txEffectClrLst/>
+  </dgm:styleLbl>
+  <dgm:styleLbl name="alignNode1">
+    <dgm:fillClrLst meth="repeat">
+      <a:schemeClr val="accent1"/>
+    </dgm:fillClrLst>
+    <dgm:linClrLst meth="repeat">
+      <a:schemeClr val="accent1"/>
+    </dgm:linClrLst>
+    <dgm:effectClrLst/>
+    <dgm:txLinClrLst/>
+    <dgm:txFillClrLst/>
+    <dgm:txEffectClrLst/>
+  </dgm:styleLbl>
+  <dgm:styleLbl name="node1">
+    <dgm:fillClrLst meth="repeat">
+      <a:schemeClr val="accent1"/>
+    </dgm:fillClrLst>
+    <dgm:linClrLst meth="repeat">
+      <a:schemeClr val="lt1"/>
+    </dgm:linClrLst>
+    <dgm:effectClrLst/>
+    <dgm:txLinClrLst/>
+    <dgm:txFillClrLst/>
+    <dgm:txEffectClrLst/>
+  </dgm:styleLbl>
+  <dgm:styleLbl name="lnNode1">
+    <dgm:fillClrLst meth="repeat">
+      <a:schemeClr val="accent1"/>
+    </dgm:fillClrLst>
+    <dgm:linClrLst meth="repeat">
+      <a:schemeClr val="lt1"/>
+    </dgm:linClrLst>
+    <dgm:effectClrLst/>
+    <dgm:txLinClrLst/>
+    <dgm:txFillClrLst/>
+    <dgm:txEffectClrLst/>
+  </dgm:styleLbl>
+  <dgm:styleLbl name="vennNode1">
+    <dgm:fillClrLst meth="repeat">
+      <a:schemeClr val="accent1">
+        <a:alpha val="50000"/>
+      </a:schemeClr>
+    </dgm:fillClrLst>
+    <dgm:linClrLst meth="repeat">
+      <a:schemeClr val="lt1"/>
+    </dgm:linClrLst>
+    <dgm:effectClrLst/>
+    <dgm:txLinClrLst/>
+    <dgm:txFillClrLst/>
+    <dgm:txEffectClrLst/>
+  </dgm:styleLbl>
+  <dgm:styleLbl name="node2">
+    <dgm:fillClrLst meth="repeat">
+      <a:schemeClr val="accent1"/>
+    </dgm:fillClrLst>
+    <dgm:linClrLst meth="repeat">
+      <a:schemeClr val="lt1"/>
+    </dgm:linClrLst>
+    <dgm:effectClrLst/>
+    <dgm:txLinClrLst/>
+    <dgm:txFillClrLst/>
+    <dgm:txEffectClrLst/>
+  </dgm:styleLbl>
+  <dgm:styleLbl name="node3">
+    <dgm:fillClrLst meth="repeat">
+      <a:schemeClr val="accent1"/>
+    </dgm:fillClrLst>
+    <dgm:linClrLst meth="repeat">
+      <a:schemeClr val="lt1"/>
+    </dgm:linClrLst>
+    <dgm:effectClrLst/>
+    <dgm:txLinClrLst/>
+    <dgm:txFillClrLst/>
+    <dgm:txEffectClrLst/>
+  </dgm:styleLbl>
+  <dgm:styleLbl name="node4">
+    <dgm:fillClrLst meth="repeat">
+      <a:schemeClr val="accent1"/>
+    </dgm:fillClrLst>
+    <dgm:linClrLst meth="repeat">
+      <a:schemeClr val="lt1"/>
+    </dgm:linClrLst>
+    <dgm:effectClrLst/>
+    <dgm:txLinClrLst/>
+    <dgm:txFillClrLst/>
+    <dgm:txEffectClrLst/>
+  </dgm:styleLbl>
+  <dgm:styleLbl name="fgImgPlace1">
+    <dgm:fillClrLst meth="repeat">
+      <a:schemeClr val="accent1">
+        <a:tint val="50000"/>
+      </a:schemeClr>
+    </dgm:fillClrLst>
+    <dgm:linClrLst meth="repeat">
+      <a:schemeClr val="lt1"/>
+    </dgm:linClrLst>
+    <dgm:effectClrLst/>
+    <dgm:txLinClrLst/>
+    <dgm:txFillClrLst meth="repeat">
+      <a:schemeClr val="lt1"/>
+    </dgm:txFillClrLst>
+    <dgm:txEffectClrLst/>
+  </dgm:styleLbl>
+  <dgm:styleLbl name="alignImgPlace1">
+    <dgm:fillClrLst meth="repeat">
+      <a:schemeClr val="accent1">
+        <a:tint val="50000"/>
+      </a:schemeClr>
+    </dgm:fillClrLst>
+    <dgm:linClrLst meth="repeat">
+      <a:schemeClr val="lt1"/>
+    </dgm:linClrLst>
+    <dgm:effectClrLst/>
+    <dgm:txLinClrLst/>
+    <dgm:txFillClrLst meth="repeat">
+      <a:schemeClr val="lt1"/>
+    </dgm:txFillClrLst>
+    <dgm:txEffectClrLst/>
+  </dgm:styleLbl>
+  <dgm:styleLbl name="bgImgPlace1">
+    <dgm:fillClrLst meth="repeat">
+      <a:schemeClr val="accent1">
+        <a:tint val="50000"/>
+      </a:schemeClr>
+    </dgm:fillClrLst>
+    <dgm:linClrLst meth="repeat">
+      <a:schemeClr val="lt1"/>
+    </dgm:linClrLst>
+    <dgm:effectClrLst/>
+    <dgm:txLinClrLst/>
+    <dgm:txFillClrLst meth="repeat">
+      <a:schemeClr val="lt1"/>
+    </dgm:txFillClrLst>
+    <dgm:txEffectClrLst/>
+  </dgm:styleLbl>
+  <dgm:styleLbl name="sibTrans2D1">
+    <dgm:fillClrLst meth="repeat">
+      <a:schemeClr val="accent1">
+        <a:tint val="60000"/>
+      </a:schemeClr>
+    </dgm:fillClrLst>
+    <dgm:linClrLst meth="repeat">
+      <a:schemeClr val="accent1">
+        <a:tint val="60000"/>
+      </a:schemeClr>
+    </dgm:linClrLst>
+    <dgm:effectClrLst/>
+    <dgm:txLinClrLst/>
+    <dgm:txFillClrLst/>
+    <dgm:txEffectClrLst/>
+  </dgm:styleLbl>
+  <dgm:styleLbl name="fgSibTrans2D1">
+    <dgm:fillClrLst meth="repeat">
+      <a:schemeClr val="accent1">
+        <a:tint val="60000"/>
+      </a:schemeClr>
+    </dgm:fillClrLst>
+    <dgm:linClrLst meth="repeat">
+      <a:schemeClr val="accent1">
+        <a:tint val="60000"/>
+      </a:schemeClr>
+    </dgm:linClrLst>
+    <dgm:effectClrLst/>
+    <dgm:txLinClrLst/>
+    <dgm:txFillClrLst/>
+    <dgm:txEffectClrLst/>
+  </dgm:styleLbl>
+  <dgm:styleLbl name="bgSibTrans2D1">
+    <dgm:fillClrLst meth="repeat">
+      <a:schemeClr val="accent1">
+        <a:tint val="60000"/>
+      </a:schemeClr>
+    </dgm:fillClrLst>
+    <dgm:linClrLst meth="repeat">
+      <a:schemeClr val="accent1">
+        <a:tint val="60000"/>
+      </a:schemeClr>
+    </dgm:linClrLst>
+    <dgm:effectClrLst/>
+    <dgm:txLinClrLst/>
+    <dgm:txFillClrLst/>
+    <dgm:txEffectClrLst/>
+  </dgm:styleLbl>
+  <dgm:styleLbl name="sibTrans1D1">
+    <dgm:fillClrLst meth="repeat">
+      <a:schemeClr val="accent1"/>
+    </dgm:fillClrLst>
+    <dgm:linClrLst meth="repeat">
+      <a:schemeClr val="accent1"/>
+    </dgm:linClrLst>
+    <dgm:effectClrLst/>
+    <dgm:txLinClrLst/>
+    <dgm:txFillClrLst meth="repeat">
+      <a:schemeClr val="tx1"/>
+    </dgm:txFillClrLst>
+    <dgm:txEffectClrLst/>
+  </dgm:styleLbl>
+  <dgm:styleLbl name="callout">
+    <dgm:fillClrLst meth="repeat">
+      <a:schemeClr val="accent1"/>
+    </dgm:fillClrLst>
+    <dgm:linClrLst meth="repeat">
+      <a:schemeClr val="accent1">
+        <a:tint val="50000"/>
+      </a:schemeClr>
+    </dgm:linClrLst>
+    <dgm:effectClrLst/>
+    <dgm:txLinClrLst/>
+    <dgm:txFillClrLst meth="repeat">
+      <a:schemeClr val="tx1"/>
+    </dgm:txFillClrLst>
+    <dgm:txEffectClrLst/>
+  </dgm:styleLbl>
+  <dgm:styleLbl name="asst0">
+    <dgm:fillClrLst meth="repeat">
+      <a:schemeClr val="accent1"/>
+    </dgm:fillClrLst>
+    <dgm:linClrLst meth="repeat">
+      <a:schemeClr val="lt1"/>
+    </dgm:linClrLst>
+    <dgm:effectClrLst/>
+    <dgm:txLinClrLst/>
+    <dgm:txFillClrLst/>
+    <dgm:txEffectClrLst/>
+  </dgm:styleLbl>
+  <dgm:styleLbl name="asst1">
+    <dgm:fillClrLst meth="repeat">
+      <a:schemeClr val="accent1"/>
+    </dgm:fillClrLst>
+    <dgm:linClrLst meth="repeat">
+      <a:schemeClr val="lt1"/>
+    </dgm:linClrLst>
+    <dgm:effectClrLst/>
+    <dgm:txLinClrLst/>
+    <dgm:txFillClrLst/>
+    <dgm:txEffectClrLst/>
+  </dgm:styleLbl>
+  <dgm:styleLbl name="asst2">
+    <dgm:fillClrLst meth="repeat">
+      <a:schemeClr val="accent1"/>
+    </dgm:fillClrLst>
+    <dgm:linClrLst meth="repeat">
+      <a:schemeClr val="lt1"/>
+    </dgm:linClrLst>
+    <dgm:effectClrLst/>
+    <dgm:txLinClrLst/>
+    <dgm:txFillClrLst/>
+    <dgm:txEffectClrLst/>
+  </dgm:styleLbl>
+  <dgm:styleLbl name="asst3">
+    <dgm:fillClrLst meth="repeat">
+      <a:schemeClr val="accent1"/>
+    </dgm:fillClrLst>
+    <dgm:linClrLst meth="repeat">
+      <a:schemeClr val="lt1"/>
+    </dgm:linClrLst>
+    <dgm:effectClrLst/>
+    <dgm:txLinClrLst/>
+    <dgm:txFillClrLst/>
+    <dgm:txEffectClrLst/>
+  </dgm:styleLbl>
+  <dgm:styleLbl name="asst4">
+    <dgm:fillClrLst meth="repeat">
+      <a:schemeClr val="accent1"/>
+    </dgm:fillClrLst>
+    <dgm:linClrLst meth="repeat">
+      <a:schemeClr val="lt1"/>
+    </dgm:linClrLst>
+    <dgm:effectClrLst/>
+    <dgm:txLinClrLst/>
+    <dgm:txFillClrLst/>
+    <dgm:txEffectClrLst/>
+  </dgm:styleLbl>
+  <dgm:styleLbl name="parChTrans2D1">
+    <dgm:fillClrLst meth="repeat">
+      <a:schemeClr val="accent1">
+        <a:tint val="60000"/>
+      </a:schemeClr>
+    </dgm:fillClrLst>
+    <dgm:linClrLst meth="repeat">
+      <a:schemeClr val="accent1">
+        <a:tint val="60000"/>
+      </a:schemeClr>
+    </dgm:linClrLst>
+    <dgm:effectClrLst/>
+    <dgm:txLinClrLst/>
+    <dgm:txFillClrLst meth="repeat">
+      <a:schemeClr val="lt1"/>
+    </dgm:txFillClrLst>
+    <dgm:txEffectClrLst/>
+  </dgm:styleLbl>
+  <dgm:styleLbl name="parChTrans2D2">
+    <dgm:fillClrLst meth="repeat">
+      <a:schemeClr val="accent1"/>
+    </dgm:fillClrLst>
+    <dgm:linClrLst meth="repeat">
+      <a:schemeClr val="accent1"/>
+    </dgm:linClrLst>
+    <dgm:effectClrLst/>
+    <dgm:txLinClrLst/>
+    <dgm:txFillClrLst meth="repeat">
+      <a:schemeClr val="lt1"/>
+    </dgm:txFillClrLst>
+    <dgm:txEffectClrLst/>
+  </dgm:styleLbl>
+  <dgm:styleLbl name="parChTrans2D3">
+    <dgm:fillClrLst meth="repeat">
+      <a:schemeClr val="accent1"/>
+    </dgm:fillClrLst>
+    <dgm:linClrLst meth="repeat">
+      <a:schemeClr val="accent1"/>
+    </dgm:linClrLst>
+    <dgm:effectClrLst/>
+    <dgm:txLinClrLst/>
+    <dgm:txFillClrLst meth="repeat">
+      <a:schemeClr val="lt1"/>
+    </dgm:txFillClrLst>
+    <dgm:txEffectClrLst/>
+  </dgm:styleLbl>
+  <dgm:styleLbl name="parChTrans2D4">
+    <dgm:fillClrLst meth="repeat">
+      <a:schemeClr val="accent1"/>
+    </dgm:fillClrLst>
+    <dgm:linClrLst meth="repeat">
+      <a:schemeClr val="accent1"/>
+    </dgm:linClrLst>
+    <dgm:effectClrLst/>
+    <dgm:txLinClrLst/>
+    <dgm:txFillClrLst meth="repeat">
+      <a:schemeClr val="lt1"/>
+    </dgm:txFillClrLst>
+    <dgm:txEffectClrLst/>
+  </dgm:styleLbl>
+  <dgm:styleLbl name="parChTrans1D1">
+    <dgm:fillClrLst meth="repeat">
+      <a:schemeClr val="accent1"/>
+    </dgm:fillClrLst>
+    <dgm:linClrLst meth="repeat">
+      <a:schemeClr val="accent1">
+        <a:shade val="60000"/>
+      </a:schemeClr>
+    </dgm:linClrLst>
+    <dgm:effectClrLst/>
+    <dgm:txLinClrLst/>
+    <dgm:txFillClrLst meth="repeat">
+      <a:schemeClr val="tx1"/>
+    </dgm:txFillClrLst>
+    <dgm:txEffectClrLst/>
+  </dgm:styleLbl>
+  <dgm:styleLbl name="parChTrans1D2">
+    <dgm:fillClrLst meth="repeat">
+      <a:schemeClr val="accent1"/>
+    </dgm:fillClrLst>
+    <dgm:linClrLst meth="repeat">
+      <a:schemeClr val="accent1">
+        <a:shade val="60000"/>
+      </a:schemeClr>
+    </dgm:linClrLst>
+    <dgm:effectClrLst/>
+    <dgm:txLinClrLst/>
+    <dgm:txFillClrLst meth="repeat">
+      <a:schemeClr val="tx1"/>
+    </dgm:txFillClrLst>
+    <dgm:txEffectClrLst/>
+  </dgm:styleLbl>
+  <dgm:styleLbl name="parChTrans1D3">
+    <dgm:fillClrLst meth="repeat">
+      <a:schemeClr val="accent1"/>
+    </dgm:fillClrLst>
+    <dgm:linClrLst meth="repeat">
+      <a:schemeClr val="accent1">
+        <a:shade val="80000"/>
+      </a:schemeClr>
+    </dgm:linClrLst>
+    <dgm:effectClrLst/>
+    <dgm:txLinClrLst/>
+    <dgm:txFillClrLst meth="repeat">
+      <a:schemeClr val="tx1"/>
+    </dgm:txFillClrLst>
+    <dgm:txEffectClrLst/>
+  </dgm:styleLbl>
+  <dgm:styleLbl name="parChTrans1D4">
+    <dgm:fillClrLst meth="repeat">
+      <a:schemeClr val="accent1"/>
+    </dgm:fillClrLst>
+    <dgm:linClrLst meth="repeat">
+      <a:schemeClr val="accent1">
+        <a:shade val="80000"/>
+      </a:schemeClr>
+    </dgm:linClrLst>
+    <dgm:effectClrLst/>
+    <dgm:txLinClrLst/>
+    <dgm:txFillClrLst meth="repeat">
+      <a:schemeClr val="tx1"/>
+    </dgm:txFillClrLst>
+    <dgm:txEffectClrLst/>
+  </dgm:styleLbl>
+  <dgm:styleLbl name="fgAcc1">
+    <dgm:fillClrLst meth="repeat">
+      <a:schemeClr val="lt1">
+        <a:alpha val="90000"/>
+      </a:schemeClr>
+    </dgm:fillClrLst>
+    <dgm:linClrLst meth="repeat">
+      <a:schemeClr val="accent1"/>
+    </dgm:linClrLst>
+    <dgm:effectClrLst/>
+    <dgm:txLinClrLst/>
+    <dgm:txFillClrLst meth="repeat">
+      <a:schemeClr val="dk1"/>
+    </dgm:txFillClrLst>
+    <dgm:txEffectClrLst/>
+  </dgm:styleLbl>
+  <dgm:styleLbl name="conFgAcc1">
+    <dgm:fillClrLst meth="repeat">
+      <a:schemeClr val="lt1">
+        <a:alpha val="90000"/>
+      </a:schemeClr>
+    </dgm:fillClrLst>
+    <dgm:linClrLst meth="repeat">
+      <a:schemeClr val="accent1"/>
+    </dgm:linClrLst>
+    <dgm:effectClrLst/>
+    <dgm:txLinClrLst/>
+    <dgm:txFillClrLst meth="repeat">
+      <a:schemeClr val="dk1"/>
+    </dgm:txFillClrLst>
+    <dgm:txEffectClrLst/>
+  </dgm:styleLbl>
+  <dgm:styleLbl name="alignAcc1">
+    <dgm:fillClrLst meth="repeat">
+      <a:schemeClr val="lt1">
+        <a:alpha val="90000"/>
+      </a:schemeClr>
+    </dgm:fillClrLst>
+    <dgm:linClrLst meth="repeat">
+      <a:schemeClr val="accent1"/>
+    </dgm:linClrLst>
+    <dgm:effectClrLst/>
+    <dgm:txLinClrLst/>
+    <dgm:txFillClrLst meth="repeat">
+      <a:schemeClr val="dk1"/>
+    </dgm:txFillClrLst>
+    <dgm:txEffectClrLst/>
+  </dgm:styleLbl>
+  <dgm:styleLbl name="trAlignAcc1">
+    <dgm:fillClrLst meth="repeat">
+      <a:schemeClr val="lt1">
+        <a:alpha val="40000"/>
+      </a:schemeClr>
+    </dgm:fillClrLst>
+    <dgm:linClrLst meth="repeat">
+      <a:schemeClr val="accent1"/>
+    </dgm:linClrLst>
+    <dgm:effectClrLst/>
+    <dgm:txLinClrLst/>
+    <dgm:txFillClrLst meth="repeat">
+      <a:schemeClr val="dk1"/>
+    </dgm:txFillClrLst>
+    <dgm:txEffectClrLst/>
+  </dgm:styleLbl>
+  <dgm:styleLbl name="bgAcc1">
+    <dgm:fillClrLst meth="repeat">
+      <a:schemeClr val="lt1">
+        <a:alpha val="90000"/>
+      </a:schemeClr>
+    </dgm:fillClrLst>
+    <dgm:linClrLst meth="repeat">
+      <a:schemeClr val="accent1"/>
+    </dgm:linClrLst>
+    <dgm:effectClrLst/>
+    <dgm:txLinClrLst/>
+    <dgm:txFillClrLst meth="repeat">
+      <a:schemeClr val="dk1"/>
+    </dgm:txFillClrLst>
+    <dgm:txEffectClrLst/>
+  </dgm:styleLbl>
+  <dgm:styleLbl name="solidFgAcc1">
+    <dgm:fillClrLst meth="repeat">
+      <a:schemeClr val="lt1"/>
+    </dgm:fillClrLst>
+    <dgm:linClrLst meth="repeat">
+      <a:schemeClr val="accent1"/>
+    </dgm:linClrLst>
+    <dgm:effectClrLst/>
+    <dgm:txLinClrLst/>
+    <dgm:txFillClrLst meth="repeat">
+      <a:schemeClr val="dk1"/>
+    </dgm:txFillClrLst>
+    <dgm:txEffectClrLst/>
+  </dgm:styleLbl>
+  <dgm:styleLbl name="solidAlignAcc1">
+    <dgm:fillClrLst meth="repeat">
+      <a:schemeClr val="lt1"/>
+    </dgm:fillClrLst>
+    <dgm:linClrLst meth="repeat">
+      <a:schemeClr val="accent1"/>
+    </dgm:linClrLst>
+    <dgm:effectClrLst/>
+    <dgm:txLinClrLst/>
+    <dgm:txFillClrLst meth="repeat">
+      <a:schemeClr val="dk1"/>
+    </dgm:txFillClrLst>
+    <dgm:txEffectClrLst/>
+  </dgm:styleLbl>
+  <dgm:styleLbl name="solidBgAcc1">
+    <dgm:fillClrLst meth="repeat">
+      <a:schemeClr val="lt1"/>
+    </dgm:fillClrLst>
+    <dgm:linClrLst meth="repeat">
+      <a:schemeClr val="accent1"/>
+    </dgm:linClrLst>
+    <dgm:effectClrLst/>
+    <dgm:txLinClrLst/>
+    <dgm:txFillClrLst meth="repeat">
+      <a:schemeClr val="dk1"/>
+    </dgm:txFillClrLst>
+    <dgm:txEffectClrLst/>
+  </dgm:styleLbl>
+  <dgm:styleLbl name="fgAccFollowNode1">
+    <dgm:fillClrLst meth="repeat">
+      <a:schemeClr val="accent1">
+        <a:alpha val="90000"/>
+        <a:tint val="40000"/>
+      </a:schemeClr>
+    </dgm:fillClrLst>
+    <dgm:linClrLst meth="repeat">
+      <a:schemeClr val="accent1">
+        <a:alpha val="90000"/>
+        <a:tint val="40000"/>
+      </a:schemeClr>
+    </dgm:linClrLst>
+    <dgm:effectClrLst/>
+    <dgm:txLinClrLst/>
+    <dgm:txFillClrLst meth="repeat">
+      <a:schemeClr val="dk1"/>
+    </dgm:txFillClrLst>
+    <dgm:txEffectClrLst/>
+  </dgm:styleLbl>
+  <dgm:styleLbl name="alignAccFollowNode1">
+    <dgm:fillClrLst meth="repeat">
+      <a:schemeClr val="accent1">
+        <a:alpha val="90000"/>
+        <a:tint val="40000"/>
+      </a:schemeClr>
+    </dgm:fillClrLst>
+    <dgm:linClrLst meth="repeat">
+      <a:schemeClr val="accent1">
+        <a:alpha val="90000"/>
+        <a:tint val="40000"/>
+      </a:schemeClr>
+    </dgm:linClrLst>
+    <dgm:effectClrLst/>
+    <dgm:txLinClrLst/>
+    <dgm:txFillClrLst meth="repeat">
+      <a:schemeClr val="dk1"/>
+    </dgm:txFillClrLst>
+    <dgm:txEffectClrLst/>
+  </dgm:styleLbl>
+  <dgm:styleLbl name="bgAccFollowNode1">
+    <dgm:fillClrLst meth="repeat">
+      <a:schemeClr val="accent1">
+        <a:alpha val="90000"/>
+        <a:tint val="40000"/>
+      </a:schemeClr>
+    </dgm:fillClrLst>
+    <dgm:linClrLst meth="repeat">
+      <a:schemeClr val="accent1">
+        <a:alpha val="90000"/>
+        <a:tint val="40000"/>
+      </a:schemeClr>
+    </dgm:linClrLst>
+    <dgm:effectClrLst/>
+    <dgm:txLinClrLst/>
+    <dgm:txFillClrLst meth="repeat">
+      <a:schemeClr val="dk1"/>
+    </dgm:txFillClrLst>
+    <dgm:txEffectClrLst/>
+  </dgm:styleLbl>
+  <dgm:styleLbl name="fgAcc0">
+    <dgm:fillClrLst meth="repeat">
+      <a:schemeClr val="lt1">
+        <a:alpha val="90000"/>
+      </a:schemeClr>
+    </dgm:fillClrLst>
+    <dgm:linClrLst meth="repeat">
+      <a:schemeClr val="accent1"/>
+    </dgm:linClrLst>
+    <dgm:effectClrLst/>
+    <dgm:txLinClrLst/>
+    <dgm:txFillClrLst meth="repeat">
+      <a:schemeClr val="dk1"/>
+    </dgm:txFillClrLst>
+    <dgm:txEffectClrLst/>
+  </dgm:styleLbl>
+  <dgm:styleLbl name="fgAcc2">
+    <dgm:fillClrLst meth="repeat">
+      <a:schemeClr val="lt1">
+        <a:alpha val="90000"/>
+      </a:schemeClr>
+    </dgm:fillClrLst>
+    <dgm:linClrLst meth="repeat">
+      <a:schemeClr val="accent1"/>
+    </dgm:linClrLst>
+    <dgm:effectClrLst/>
+    <dgm:txLinClrLst/>
+    <dgm:txFillClrLst meth="repeat">
+      <a:schemeClr val="dk1"/>
+    </dgm:txFillClrLst>
+    <dgm:txEffectClrLst/>
+  </dgm:styleLbl>
+  <dgm:styleLbl name="fgAcc3">
+    <dgm:fillClrLst meth="repeat">
+      <a:schemeClr val="lt1">
+        <a:alpha val="90000"/>
+      </a:schemeClr>
+    </dgm:fillClrLst>
+    <dgm:linClrLst meth="repeat">
+      <a:schemeClr val="accent1"/>
+    </dgm:linClrLst>
+    <dgm:effectClrLst/>
+    <dgm:txLinClrLst/>
+    <dgm:txFillClrLst meth="repeat">
+      <a:schemeClr val="dk1"/>
+    </dgm:txFillClrLst>
+    <dgm:txEffectClrLst/>
+  </dgm:styleLbl>
+  <dgm:styleLbl name="fgAcc4">
+    <dgm:fillClrLst meth="repeat">
+      <a:schemeClr val="lt1">
+        <a:alpha val="90000"/>
+      </a:schemeClr>
+    </dgm:fillClrLst>
+    <dgm:linClrLst meth="repeat">
+      <a:schemeClr val="accent1"/>
+    </dgm:linClrLst>
+    <dgm:effectClrLst/>
+    <dgm:txLinClrLst/>
+    <dgm:txFillClrLst meth="repeat">
+      <a:schemeClr val="dk1"/>
+    </dgm:txFillClrLst>
+    <dgm:txEffectClrLst/>
+  </dgm:styleLbl>
+  <dgm:styleLbl name="bgShp">
+    <dgm:fillClrLst meth="repeat">
+      <a:schemeClr val="accent1">
+        <a:tint val="40000"/>
+      </a:schemeClr>
+    </dgm:fillClrLst>
+    <dgm:linClrLst meth="repeat">
+      <a:schemeClr val="accent1"/>
+    </dgm:linClrLst>
+    <dgm:effectClrLst/>
+    <dgm:txLinClrLst/>
+    <dgm:txFillClrLst meth="repeat">
+      <a:schemeClr val="dk1"/>
+    </dgm:txFillClrLst>
+    <dgm:txEffectClrLst/>
+  </dgm:styleLbl>
+  <dgm:styleLbl name="dkBgShp">
+    <dgm:fillClrLst meth="repeat">
+      <a:schemeClr val="accent1">
+        <a:shade val="80000"/>
+      </a:schemeClr>
+    </dgm:fillClrLst>
+    <dgm:linClrLst meth="repeat">
+      <a:schemeClr val="accent1"/>
+    </dgm:linClrLst>
+    <dgm:effectClrLst/>
+    <dgm:txLinClrLst/>
+    <dgm:txFillClrLst meth="repeat">
+      <a:schemeClr val="lt1"/>
+    </dgm:txFillClrLst>
+    <dgm:txEffectClrLst/>
+  </dgm:styleLbl>
+  <dgm:styleLbl name="trBgShp">
+    <dgm:fillClrLst meth="repeat">
+      <a:schemeClr val="accent1">
+        <a:tint val="50000"/>
+        <a:alpha val="40000"/>
+      </a:schemeClr>
+    </dgm:fillClrLst>
+    <dgm:linClrLst meth="repeat">
+      <a:schemeClr val="accent1"/>
+    </dgm:linClrLst>
+    <dgm:effectClrLst/>
+    <dgm:txLinClrLst/>
+    <dgm:txFillClrLst meth="repeat">
+      <a:schemeClr val="lt1"/>
+    </dgm:txFillClrLst>
+    <dgm:txEffectClrLst/>
+  </dgm:styleLbl>
+  <dgm:styleLbl name="fgShp">
+    <dgm:fillClrLst meth="repeat">
+      <a:schemeClr val="accent1">
+        <a:tint val="60000"/>
+      </a:schemeClr>
+    </dgm:fillClrLst>
+    <dgm:linClrLst meth="repeat">
+      <a:schemeClr val="lt1"/>
+    </dgm:linClrLst>
+    <dgm:effectClrLst/>
+    <dgm:txLinClrLst/>
+    <dgm:txFillClrLst meth="repeat">
+      <a:schemeClr val="dk1"/>
+    </dgm:txFillClrLst>
+    <dgm:txEffectClrLst/>
+  </dgm:styleLbl>
+  <dgm:styleLbl name="revTx">
+    <dgm:fillClrLst meth="repeat">
+      <a:schemeClr val="lt1">
+        <a:alpha val="0"/>
+      </a:schemeClr>
+    </dgm:fillClrLst>
+    <dgm:linClrLst meth="repeat">
+      <a:schemeClr val="dk1">
+        <a:alpha val="0"/>
+      </a:schemeClr>
+    </dgm:linClrLst>
+    <dgm:effectClrLst/>
+    <dgm:txLinClrLst/>
+    <dgm:txFillClrLst meth="repeat">
+      <a:schemeClr val="tx1"/>
+    </dgm:txFillClrLst>
+    <dgm:txEffectClrLst/>
+  </dgm:styleLbl>
+</dgm:colorsDef>
+</file>
+
+<file path=ppt/diagrams/data1.xml><?xml version="1.0" encoding="utf-8"?>
+<dgm:dataModel xmlns:dgm="http://schemas.openxmlformats.org/drawingml/2006/diagram" xmlns:a="http://schemas.openxmlformats.org/drawingml/2006/main">
+  <dgm:ptLst>
+    <dgm:pt modelId="{43D1936C-E7F7-774F-878D-A6784FFD0AD5}" type="doc">
+      <dgm:prSet loTypeId="urn:microsoft.com/office/officeart/2005/8/layout/process1" loCatId="" qsTypeId="urn:microsoft.com/office/officeart/2005/8/quickstyle/simple1" qsCatId="simple" csTypeId="urn:microsoft.com/office/officeart/2005/8/colors/accent1_2" csCatId="accent1" phldr="1"/>
+      <dgm:spPr/>
+    </dgm:pt>
+    <dgm:pt modelId="{45584323-1573-E34C-ABDE-63352C7229A7}">
+      <dgm:prSet phldrT="[Text]"/>
+      <dgm:spPr/>
+      <dgm:t>
+        <a:bodyPr/>
+        <a:lstStyle/>
+        <a:p>
+          <a:r>
+            <a:rPr lang="en-US" dirty="0"/>
+            <a:t>VIX prediction</a:t>
+          </a:r>
+        </a:p>
+      </dgm:t>
+    </dgm:pt>
+    <dgm:pt modelId="{D81E3425-24A9-FB45-9A6E-F703689F89EA}" type="parTrans" cxnId="{7E25F953-AA40-124D-A1CA-551E4B74119F}">
+      <dgm:prSet/>
+      <dgm:spPr/>
+      <dgm:t>
+        <a:bodyPr/>
+        <a:lstStyle/>
+        <a:p>
+          <a:endParaRPr lang="en-US"/>
+        </a:p>
+      </dgm:t>
+    </dgm:pt>
+    <dgm:pt modelId="{F7F51D70-6432-0D4C-8D1B-22B3AEC30C46}" type="sibTrans" cxnId="{7E25F953-AA40-124D-A1CA-551E4B74119F}">
+      <dgm:prSet/>
+      <dgm:spPr/>
+      <dgm:t>
+        <a:bodyPr/>
+        <a:lstStyle/>
+        <a:p>
+          <a:endParaRPr lang="en-US"/>
+        </a:p>
+      </dgm:t>
+    </dgm:pt>
+    <dgm:pt modelId="{C9308FAB-E843-0D44-A8EC-491C499B8614}">
+      <dgm:prSet phldrT="[Text]"/>
+      <dgm:spPr/>
+      <dgm:t>
+        <a:bodyPr/>
+        <a:lstStyle/>
+        <a:p>
+          <a:r>
+            <a:rPr lang="en-US" dirty="0"/>
+            <a:t>VIXM Prediction</a:t>
+          </a:r>
+        </a:p>
+      </dgm:t>
+    </dgm:pt>
+    <dgm:pt modelId="{C3364611-DE48-BF40-99C2-E2A8DBB98C2B}" type="parTrans" cxnId="{20A50877-0029-6D4E-890F-F286F605FD8B}">
+      <dgm:prSet/>
+      <dgm:spPr/>
+      <dgm:t>
+        <a:bodyPr/>
+        <a:lstStyle/>
+        <a:p>
+          <a:endParaRPr lang="en-US"/>
+        </a:p>
+      </dgm:t>
+    </dgm:pt>
+    <dgm:pt modelId="{71666982-8500-EB4F-908C-209513E1DC91}" type="sibTrans" cxnId="{20A50877-0029-6D4E-890F-F286F605FD8B}">
+      <dgm:prSet/>
+      <dgm:spPr/>
+      <dgm:t>
+        <a:bodyPr/>
+        <a:lstStyle/>
+        <a:p>
+          <a:endParaRPr lang="en-US"/>
+        </a:p>
+      </dgm:t>
+    </dgm:pt>
+    <dgm:pt modelId="{DB8D31F4-57F3-A445-B02D-58B7D7515D6D}">
+      <dgm:prSet phldrT="[Text]"/>
+      <dgm:spPr/>
+      <dgm:t>
+        <a:bodyPr/>
+        <a:lstStyle/>
+        <a:p>
+          <a:r>
+            <a:rPr lang="en-US" dirty="0"/>
+            <a:t>Tunning</a:t>
+          </a:r>
+        </a:p>
+      </dgm:t>
+    </dgm:pt>
+    <dgm:pt modelId="{782982B9-667F-624E-91FB-5DCB7EB13357}" type="parTrans" cxnId="{8419A01B-3BBE-4D46-86FE-8562F8753A5E}">
+      <dgm:prSet/>
+      <dgm:spPr/>
+      <dgm:t>
+        <a:bodyPr/>
+        <a:lstStyle/>
+        <a:p>
+          <a:endParaRPr lang="en-US"/>
+        </a:p>
+      </dgm:t>
+    </dgm:pt>
+    <dgm:pt modelId="{62A3C427-7092-6B43-A277-36524BFAE21C}" type="sibTrans" cxnId="{8419A01B-3BBE-4D46-86FE-8562F8753A5E}">
+      <dgm:prSet/>
+      <dgm:spPr/>
+      <dgm:t>
+        <a:bodyPr/>
+        <a:lstStyle/>
+        <a:p>
+          <a:endParaRPr lang="en-US"/>
+        </a:p>
+      </dgm:t>
+    </dgm:pt>
+    <dgm:pt modelId="{FD49330F-5412-5C4D-A9EE-88DF7A082111}">
+      <dgm:prSet phldrT="[Text]"/>
+      <dgm:spPr/>
+      <dgm:t>
+        <a:bodyPr/>
+        <a:lstStyle/>
+        <a:p>
+          <a:r>
+            <a:rPr lang="en-US" dirty="0"/>
+            <a:t>FINAL MODEL</a:t>
+          </a:r>
+        </a:p>
+      </dgm:t>
+    </dgm:pt>
+    <dgm:pt modelId="{025FAF93-A093-F14C-A12F-C26D03BA7DEA}" type="parTrans" cxnId="{3A22C7F0-776C-F34C-AA8B-0A8EEAE4D9AD}">
+      <dgm:prSet/>
+      <dgm:spPr/>
+      <dgm:t>
+        <a:bodyPr/>
+        <a:lstStyle/>
+        <a:p>
+          <a:endParaRPr lang="en-US"/>
+        </a:p>
+      </dgm:t>
+    </dgm:pt>
+    <dgm:pt modelId="{8E8D883C-F763-A84A-AC09-8EB47A751F18}" type="sibTrans" cxnId="{3A22C7F0-776C-F34C-AA8B-0A8EEAE4D9AD}">
+      <dgm:prSet/>
+      <dgm:spPr/>
+      <dgm:t>
+        <a:bodyPr/>
+        <a:lstStyle/>
+        <a:p>
+          <a:endParaRPr lang="en-US"/>
+        </a:p>
+      </dgm:t>
+    </dgm:pt>
+    <dgm:pt modelId="{DA29DDA1-5AEE-7D42-AAAF-65FD7A20E36F}" type="pres">
+      <dgm:prSet presAssocID="{43D1936C-E7F7-774F-878D-A6784FFD0AD5}" presName="Name0" presStyleCnt="0">
+        <dgm:presLayoutVars>
+          <dgm:dir/>
+          <dgm:resizeHandles val="exact"/>
+        </dgm:presLayoutVars>
+      </dgm:prSet>
+      <dgm:spPr/>
+    </dgm:pt>
+    <dgm:pt modelId="{C906A8EA-5615-2249-9142-11F8D403BB3A}" type="pres">
+      <dgm:prSet presAssocID="{45584323-1573-E34C-ABDE-63352C7229A7}" presName="node" presStyleLbl="node1" presStyleIdx="0" presStyleCnt="4">
+        <dgm:presLayoutVars>
+          <dgm:bulletEnabled val="1"/>
+        </dgm:presLayoutVars>
+      </dgm:prSet>
+      <dgm:spPr/>
+    </dgm:pt>
+    <dgm:pt modelId="{8BF58996-FE90-A444-9E47-EF3631A03D97}" type="pres">
+      <dgm:prSet presAssocID="{F7F51D70-6432-0D4C-8D1B-22B3AEC30C46}" presName="sibTrans" presStyleLbl="sibTrans2D1" presStyleIdx="0" presStyleCnt="3"/>
+      <dgm:spPr/>
+    </dgm:pt>
+    <dgm:pt modelId="{9019D69F-FD7F-594F-A54D-5D54B4FE4E3E}" type="pres">
+      <dgm:prSet presAssocID="{F7F51D70-6432-0D4C-8D1B-22B3AEC30C46}" presName="connectorText" presStyleLbl="sibTrans2D1" presStyleIdx="0" presStyleCnt="3"/>
+      <dgm:spPr/>
+    </dgm:pt>
+    <dgm:pt modelId="{BB69EB62-8C0E-C148-9701-5ED5271A3758}" type="pres">
+      <dgm:prSet presAssocID="{C9308FAB-E843-0D44-A8EC-491C499B8614}" presName="node" presStyleLbl="node1" presStyleIdx="1" presStyleCnt="4">
+        <dgm:presLayoutVars>
+          <dgm:bulletEnabled val="1"/>
+        </dgm:presLayoutVars>
+      </dgm:prSet>
+      <dgm:spPr/>
+    </dgm:pt>
+    <dgm:pt modelId="{7A01D33C-739D-9F4C-8EBD-29077C664D49}" type="pres">
+      <dgm:prSet presAssocID="{71666982-8500-EB4F-908C-209513E1DC91}" presName="sibTrans" presStyleLbl="sibTrans2D1" presStyleIdx="1" presStyleCnt="3"/>
+      <dgm:spPr/>
+    </dgm:pt>
+    <dgm:pt modelId="{3AD5C314-ED3C-DD48-B7F1-46A2D13BD6D7}" type="pres">
+      <dgm:prSet presAssocID="{71666982-8500-EB4F-908C-209513E1DC91}" presName="connectorText" presStyleLbl="sibTrans2D1" presStyleIdx="1" presStyleCnt="3"/>
+      <dgm:spPr/>
+    </dgm:pt>
+    <dgm:pt modelId="{AA0AF348-8C65-5945-BDA5-1FE81EC41058}" type="pres">
+      <dgm:prSet presAssocID="{DB8D31F4-57F3-A445-B02D-58B7D7515D6D}" presName="node" presStyleLbl="node1" presStyleIdx="2" presStyleCnt="4">
+        <dgm:presLayoutVars>
+          <dgm:bulletEnabled val="1"/>
+        </dgm:presLayoutVars>
+      </dgm:prSet>
+      <dgm:spPr/>
+    </dgm:pt>
+    <dgm:pt modelId="{62890571-5ACE-C345-A0A2-5474A7E0778C}" type="pres">
+      <dgm:prSet presAssocID="{62A3C427-7092-6B43-A277-36524BFAE21C}" presName="sibTrans" presStyleLbl="sibTrans2D1" presStyleIdx="2" presStyleCnt="3"/>
+      <dgm:spPr/>
+    </dgm:pt>
+    <dgm:pt modelId="{6247AC15-E438-764F-9040-543F4E8CD6E6}" type="pres">
+      <dgm:prSet presAssocID="{62A3C427-7092-6B43-A277-36524BFAE21C}" presName="connectorText" presStyleLbl="sibTrans2D1" presStyleIdx="2" presStyleCnt="3"/>
+      <dgm:spPr/>
+    </dgm:pt>
+    <dgm:pt modelId="{D9DF3E05-CA37-8B4E-9E29-C6558CCD5C55}" type="pres">
+      <dgm:prSet presAssocID="{FD49330F-5412-5C4D-A9EE-88DF7A082111}" presName="node" presStyleLbl="node1" presStyleIdx="3" presStyleCnt="4">
+        <dgm:presLayoutVars>
+          <dgm:bulletEnabled val="1"/>
+        </dgm:presLayoutVars>
+      </dgm:prSet>
+      <dgm:spPr/>
+    </dgm:pt>
+  </dgm:ptLst>
+  <dgm:cxnLst>
+    <dgm:cxn modelId="{C7C7B407-21CD-D64D-AE30-7AA6EDED97D0}" type="presOf" srcId="{43D1936C-E7F7-774F-878D-A6784FFD0AD5}" destId="{DA29DDA1-5AEE-7D42-AAAF-65FD7A20E36F}" srcOrd="0" destOrd="0" presId="urn:microsoft.com/office/officeart/2005/8/layout/process1"/>
+    <dgm:cxn modelId="{8419A01B-3BBE-4D46-86FE-8562F8753A5E}" srcId="{43D1936C-E7F7-774F-878D-A6784FFD0AD5}" destId="{DB8D31F4-57F3-A445-B02D-58B7D7515D6D}" srcOrd="2" destOrd="0" parTransId="{782982B9-667F-624E-91FB-5DCB7EB13357}" sibTransId="{62A3C427-7092-6B43-A277-36524BFAE21C}"/>
+    <dgm:cxn modelId="{7E25F953-AA40-124D-A1CA-551E4B74119F}" srcId="{43D1936C-E7F7-774F-878D-A6784FFD0AD5}" destId="{45584323-1573-E34C-ABDE-63352C7229A7}" srcOrd="0" destOrd="0" parTransId="{D81E3425-24A9-FB45-9A6E-F703689F89EA}" sibTransId="{F7F51D70-6432-0D4C-8D1B-22B3AEC30C46}"/>
+    <dgm:cxn modelId="{99354161-4DFF-334B-A8C6-F0AAFF95FC1D}" type="presOf" srcId="{DB8D31F4-57F3-A445-B02D-58B7D7515D6D}" destId="{AA0AF348-8C65-5945-BDA5-1FE81EC41058}" srcOrd="0" destOrd="0" presId="urn:microsoft.com/office/officeart/2005/8/layout/process1"/>
+    <dgm:cxn modelId="{FDD0E376-2C76-7A4E-9A13-B53D7F569484}" type="presOf" srcId="{FD49330F-5412-5C4D-A9EE-88DF7A082111}" destId="{D9DF3E05-CA37-8B4E-9E29-C6558CCD5C55}" srcOrd="0" destOrd="0" presId="urn:microsoft.com/office/officeart/2005/8/layout/process1"/>
+    <dgm:cxn modelId="{20A50877-0029-6D4E-890F-F286F605FD8B}" srcId="{43D1936C-E7F7-774F-878D-A6784FFD0AD5}" destId="{C9308FAB-E843-0D44-A8EC-491C499B8614}" srcOrd="1" destOrd="0" parTransId="{C3364611-DE48-BF40-99C2-E2A8DBB98C2B}" sibTransId="{71666982-8500-EB4F-908C-209513E1DC91}"/>
+    <dgm:cxn modelId="{06EB7D9C-C6B2-9849-A5C0-18D3E6FF8975}" type="presOf" srcId="{71666982-8500-EB4F-908C-209513E1DC91}" destId="{3AD5C314-ED3C-DD48-B7F1-46A2D13BD6D7}" srcOrd="1" destOrd="0" presId="urn:microsoft.com/office/officeart/2005/8/layout/process1"/>
+    <dgm:cxn modelId="{B2AB7AB3-B069-F94E-810E-0D58CD63E680}" type="presOf" srcId="{62A3C427-7092-6B43-A277-36524BFAE21C}" destId="{6247AC15-E438-764F-9040-543F4E8CD6E6}" srcOrd="1" destOrd="0" presId="urn:microsoft.com/office/officeart/2005/8/layout/process1"/>
+    <dgm:cxn modelId="{4EA950B6-14A0-A446-9FDE-FB5401FDF27C}" type="presOf" srcId="{45584323-1573-E34C-ABDE-63352C7229A7}" destId="{C906A8EA-5615-2249-9142-11F8D403BB3A}" srcOrd="0" destOrd="0" presId="urn:microsoft.com/office/officeart/2005/8/layout/process1"/>
+    <dgm:cxn modelId="{198044C6-7694-584D-99FC-91DDCC33B5DE}" type="presOf" srcId="{F7F51D70-6432-0D4C-8D1B-22B3AEC30C46}" destId="{9019D69F-FD7F-594F-A54D-5D54B4FE4E3E}" srcOrd="1" destOrd="0" presId="urn:microsoft.com/office/officeart/2005/8/layout/process1"/>
+    <dgm:cxn modelId="{A4E888D0-869A-664E-97FE-2D133F96841A}" type="presOf" srcId="{F7F51D70-6432-0D4C-8D1B-22B3AEC30C46}" destId="{8BF58996-FE90-A444-9E47-EF3631A03D97}" srcOrd="0" destOrd="0" presId="urn:microsoft.com/office/officeart/2005/8/layout/process1"/>
+    <dgm:cxn modelId="{E439CEE5-2232-4C49-A10E-2AAFC65A1407}" type="presOf" srcId="{71666982-8500-EB4F-908C-209513E1DC91}" destId="{7A01D33C-739D-9F4C-8EBD-29077C664D49}" srcOrd="0" destOrd="0" presId="urn:microsoft.com/office/officeart/2005/8/layout/process1"/>
+    <dgm:cxn modelId="{CB41B5E7-6095-2C47-B2CF-3AA485468ABA}" type="presOf" srcId="{62A3C427-7092-6B43-A277-36524BFAE21C}" destId="{62890571-5ACE-C345-A0A2-5474A7E0778C}" srcOrd="0" destOrd="0" presId="urn:microsoft.com/office/officeart/2005/8/layout/process1"/>
+    <dgm:cxn modelId="{D1FFC4EF-631C-3E4B-9149-C98E12CFDA17}" type="presOf" srcId="{C9308FAB-E843-0D44-A8EC-491C499B8614}" destId="{BB69EB62-8C0E-C148-9701-5ED5271A3758}" srcOrd="0" destOrd="0" presId="urn:microsoft.com/office/officeart/2005/8/layout/process1"/>
+    <dgm:cxn modelId="{3A22C7F0-776C-F34C-AA8B-0A8EEAE4D9AD}" srcId="{43D1936C-E7F7-774F-878D-A6784FFD0AD5}" destId="{FD49330F-5412-5C4D-A9EE-88DF7A082111}" srcOrd="3" destOrd="0" parTransId="{025FAF93-A093-F14C-A12F-C26D03BA7DEA}" sibTransId="{8E8D883C-F763-A84A-AC09-8EB47A751F18}"/>
+    <dgm:cxn modelId="{0AFA7515-DB4A-FD40-9DE5-2F597E3D837A}" type="presParOf" srcId="{DA29DDA1-5AEE-7D42-AAAF-65FD7A20E36F}" destId="{C906A8EA-5615-2249-9142-11F8D403BB3A}" srcOrd="0" destOrd="0" presId="urn:microsoft.com/office/officeart/2005/8/layout/process1"/>
+    <dgm:cxn modelId="{8FD91B13-3E90-1B4D-BFC2-CB1C540F3FCC}" type="presParOf" srcId="{DA29DDA1-5AEE-7D42-AAAF-65FD7A20E36F}" destId="{8BF58996-FE90-A444-9E47-EF3631A03D97}" srcOrd="1" destOrd="0" presId="urn:microsoft.com/office/officeart/2005/8/layout/process1"/>
+    <dgm:cxn modelId="{4723D57C-3CD9-6347-83B8-036D1D3E541D}" type="presParOf" srcId="{8BF58996-FE90-A444-9E47-EF3631A03D97}" destId="{9019D69F-FD7F-594F-A54D-5D54B4FE4E3E}" srcOrd="0" destOrd="0" presId="urn:microsoft.com/office/officeart/2005/8/layout/process1"/>
+    <dgm:cxn modelId="{FD00158A-A5C1-4841-A63D-118959A4A4C8}" type="presParOf" srcId="{DA29DDA1-5AEE-7D42-AAAF-65FD7A20E36F}" destId="{BB69EB62-8C0E-C148-9701-5ED5271A3758}" srcOrd="2" destOrd="0" presId="urn:microsoft.com/office/officeart/2005/8/layout/process1"/>
+    <dgm:cxn modelId="{0E30598F-439F-A242-A108-6906A040A247}" type="presParOf" srcId="{DA29DDA1-5AEE-7D42-AAAF-65FD7A20E36F}" destId="{7A01D33C-739D-9F4C-8EBD-29077C664D49}" srcOrd="3" destOrd="0" presId="urn:microsoft.com/office/officeart/2005/8/layout/process1"/>
+    <dgm:cxn modelId="{10633D4E-57EE-B84C-96BE-CA104FC9F503}" type="presParOf" srcId="{7A01D33C-739D-9F4C-8EBD-29077C664D49}" destId="{3AD5C314-ED3C-DD48-B7F1-46A2D13BD6D7}" srcOrd="0" destOrd="0" presId="urn:microsoft.com/office/officeart/2005/8/layout/process1"/>
+    <dgm:cxn modelId="{8A49EE7D-C007-A440-A6E6-DAFD535C62D6}" type="presParOf" srcId="{DA29DDA1-5AEE-7D42-AAAF-65FD7A20E36F}" destId="{AA0AF348-8C65-5945-BDA5-1FE81EC41058}" srcOrd="4" destOrd="0" presId="urn:microsoft.com/office/officeart/2005/8/layout/process1"/>
+    <dgm:cxn modelId="{6D80601C-386D-6A43-B3FC-7236B3E250D9}" type="presParOf" srcId="{DA29DDA1-5AEE-7D42-AAAF-65FD7A20E36F}" destId="{62890571-5ACE-C345-A0A2-5474A7E0778C}" srcOrd="5" destOrd="0" presId="urn:microsoft.com/office/officeart/2005/8/layout/process1"/>
+    <dgm:cxn modelId="{B65BB2BF-281A-5F49-B0AD-43B5E9E7AB49}" type="presParOf" srcId="{62890571-5ACE-C345-A0A2-5474A7E0778C}" destId="{6247AC15-E438-764F-9040-543F4E8CD6E6}" srcOrd="0" destOrd="0" presId="urn:microsoft.com/office/officeart/2005/8/layout/process1"/>
+    <dgm:cxn modelId="{93DD33C1-D30A-7C43-804B-42868DA0F1DC}" type="presParOf" srcId="{DA29DDA1-5AEE-7D42-AAAF-65FD7A20E36F}" destId="{D9DF3E05-CA37-8B4E-9E29-C6558CCD5C55}" srcOrd="6" destOrd="0" presId="urn:microsoft.com/office/officeart/2005/8/layout/process1"/>
+  </dgm:cxnLst>
+  <dgm:bg/>
+  <dgm:whole/>
+  <dgm:extLst>
+    <a:ext uri="http://schemas.microsoft.com/office/drawing/2008/diagram">
+      <dsp:dataModelExt xmlns:dsp="http://schemas.microsoft.com/office/drawing/2008/diagram" relId="rId6" minVer="http://schemas.openxmlformats.org/drawingml/2006/diagram"/>
+    </a:ext>
+  </dgm:extLst>
+</dgm:dataModel>
+</file>
+
+<file path=ppt/diagrams/drawing1.xml><?xml version="1.0" encoding="utf-8"?>
+<dsp:drawing xmlns:dgm="http://schemas.openxmlformats.org/drawingml/2006/diagram" xmlns:dsp="http://schemas.microsoft.com/office/drawing/2008/diagram" xmlns:a="http://schemas.openxmlformats.org/drawingml/2006/main">
+  <dsp:spTree>
+    <dsp:nvGrpSpPr>
+      <dsp:cNvPr id="0" name=""/>
+      <dsp:cNvGrpSpPr/>
+    </dsp:nvGrpSpPr>
+    <dsp:grpSpPr/>
+    <dsp:sp modelId="{C906A8EA-5615-2249-9142-11F8D403BB3A}">
+      <dsp:nvSpPr>
+        <dsp:cNvPr id="0" name=""/>
+        <dsp:cNvSpPr/>
+      </dsp:nvSpPr>
+      <dsp:spPr>
+        <a:xfrm>
+          <a:off x="3571" y="2240822"/>
+          <a:ext cx="1561703" cy="937021"/>
+        </a:xfrm>
+        <a:prstGeom prst="roundRect">
+          <a:avLst>
+            <a:gd name="adj" fmla="val 10000"/>
+          </a:avLst>
+        </a:prstGeom>
+        <a:solidFill>
+          <a:schemeClr val="accent1">
+            <a:hueOff val="0"/>
+            <a:satOff val="0"/>
+            <a:lumOff val="0"/>
+            <a:alphaOff val="0"/>
+          </a:schemeClr>
+        </a:solidFill>
+        <a:ln w="12700" cap="flat" cmpd="sng" algn="ctr">
+          <a:solidFill>
+            <a:schemeClr val="lt1">
+              <a:hueOff val="0"/>
+              <a:satOff val="0"/>
+              <a:lumOff val="0"/>
+              <a:alphaOff val="0"/>
+            </a:schemeClr>
+          </a:solidFill>
+          <a:prstDash val="solid"/>
+          <a:miter lim="800000"/>
+        </a:ln>
+        <a:effectLst/>
+      </dsp:spPr>
+      <dsp:style>
+        <a:lnRef idx="2">
+          <a:scrgbClr r="0" g="0" b="0"/>
+        </a:lnRef>
+        <a:fillRef idx="1">
+          <a:scrgbClr r="0" g="0" b="0"/>
+        </a:fillRef>
+        <a:effectRef idx="0">
+          <a:scrgbClr r="0" g="0" b="0"/>
+        </a:effectRef>
+        <a:fontRef idx="minor">
+          <a:schemeClr val="lt1"/>
+        </a:fontRef>
+      </dsp:style>
+      <dsp:txBody>
+        <a:bodyPr spcFirstLastPara="0" vert="horz" wrap="square" lIns="91440" tIns="91440" rIns="91440" bIns="91440" numCol="1" spcCol="1270" anchor="ctr" anchorCtr="0">
+          <a:noAutofit/>
+        </a:bodyPr>
+        <a:lstStyle/>
+        <a:p>
+          <a:pPr marL="0" lvl="0" indent="0" algn="ctr" defTabSz="1066800">
+            <a:lnSpc>
+              <a:spcPct val="90000"/>
+            </a:lnSpc>
+            <a:spcBef>
+              <a:spcPct val="0"/>
+            </a:spcBef>
+            <a:spcAft>
+              <a:spcPct val="35000"/>
+            </a:spcAft>
+            <a:buNone/>
+          </a:pPr>
+          <a:r>
+            <a:rPr lang="en-US" sz="2400" kern="1200" dirty="0"/>
+            <a:t>VIX prediction</a:t>
+          </a:r>
+        </a:p>
+      </dsp:txBody>
+      <dsp:txXfrm>
+        <a:off x="31015" y="2268266"/>
+        <a:ext cx="1506815" cy="882133"/>
+      </dsp:txXfrm>
+    </dsp:sp>
+    <dsp:sp modelId="{8BF58996-FE90-A444-9E47-EF3631A03D97}">
+      <dsp:nvSpPr>
+        <dsp:cNvPr id="0" name=""/>
+        <dsp:cNvSpPr/>
+      </dsp:nvSpPr>
+      <dsp:spPr>
+        <a:xfrm>
+          <a:off x="1721445" y="2515682"/>
+          <a:ext cx="331081" cy="387302"/>
+        </a:xfrm>
+        <a:prstGeom prst="rightArrow">
+          <a:avLst>
+            <a:gd name="adj1" fmla="val 60000"/>
+            <a:gd name="adj2" fmla="val 50000"/>
+          </a:avLst>
+        </a:prstGeom>
+        <a:solidFill>
+          <a:schemeClr val="accent1">
+            <a:tint val="60000"/>
+            <a:hueOff val="0"/>
+            <a:satOff val="0"/>
+            <a:lumOff val="0"/>
+            <a:alphaOff val="0"/>
+          </a:schemeClr>
+        </a:solidFill>
+        <a:ln>
+          <a:noFill/>
+        </a:ln>
+        <a:effectLst/>
+      </dsp:spPr>
+      <dsp:style>
+        <a:lnRef idx="0">
+          <a:scrgbClr r="0" g="0" b="0"/>
+        </a:lnRef>
+        <a:fillRef idx="1">
+          <a:scrgbClr r="0" g="0" b="0"/>
+        </a:fillRef>
+        <a:effectRef idx="0">
+          <a:scrgbClr r="0" g="0" b="0"/>
+        </a:effectRef>
+        <a:fontRef idx="minor">
+          <a:schemeClr val="lt1"/>
+        </a:fontRef>
+      </dsp:style>
+      <dsp:txBody>
+        <a:bodyPr spcFirstLastPara="0" vert="horz" wrap="square" lIns="0" tIns="0" rIns="0" bIns="0" numCol="1" spcCol="1270" anchor="ctr" anchorCtr="0">
+          <a:noAutofit/>
+        </a:bodyPr>
+        <a:lstStyle/>
+        <a:p>
+          <a:pPr marL="0" lvl="0" indent="0" algn="ctr" defTabSz="711200">
+            <a:lnSpc>
+              <a:spcPct val="90000"/>
+            </a:lnSpc>
+            <a:spcBef>
+              <a:spcPct val="0"/>
+            </a:spcBef>
+            <a:spcAft>
+              <a:spcPct val="35000"/>
+            </a:spcAft>
+            <a:buNone/>
+          </a:pPr>
+          <a:endParaRPr lang="en-US" sz="1600" kern="1200"/>
+        </a:p>
+      </dsp:txBody>
+      <dsp:txXfrm>
+        <a:off x="1721445" y="2593142"/>
+        <a:ext cx="231757" cy="232382"/>
+      </dsp:txXfrm>
+    </dsp:sp>
+    <dsp:sp modelId="{BB69EB62-8C0E-C148-9701-5ED5271A3758}">
+      <dsp:nvSpPr>
+        <dsp:cNvPr id="0" name=""/>
+        <dsp:cNvSpPr/>
+      </dsp:nvSpPr>
+      <dsp:spPr>
+        <a:xfrm>
+          <a:off x="2189956" y="2240822"/>
+          <a:ext cx="1561703" cy="937021"/>
+        </a:xfrm>
+        <a:prstGeom prst="roundRect">
+          <a:avLst>
+            <a:gd name="adj" fmla="val 10000"/>
+          </a:avLst>
+        </a:prstGeom>
+        <a:solidFill>
+          <a:schemeClr val="accent1">
+            <a:hueOff val="0"/>
+            <a:satOff val="0"/>
+            <a:lumOff val="0"/>
+            <a:alphaOff val="0"/>
+          </a:schemeClr>
+        </a:solidFill>
+        <a:ln w="12700" cap="flat" cmpd="sng" algn="ctr">
+          <a:solidFill>
+            <a:schemeClr val="lt1">
+              <a:hueOff val="0"/>
+              <a:satOff val="0"/>
+              <a:lumOff val="0"/>
+              <a:alphaOff val="0"/>
+            </a:schemeClr>
+          </a:solidFill>
+          <a:prstDash val="solid"/>
+          <a:miter lim="800000"/>
+        </a:ln>
+        <a:effectLst/>
+      </dsp:spPr>
+      <dsp:style>
+        <a:lnRef idx="2">
+          <a:scrgbClr r="0" g="0" b="0"/>
+        </a:lnRef>
+        <a:fillRef idx="1">
+          <a:scrgbClr r="0" g="0" b="0"/>
+        </a:fillRef>
+        <a:effectRef idx="0">
+          <a:scrgbClr r="0" g="0" b="0"/>
+        </a:effectRef>
+        <a:fontRef idx="minor">
+          <a:schemeClr val="lt1"/>
+        </a:fontRef>
+      </dsp:style>
+      <dsp:txBody>
+        <a:bodyPr spcFirstLastPara="0" vert="horz" wrap="square" lIns="91440" tIns="91440" rIns="91440" bIns="91440" numCol="1" spcCol="1270" anchor="ctr" anchorCtr="0">
+          <a:noAutofit/>
+        </a:bodyPr>
+        <a:lstStyle/>
+        <a:p>
+          <a:pPr marL="0" lvl="0" indent="0" algn="ctr" defTabSz="1066800">
+            <a:lnSpc>
+              <a:spcPct val="90000"/>
+            </a:lnSpc>
+            <a:spcBef>
+              <a:spcPct val="0"/>
+            </a:spcBef>
+            <a:spcAft>
+              <a:spcPct val="35000"/>
+            </a:spcAft>
+            <a:buNone/>
+          </a:pPr>
+          <a:r>
+            <a:rPr lang="en-US" sz="2400" kern="1200" dirty="0"/>
+            <a:t>VIXM Prediction</a:t>
+          </a:r>
+        </a:p>
+      </dsp:txBody>
+      <dsp:txXfrm>
+        <a:off x="2217400" y="2268266"/>
+        <a:ext cx="1506815" cy="882133"/>
+      </dsp:txXfrm>
+    </dsp:sp>
+    <dsp:sp modelId="{7A01D33C-739D-9F4C-8EBD-29077C664D49}">
+      <dsp:nvSpPr>
+        <dsp:cNvPr id="0" name=""/>
+        <dsp:cNvSpPr/>
+      </dsp:nvSpPr>
+      <dsp:spPr>
+        <a:xfrm>
+          <a:off x="3907829" y="2515682"/>
+          <a:ext cx="331081" cy="387302"/>
+        </a:xfrm>
+        <a:prstGeom prst="rightArrow">
+          <a:avLst>
+            <a:gd name="adj1" fmla="val 60000"/>
+            <a:gd name="adj2" fmla="val 50000"/>
+          </a:avLst>
+        </a:prstGeom>
+        <a:solidFill>
+          <a:schemeClr val="accent1">
+            <a:tint val="60000"/>
+            <a:hueOff val="0"/>
+            <a:satOff val="0"/>
+            <a:lumOff val="0"/>
+            <a:alphaOff val="0"/>
+          </a:schemeClr>
+        </a:solidFill>
+        <a:ln>
+          <a:noFill/>
+        </a:ln>
+        <a:effectLst/>
+      </dsp:spPr>
+      <dsp:style>
+        <a:lnRef idx="0">
+          <a:scrgbClr r="0" g="0" b="0"/>
+        </a:lnRef>
+        <a:fillRef idx="1">
+          <a:scrgbClr r="0" g="0" b="0"/>
+        </a:fillRef>
+        <a:effectRef idx="0">
+          <a:scrgbClr r="0" g="0" b="0"/>
+        </a:effectRef>
+        <a:fontRef idx="minor">
+          <a:schemeClr val="lt1"/>
+        </a:fontRef>
+      </dsp:style>
+      <dsp:txBody>
+        <a:bodyPr spcFirstLastPara="0" vert="horz" wrap="square" lIns="0" tIns="0" rIns="0" bIns="0" numCol="1" spcCol="1270" anchor="ctr" anchorCtr="0">
+          <a:noAutofit/>
+        </a:bodyPr>
+        <a:lstStyle/>
+        <a:p>
+          <a:pPr marL="0" lvl="0" indent="0" algn="ctr" defTabSz="711200">
+            <a:lnSpc>
+              <a:spcPct val="90000"/>
+            </a:lnSpc>
+            <a:spcBef>
+              <a:spcPct val="0"/>
+            </a:spcBef>
+            <a:spcAft>
+              <a:spcPct val="35000"/>
+            </a:spcAft>
+            <a:buNone/>
+          </a:pPr>
+          <a:endParaRPr lang="en-US" sz="1600" kern="1200"/>
+        </a:p>
+      </dsp:txBody>
+      <dsp:txXfrm>
+        <a:off x="3907829" y="2593142"/>
+        <a:ext cx="231757" cy="232382"/>
+      </dsp:txXfrm>
+    </dsp:sp>
+    <dsp:sp modelId="{AA0AF348-8C65-5945-BDA5-1FE81EC41058}">
+      <dsp:nvSpPr>
+        <dsp:cNvPr id="0" name=""/>
+        <dsp:cNvSpPr/>
+      </dsp:nvSpPr>
+      <dsp:spPr>
+        <a:xfrm>
+          <a:off x="4376340" y="2240822"/>
+          <a:ext cx="1561703" cy="937021"/>
+        </a:xfrm>
+        <a:prstGeom prst="roundRect">
+          <a:avLst>
+            <a:gd name="adj" fmla="val 10000"/>
+          </a:avLst>
+        </a:prstGeom>
+        <a:solidFill>
+          <a:schemeClr val="accent1">
+            <a:hueOff val="0"/>
+            <a:satOff val="0"/>
+            <a:lumOff val="0"/>
+            <a:alphaOff val="0"/>
+          </a:schemeClr>
+        </a:solidFill>
+        <a:ln w="12700" cap="flat" cmpd="sng" algn="ctr">
+          <a:solidFill>
+            <a:schemeClr val="lt1">
+              <a:hueOff val="0"/>
+              <a:satOff val="0"/>
+              <a:lumOff val="0"/>
+              <a:alphaOff val="0"/>
+            </a:schemeClr>
+          </a:solidFill>
+          <a:prstDash val="solid"/>
+          <a:miter lim="800000"/>
+        </a:ln>
+        <a:effectLst/>
+      </dsp:spPr>
+      <dsp:style>
+        <a:lnRef idx="2">
+          <a:scrgbClr r="0" g="0" b="0"/>
+        </a:lnRef>
+        <a:fillRef idx="1">
+          <a:scrgbClr r="0" g="0" b="0"/>
+        </a:fillRef>
+        <a:effectRef idx="0">
+          <a:scrgbClr r="0" g="0" b="0"/>
+        </a:effectRef>
+        <a:fontRef idx="minor">
+          <a:schemeClr val="lt1"/>
+        </a:fontRef>
+      </dsp:style>
+      <dsp:txBody>
+        <a:bodyPr spcFirstLastPara="0" vert="horz" wrap="square" lIns="91440" tIns="91440" rIns="91440" bIns="91440" numCol="1" spcCol="1270" anchor="ctr" anchorCtr="0">
+          <a:noAutofit/>
+        </a:bodyPr>
+        <a:lstStyle/>
+        <a:p>
+          <a:pPr marL="0" lvl="0" indent="0" algn="ctr" defTabSz="1066800">
+            <a:lnSpc>
+              <a:spcPct val="90000"/>
+            </a:lnSpc>
+            <a:spcBef>
+              <a:spcPct val="0"/>
+            </a:spcBef>
+            <a:spcAft>
+              <a:spcPct val="35000"/>
+            </a:spcAft>
+            <a:buNone/>
+          </a:pPr>
+          <a:r>
+            <a:rPr lang="en-US" sz="2400" kern="1200" dirty="0"/>
+            <a:t>Tunning</a:t>
+          </a:r>
+        </a:p>
+      </dsp:txBody>
+      <dsp:txXfrm>
+        <a:off x="4403784" y="2268266"/>
+        <a:ext cx="1506815" cy="882133"/>
+      </dsp:txXfrm>
+    </dsp:sp>
+    <dsp:sp modelId="{62890571-5ACE-C345-A0A2-5474A7E0778C}">
+      <dsp:nvSpPr>
+        <dsp:cNvPr id="0" name=""/>
+        <dsp:cNvSpPr/>
+      </dsp:nvSpPr>
+      <dsp:spPr>
+        <a:xfrm>
+          <a:off x="6094214" y="2515682"/>
+          <a:ext cx="331081" cy="387302"/>
+        </a:xfrm>
+        <a:prstGeom prst="rightArrow">
+          <a:avLst>
+            <a:gd name="adj1" fmla="val 60000"/>
+            <a:gd name="adj2" fmla="val 50000"/>
+          </a:avLst>
+        </a:prstGeom>
+        <a:solidFill>
+          <a:schemeClr val="accent1">
+            <a:tint val="60000"/>
+            <a:hueOff val="0"/>
+            <a:satOff val="0"/>
+            <a:lumOff val="0"/>
+            <a:alphaOff val="0"/>
+          </a:schemeClr>
+        </a:solidFill>
+        <a:ln>
+          <a:noFill/>
+        </a:ln>
+        <a:effectLst/>
+      </dsp:spPr>
+      <dsp:style>
+        <a:lnRef idx="0">
+          <a:scrgbClr r="0" g="0" b="0"/>
+        </a:lnRef>
+        <a:fillRef idx="1">
+          <a:scrgbClr r="0" g="0" b="0"/>
+        </a:fillRef>
+        <a:effectRef idx="0">
+          <a:scrgbClr r="0" g="0" b="0"/>
+        </a:effectRef>
+        <a:fontRef idx="minor">
+          <a:schemeClr val="lt1"/>
+        </a:fontRef>
+      </dsp:style>
+      <dsp:txBody>
+        <a:bodyPr spcFirstLastPara="0" vert="horz" wrap="square" lIns="0" tIns="0" rIns="0" bIns="0" numCol="1" spcCol="1270" anchor="ctr" anchorCtr="0">
+          <a:noAutofit/>
+        </a:bodyPr>
+        <a:lstStyle/>
+        <a:p>
+          <a:pPr marL="0" lvl="0" indent="0" algn="ctr" defTabSz="711200">
+            <a:lnSpc>
+              <a:spcPct val="90000"/>
+            </a:lnSpc>
+            <a:spcBef>
+              <a:spcPct val="0"/>
+            </a:spcBef>
+            <a:spcAft>
+              <a:spcPct val="35000"/>
+            </a:spcAft>
+            <a:buNone/>
+          </a:pPr>
+          <a:endParaRPr lang="en-US" sz="1600" kern="1200"/>
+        </a:p>
+      </dsp:txBody>
+      <dsp:txXfrm>
+        <a:off x="6094214" y="2593142"/>
+        <a:ext cx="231757" cy="232382"/>
+      </dsp:txXfrm>
+    </dsp:sp>
+    <dsp:sp modelId="{D9DF3E05-CA37-8B4E-9E29-C6558CCD5C55}">
+      <dsp:nvSpPr>
+        <dsp:cNvPr id="0" name=""/>
+        <dsp:cNvSpPr/>
+      </dsp:nvSpPr>
+      <dsp:spPr>
+        <a:xfrm>
+          <a:off x="6562724" y="2240822"/>
+          <a:ext cx="1561703" cy="937021"/>
+        </a:xfrm>
+        <a:prstGeom prst="roundRect">
+          <a:avLst>
+            <a:gd name="adj" fmla="val 10000"/>
+          </a:avLst>
+        </a:prstGeom>
+        <a:solidFill>
+          <a:schemeClr val="accent1">
+            <a:hueOff val="0"/>
+            <a:satOff val="0"/>
+            <a:lumOff val="0"/>
+            <a:alphaOff val="0"/>
+          </a:schemeClr>
+        </a:solidFill>
+        <a:ln w="12700" cap="flat" cmpd="sng" algn="ctr">
+          <a:solidFill>
+            <a:schemeClr val="lt1">
+              <a:hueOff val="0"/>
+              <a:satOff val="0"/>
+              <a:lumOff val="0"/>
+              <a:alphaOff val="0"/>
+            </a:schemeClr>
+          </a:solidFill>
+          <a:prstDash val="solid"/>
+          <a:miter lim="800000"/>
+        </a:ln>
+        <a:effectLst/>
+      </dsp:spPr>
+      <dsp:style>
+        <a:lnRef idx="2">
+          <a:scrgbClr r="0" g="0" b="0"/>
+        </a:lnRef>
+        <a:fillRef idx="1">
+          <a:scrgbClr r="0" g="0" b="0"/>
+        </a:fillRef>
+        <a:effectRef idx="0">
+          <a:scrgbClr r="0" g="0" b="0"/>
+        </a:effectRef>
+        <a:fontRef idx="minor">
+          <a:schemeClr val="lt1"/>
+        </a:fontRef>
+      </dsp:style>
+      <dsp:txBody>
+        <a:bodyPr spcFirstLastPara="0" vert="horz" wrap="square" lIns="91440" tIns="91440" rIns="91440" bIns="91440" numCol="1" spcCol="1270" anchor="ctr" anchorCtr="0">
+          <a:noAutofit/>
+        </a:bodyPr>
+        <a:lstStyle/>
+        <a:p>
+          <a:pPr marL="0" lvl="0" indent="0" algn="ctr" defTabSz="1066800">
+            <a:lnSpc>
+              <a:spcPct val="90000"/>
+            </a:lnSpc>
+            <a:spcBef>
+              <a:spcPct val="0"/>
+            </a:spcBef>
+            <a:spcAft>
+              <a:spcPct val="35000"/>
+            </a:spcAft>
+            <a:buNone/>
+          </a:pPr>
+          <a:r>
+            <a:rPr lang="en-US" sz="2400" kern="1200" dirty="0"/>
+            <a:t>FINAL MODEL</a:t>
+          </a:r>
+        </a:p>
+      </dsp:txBody>
+      <dsp:txXfrm>
+        <a:off x="6590168" y="2268266"/>
+        <a:ext cx="1506815" cy="882133"/>
+      </dsp:txXfrm>
+    </dsp:sp>
+  </dsp:spTree>
+</dsp:drawing>
+</file>
+
+<file path=ppt/diagrams/layout1.xml><?xml version="1.0" encoding="utf-8"?>
+<dgm:layoutDef xmlns:dgm="http://schemas.openxmlformats.org/drawingml/2006/diagram" xmlns:a="http://schemas.openxmlformats.org/drawingml/2006/main" uniqueId="urn:microsoft.com/office/officeart/2005/8/layout/process1">
+  <dgm:title val=""/>
+  <dgm:desc val=""/>
+  <dgm:catLst>
+    <dgm:cat type="process" pri="1000"/>
+    <dgm:cat type="convert" pri="15000"/>
+  </dgm:catLst>
+  <dgm:sampData useDef="1">
+    <dgm:dataModel>
+      <dgm:ptLst/>
+      <dgm:bg/>
+      <dgm:whole/>
+    </dgm:dataModel>
+  </dgm:sampData>
+  <dgm:styleData>
+    <dgm:dataModel>
+      <dgm:ptLst>
+        <dgm:pt modelId="0" type="doc"/>
+        <dgm:pt modelId="1"/>
+        <dgm:pt modelId="2"/>
+      </dgm:ptLst>
+      <dgm:cxnLst>
+        <dgm:cxn modelId="3" srcId="0" destId="1" srcOrd="0" destOrd="0"/>
+        <dgm:cxn modelId="4" srcId="0" destId="2" srcOrd="1" destOrd="0"/>
+      </dgm:cxnLst>
+      <dgm:bg/>
+      <dgm:whole/>
+    </dgm:dataModel>
+  </dgm:styleData>
+  <dgm:clrData>
+    <dgm:dataModel>
+      <dgm:ptLst>
+        <dgm:pt modelId="0" type="doc"/>
+        <dgm:pt modelId="1"/>
+        <dgm:pt modelId="2"/>
+        <dgm:pt modelId="3"/>
+        <dgm:pt modelId="4"/>
+      </dgm:ptLst>
+      <dgm:cxnLst>
+        <dgm:cxn modelId="5" srcId="0" destId="1" srcOrd="0" destOrd="0"/>
+        <dgm:cxn modelId="6" srcId="0" destId="2" srcOrd="1" destOrd="0"/>
+        <dgm:cxn modelId="7" srcId="0" destId="3" srcOrd="2" destOrd="0"/>
+        <dgm:cxn modelId="8" srcId="0" destId="4" srcOrd="3" destOrd="0"/>
+      </dgm:cxnLst>
+      <dgm:bg/>
+      <dgm:whole/>
+    </dgm:dataModel>
+  </dgm:clrData>
+  <dgm:layoutNode name="Name0">
+    <dgm:varLst>
+      <dgm:dir/>
+      <dgm:resizeHandles val="exact"/>
+    </dgm:varLst>
+    <dgm:choose name="Name1">
+      <dgm:if name="Name2" func="var" arg="dir" op="equ" val="norm">
+        <dgm:alg type="lin"/>
+      </dgm:if>
+      <dgm:else name="Name3">
+        <dgm:alg type="lin">
+          <dgm:param type="linDir" val="fromR"/>
+        </dgm:alg>
+      </dgm:else>
+    </dgm:choose>
+    <dgm:shape xmlns:r="http://schemas.openxmlformats.org/officeDocument/2006/relationships" r:blip="">
+      <dgm:adjLst/>
+    </dgm:shape>
+    <dgm:presOf/>
+    <dgm:constrLst>
+      <dgm:constr type="w" for="ch" ptType="node" refType="w"/>
+      <dgm:constr type="h" for="ch" ptType="node" op="equ"/>
+      <dgm:constr type="primFontSz" for="ch" ptType="node" op="equ" val="65"/>
+      <dgm:constr type="w" for="ch" ptType="sibTrans" refType="w" refFor="ch" refPtType="node" op="equ" fact="0.4"/>
+      <dgm:constr type="h" for="ch" ptType="sibTrans" op="equ"/>
+      <dgm:constr type="primFontSz" for="des" forName="connectorText" op="equ" val="55"/>
+      <dgm:constr type="primFontSz" for="des" forName="connectorText" refType="primFontSz" refFor="ch" refPtType="node" op="lte" fact="0.8"/>
+    </dgm:constrLst>
+    <dgm:ruleLst/>
+    <dgm:forEach name="nodesForEach" axis="ch" ptType="node">
+      <dgm:layoutNode name="node">
+        <dgm:varLst>
+          <dgm:bulletEnabled val="1"/>
+        </dgm:varLst>
+        <dgm:alg type="tx"/>
+        <dgm:shape xmlns:r="http://schemas.openxmlformats.org/officeDocument/2006/relationships" type="roundRect" r:blip="">
+          <dgm:adjLst>
+            <dgm:adj idx="1" val="0.1"/>
+          </dgm:adjLst>
+        </dgm:shape>
+        <dgm:presOf axis="desOrSelf" ptType="node"/>
+        <dgm:constrLst>
+          <dgm:constr type="h" refType="w" fact="0.6"/>
+          <dgm:constr type="tMarg" refType="primFontSz" fact="0.3"/>
+          <dgm:constr type="bMarg" refType="primFontSz" fact="0.3"/>
+          <dgm:constr type="lMarg" refType="primFontSz" fact="0.3"/>
+          <dgm:constr type="rMarg" refType="primFontSz" fact="0.3"/>
+        </dgm:constrLst>
+        <dgm:ruleLst>
+          <dgm:rule type="primFontSz" val="18" fact="NaN" max="NaN"/>
+          <dgm:rule type="h" val="NaN" fact="1.5" max="NaN"/>
+          <dgm:rule type="primFontSz" val="5" fact="NaN" max="NaN"/>
+          <dgm:rule type="h" val="INF" fact="NaN" max="NaN"/>
+        </dgm:ruleLst>
+      </dgm:layoutNode>
+      <dgm:forEach name="sibTransForEach" axis="followSib" ptType="sibTrans" cnt="1">
+        <dgm:layoutNode name="sibTrans">
+          <dgm:alg type="conn">
+            <dgm:param type="begPts" val="auto"/>
+            <dgm:param type="endPts" val="auto"/>
+          </dgm:alg>
+          <dgm:shape xmlns:r="http://schemas.openxmlformats.org/officeDocument/2006/relationships" type="conn" r:blip="">
+            <dgm:adjLst/>
+          </dgm:shape>
+          <dgm:presOf axis="self"/>
+          <dgm:constrLst>
+            <dgm:constr type="h" refType="w" fact="0.62"/>
+            <dgm:constr type="connDist"/>
+            <dgm:constr type="begPad" refType="connDist" fact="0.25"/>
+            <dgm:constr type="endPad" refType="connDist" fact="0.22"/>
+          </dgm:constrLst>
+          <dgm:ruleLst/>
+          <dgm:layoutNode name="connectorText">
+            <dgm:alg type="tx">
+              <dgm:param type="autoTxRot" val="grav"/>
+            </dgm:alg>
+            <dgm:shape xmlns:r="http://schemas.openxmlformats.org/officeDocument/2006/relationships" type="conn" r:blip="" hideGeom="1">
+              <dgm:adjLst/>
+            </dgm:shape>
+            <dgm:presOf axis="self"/>
+            <dgm:constrLst>
+              <dgm:constr type="lMarg"/>
+              <dgm:constr type="rMarg"/>
+              <dgm:constr type="tMarg"/>
+              <dgm:constr type="bMarg"/>
+            </dgm:constrLst>
+            <dgm:ruleLst>
+              <dgm:rule type="primFontSz" val="5" fact="NaN" max="NaN"/>
+            </dgm:ruleLst>
+          </dgm:layoutNode>
+        </dgm:layoutNode>
+      </dgm:forEach>
+    </dgm:forEach>
+  </dgm:layoutNode>
+</dgm:layoutDef>
+</file>
+
+<file path=ppt/diagrams/quickStyle1.xml><?xml version="1.0" encoding="utf-8"?>
+<dgm:styleDef xmlns:dgm="http://schemas.openxmlformats.org/drawingml/2006/diagram" xmlns:a="http://schemas.openxmlformats.org/drawingml/2006/main" uniqueId="urn:microsoft.com/office/officeart/2005/8/quickstyle/simple1">
+  <dgm:title val=""/>
+  <dgm:desc val=""/>
+  <dgm:catLst>
+    <dgm:cat type="simple" pri="10100"/>
+  </dgm:catLst>
+  <dgm:scene3d>
+    <a:camera prst="orthographicFront"/>
+    <a:lightRig rig="threePt" dir="t"/>
+  </dgm:scene3d>
+  <dgm:styleLbl name="node0">
+    <dgm:scene3d>
+      <a:camera prst="orthographicFront"/>
+      <a:lightRig rig="threePt" dir="t"/>
+    </dgm:scene3d>
+    <dgm:sp3d/>
+    <dgm:txPr/>
+    <dgm:style>
+      <a:lnRef idx="2">
+        <a:scrgbClr r="0" g="0" b="0"/>
+      </a:lnRef>
+      <a:fillRef idx="1">
+        <a:scrgbClr r="0" g="0" b="0"/>
+      </a:fillRef>
+      <a:effectRef idx="0">
+        <a:scrgbClr r="0" g="0" b="0"/>
+      </a:effectRef>
+      <a:fontRef idx="minor">
+        <a:schemeClr val="lt1"/>
+      </a:fontRef>
+    </dgm:style>
+  </dgm:styleLbl>
+  <dgm:styleLbl name="lnNode1">
+    <dgm:scene3d>
+      <a:camera prst="orthographicFront"/>
+      <a:lightRig rig="threePt" dir="t"/>
+    </dgm:scene3d>
+    <dgm:sp3d/>
+    <dgm:txPr/>
+    <dgm:style>
+      <a:lnRef idx="2">
+        <a:scrgbClr r="0" g="0" b="0"/>
+      </a:lnRef>
+      <a:fillRef idx="1">
+        <a:scrgbClr r="0" g="0" b="0"/>
+      </a:fillRef>
+      <a:effectRef idx="0">
+        <a:scrgbClr r="0" g="0" b="0"/>
+      </a:effectRef>
+      <a:fontRef idx="minor">
+        <a:schemeClr val="lt1"/>
+      </a:fontRef>
+    </dgm:style>
+  </dgm:styleLbl>
+  <dgm:styleLbl name="vennNode1">
+    <dgm:scene3d>
+      <a:camera prst="orthographicFront"/>
+      <a:lightRig rig="threePt" dir="t"/>
+    </dgm:scene3d>
+    <dgm:sp3d/>
+    <dgm:txPr/>
+    <dgm:style>
+      <a:lnRef idx="2">
+        <a:scrgbClr r="0" g="0" b="0"/>
+      </a:lnRef>
+      <a:fillRef idx="1">
+        <a:scrgbClr r="0" g="0" b="0"/>
+      </a:fillRef>
+      <a:effectRef idx="0">
+        <a:scrgbClr r="0" g="0" b="0"/>
+      </a:effectRef>
+      <a:fontRef idx="minor">
+        <a:schemeClr val="tx1"/>
+      </a:fontRef>
+    </dgm:style>
+  </dgm:styleLbl>
+  <dgm:styleLbl name="alignNode1">
+    <dgm:scene3d>
+      <a:camera prst="orthographicFront"/>
+      <a:lightRig rig="threePt" dir="t"/>
+    </dgm:scene3d>
+    <dgm:sp3d/>
+    <dgm:txPr/>
+    <dgm:style>
+      <a:lnRef idx="2">
+        <a:scrgbClr r="0" g="0" b="0"/>
+      </a:lnRef>
+      <a:fillRef idx="1">
+        <a:scrgbClr r="0" g="0" b="0"/>
+      </a:fillRef>
+      <a:effectRef idx="0">
+        <a:scrgbClr r="0" g="0" b="0"/>
+      </a:effectRef>
+      <a:fontRef idx="minor">
+        <a:schemeClr val="lt1"/>
+      </a:fontRef>
+    </dgm:style>
+  </dgm:styleLbl>
+  <dgm:styleLbl name="node1">
+    <dgm:scene3d>
+      <a:camera prst="orthographicFront"/>
+      <a:lightRig rig="threePt" dir="t"/>
+    </dgm:scene3d>
+    <dgm:sp3d/>
+    <dgm:txPr/>
+    <dgm:style>
+      <a:lnRef idx="2">
+        <a:scrgbClr r="0" g="0" b="0"/>
+      </a:lnRef>
+      <a:fillRef idx="1">
+        <a:scrgbClr r="0" g="0" b="0"/>
+      </a:fillRef>
+      <a:effectRef idx="0">
+        <a:scrgbClr r="0" g="0" b="0"/>
+      </a:effectRef>
+      <a:fontRef idx="minor">
+        <a:schemeClr val="lt1"/>
+      </a:fontRef>
+    </dgm:style>
+  </dgm:styleLbl>
+  <dgm:styleLbl name="node2">
+    <dgm:scene3d>
+      <a:camera prst="orthographicFront"/>
+      <a:lightRig rig="threePt" dir="t"/>
+    </dgm:scene3d>
+    <dgm:sp3d/>
+    <dgm:txPr/>
+    <dgm:style>
+      <a:lnRef idx="2">
+        <a:scrgbClr r="0" g="0" b="0"/>
+      </a:lnRef>
+      <a:fillRef idx="1">
+        <a:scrgbClr r="0" g="0" b="0"/>
+      </a:fillRef>
+      <a:effectRef idx="0">
+        <a:scrgbClr r="0" g="0" b="0"/>
+      </a:effectRef>
+      <a:fontRef idx="minor">
+        <a:schemeClr val="lt1"/>
+      </a:fontRef>
+    </dgm:style>
+  </dgm:styleLbl>
+  <dgm:styleLbl name="node3">
+    <dgm:scene3d>
+      <a:camera prst="orthographicFront"/>
+      <a:lightRig rig="threePt" dir="t"/>
+    </dgm:scene3d>
+    <dgm:sp3d/>
+    <dgm:txPr/>
+    <dgm:style>
+      <a:lnRef idx="2">
+        <a:scrgbClr r="0" g="0" b="0"/>
+      </a:lnRef>
+      <a:fillRef idx="1">
+        <a:scrgbClr r="0" g="0" b="0"/>
+      </a:fillRef>
+      <a:effectRef idx="0">
+        <a:scrgbClr r="0" g="0" b="0"/>
+      </a:effectRef>
+      <a:fontRef idx="minor">
+        <a:schemeClr val="lt1"/>
+      </a:fontRef>
+    </dgm:style>
+  </dgm:styleLbl>
+  <dgm:styleLbl name="node4">
+    <dgm:scene3d>
+      <a:camera prst="orthographicFront"/>
+      <a:lightRig rig="threePt" dir="t"/>
+    </dgm:scene3d>
+    <dgm:sp3d/>
+    <dgm:txPr/>
+    <dgm:style>
+      <a:lnRef idx="2">
+        <a:scrgbClr r="0" g="0" b="0"/>
+      </a:lnRef>
+      <a:fillRef idx="1">
+        <a:scrgbClr r="0" g="0" b="0"/>
+      </a:fillRef>
+      <a:effectRef idx="0">
+        <a:scrgbClr r="0" g="0" b="0"/>
+      </a:effectRef>
+      <a:fontRef idx="minor">
+        <a:schemeClr val="lt1"/>
+      </a:fontRef>
+    </dgm:style>
+  </dgm:styleLbl>
+  <dgm:styleLbl name="fgImgPlace1">
+    <dgm:scene3d>
+      <a:camera prst="orthographicFront"/>
+      <a:lightRig rig="threePt" dir="t"/>
+    </dgm:scene3d>
+    <dgm:sp3d/>
+    <dgm:txPr/>
+    <dgm:style>
+      <a:lnRef idx="2">
+        <a:scrgbClr r="0" g="0" b="0"/>
+      </a:lnRef>
+      <a:fillRef idx="1">
+        <a:scrgbClr r="0" g="0" b="0"/>
+      </a:fillRef>
+      <a:effectRef idx="0">
+        <a:scrgbClr r="0" g="0" b="0"/>
+      </a:effectRef>
+      <a:fontRef idx="minor"/>
+    </dgm:style>
+  </dgm:styleLbl>
+  <dgm:styleLbl name="alignImgPlace1">
+    <dgm:scene3d>
+      <a:camera prst="orthographicFront"/>
+      <a:lightRig rig="threePt" dir="t"/>
+    </dgm:scene3d>
+    <dgm:sp3d/>
+    <dgm:txPr/>
+    <dgm:style>
+      <a:lnRef idx="2">
+        <a:scrgbClr r="0" g="0" b="0"/>
+      </a:lnRef>
+      <a:fillRef idx="1">
+        <a:scrgbClr r="0" g="0" b="0"/>
+      </a:fillRef>
+      <a:effectRef idx="0">
+        <a:scrgbClr r="0" g="0" b="0"/>
+      </a:effectRef>
+      <a:fontRef idx="minor"/>
+    </dgm:style>
+  </dgm:styleLbl>
+  <dgm:styleLbl name="bgImgPlace1">
+    <dgm:scene3d>
+      <a:camera prst="orthographicFront"/>
+      <a:lightRig rig="threePt" dir="t"/>
+    </dgm:scene3d>
+    <dgm:sp3d/>
+    <dgm:txPr/>
+    <dgm:style>
+      <a:lnRef idx="2">
+        <a:scrgbClr r="0" g="0" b="0"/>
+      </a:lnRef>
+      <a:fillRef idx="1">
+        <a:scrgbClr r="0" g="0" b="0"/>
+      </a:fillRef>
+      <a:effectRef idx="0">
+        <a:scrgbClr r="0" g="0" b="0"/>
+      </a:effectRef>
+      <a:fontRef idx="minor"/>
+    </dgm:style>
+  </dgm:styleLbl>
+  <dgm:styleLbl name="sibTrans2D1">
+    <dgm:scene3d>
+      <a:camera prst="orthographicFront"/>
+      <a:lightRig rig="threePt" dir="t"/>
+    </dgm:scene3d>
+    <dgm:sp3d/>
+    <dgm:txPr/>
+    <dgm:style>
+      <a:lnRef idx="0">
+        <a:scrgbClr r="0" g="0" b="0"/>
+      </a:lnRef>
+      <a:fillRef idx="1">
+        <a:scrgbClr r="0" g="0" b="0"/>
+      </a:fillRef>
+      <a:effectRef idx="0">
+        <a:scrgbClr r="0" g="0" b="0"/>
+      </a:effectRef>
+      <a:fontRef idx="minor">
+        <a:schemeClr val="lt1"/>
+      </a:fontRef>
+    </dgm:style>
+  </dgm:styleLbl>
+  <dgm:styleLbl name="fgSibTrans2D1">
+    <dgm:scene3d>
+      <a:camera prst="orthographicFront"/>
+      <a:lightRig rig="threePt" dir="t"/>
+    </dgm:scene3d>
+    <dgm:sp3d/>
+    <dgm:txPr/>
+    <dgm:style>
+      <a:lnRef idx="0">
+        <a:scrgbClr r="0" g="0" b="0"/>
+      </a:lnRef>
+      <a:fillRef idx="1">
+        <a:scrgbClr r="0" g="0" b="0"/>
+      </a:fillRef>
+      <a:effectRef idx="0">
+        <a:scrgbClr r="0" g="0" b="0"/>
+      </a:effectRef>
+      <a:fontRef idx="minor">
+        <a:schemeClr val="lt1"/>
+      </a:fontRef>
+    </dgm:style>
+  </dgm:styleLbl>
+  <dgm:styleLbl name="bgSibTrans2D1">
+    <dgm:scene3d>
+      <a:camera prst="orthographicFront"/>
+      <a:lightRig rig="threePt" dir="t"/>
+    </dgm:scene3d>
+    <dgm:sp3d/>
+    <dgm:txPr/>
+    <dgm:style>
+      <a:lnRef idx="0">
+        <a:scrgbClr r="0" g="0" b="0"/>
+      </a:lnRef>
+      <a:fillRef idx="1">
+        <a:scrgbClr r="0" g="0" b="0"/>
+      </a:fillRef>
+      <a:effectRef idx="0">
+        <a:scrgbClr r="0" g="0" b="0"/>
+      </a:effectRef>
+      <a:fontRef idx="minor">
+        <a:schemeClr val="lt1"/>
+      </a:fontRef>
+    </dgm:style>
+  </dgm:styleLbl>
+  <dgm:styleLbl name="sibTrans1D1">
+    <dgm:scene3d>
+      <a:camera prst="orthographicFront"/>
+      <a:lightRig rig="threePt" dir="t"/>
+    </dgm:scene3d>
+    <dgm:sp3d/>
+    <dgm:txPr/>
+    <dgm:style>
+      <a:lnRef idx="1">
+        <a:scrgbClr r="0" g="0" b="0"/>
+      </a:lnRef>
+      <a:fillRef idx="0">
+        <a:scrgbClr r="0" g="0" b="0"/>
+      </a:fillRef>
+      <a:effectRef idx="0">
+        <a:scrgbClr r="0" g="0" b="0"/>
+      </a:effectRef>
+      <a:fontRef idx="minor"/>
+    </dgm:style>
+  </dgm:styleLbl>
+  <dgm:styleLbl name="callout">
+    <dgm:scene3d>
+      <a:camera prst="orthographicFront"/>
+      <a:lightRig rig="threePt" dir="t"/>
+    </dgm:scene3d>
+    <dgm:sp3d/>
+    <dgm:txPr/>
+    <dgm:style>
+      <a:lnRef idx="2">
+        <a:scrgbClr r="0" g="0" b="0"/>
+      </a:lnRef>
+      <a:fillRef idx="1">
+        <a:scrgbClr r="0" g="0" b="0"/>
+      </a:fillRef>
+      <a:effectRef idx="0">
+        <a:scrgbClr r="0" g="0" b="0"/>
+      </a:effectRef>
+      <a:fontRef idx="minor"/>
+    </dgm:style>
+  </dgm:styleLbl>
+  <dgm:styleLbl name="asst0">
+    <dgm:scene3d>
+      <a:camera prst="orthographicFront"/>
+      <a:lightRig rig="threePt" dir="t"/>
+    </dgm:scene3d>
+    <dgm:sp3d/>
+    <dgm:txPr/>
+    <dgm:style>
+      <a:lnRef idx="2">
+        <a:scrgbClr r="0" g="0" b="0"/>
+      </a:lnRef>
+      <a:fillRef idx="1">
+        <a:scrgbClr r="0" g="0" b="0"/>
+      </a:fillRef>
+      <a:effectRef idx="0">
+        <a:scrgbClr r="0" g="0" b="0"/>
+      </a:effectRef>
+      <a:fontRef idx="minor">
+        <a:schemeClr val="lt1"/>
+      </a:fontRef>
+    </dgm:style>
+  </dgm:styleLbl>
+  <dgm:styleLbl name="asst1">
+    <dgm:scene3d>
+      <a:camera prst="orthographicFront"/>
+      <a:lightRig rig="threePt" dir="t"/>
+    </dgm:scene3d>
+    <dgm:sp3d/>
+    <dgm:txPr/>
+    <dgm:style>
+      <a:lnRef idx="2">
+        <a:scrgbClr r="0" g="0" b="0"/>
+      </a:lnRef>
+      <a:fillRef idx="1">
+        <a:scrgbClr r="0" g="0" b="0"/>
+      </a:fillRef>
+      <a:effectRef idx="0">
+        <a:scrgbClr r="0" g="0" b="0"/>
+      </a:effectRef>
+      <a:fontRef idx="minor">
+        <a:schemeClr val="lt1"/>
+      </a:fontRef>
+    </dgm:style>
+  </dgm:styleLbl>
+  <dgm:styleLbl name="asst2">
+    <dgm:scene3d>
+      <a:camera prst="orthographicFront"/>
+      <a:lightRig rig="threePt" dir="t"/>
+    </dgm:scene3d>
+    <dgm:sp3d/>
+    <dgm:txPr/>
+    <dgm:style>
+      <a:lnRef idx="2">
+        <a:scrgbClr r="0" g="0" b="0"/>
+      </a:lnRef>
+      <a:fillRef idx="1">
+        <a:scrgbClr r="0" g="0" b="0"/>
+      </a:fillRef>
+      <a:effectRef idx="0">
+        <a:scrgbClr r="0" g="0" b="0"/>
+      </a:effectRef>
+      <a:fontRef idx="minor">
+        <a:schemeClr val="lt1"/>
+      </a:fontRef>
+    </dgm:style>
+  </dgm:styleLbl>
+  <dgm:styleLbl name="asst3">
+    <dgm:scene3d>
+      <a:camera prst="orthographicFront"/>
+      <a:lightRig rig="threePt" dir="t"/>
+    </dgm:scene3d>
+    <dgm:sp3d/>
+    <dgm:txPr/>
+    <dgm:style>
+      <a:lnRef idx="2">
+        <a:scrgbClr r="0" g="0" b="0"/>
+      </a:lnRef>
+      <a:fillRef idx="1">
+        <a:scrgbClr r="0" g="0" b="0"/>
+      </a:fillRef>
+      <a:effectRef idx="0">
+        <a:scrgbClr r="0" g="0" b="0"/>
+      </a:effectRef>
+      <a:fontRef idx="minor">
+        <a:schemeClr val="lt1"/>
+      </a:fontRef>
+    </dgm:style>
+  </dgm:styleLbl>
+  <dgm:styleLbl name="asst4">
+    <dgm:scene3d>
+      <a:camera prst="orthographicFront"/>
+      <a:lightRig rig="threePt" dir="t"/>
+    </dgm:scene3d>
+    <dgm:sp3d/>
+    <dgm:txPr/>
+    <dgm:style>
+      <a:lnRef idx="2">
+        <a:scrgbClr r="0" g="0" b="0"/>
+      </a:lnRef>
+      <a:fillRef idx="1">
+        <a:scrgbClr r="0" g="0" b="0"/>
+      </a:fillRef>
+      <a:effectRef idx="0">
+        <a:scrgbClr r="0" g="0" b="0"/>
+      </a:effectRef>
+      <a:fontRef idx="minor">
+        <a:schemeClr val="lt1"/>
+      </a:fontRef>
+    </dgm:style>
+  </dgm:styleLbl>
+  <dgm:styleLbl name="parChTrans2D1">
+    <dgm:scene3d>
+      <a:camera prst="orthographicFront"/>
+      <a:lightRig rig="threePt" dir="t"/>
+    </dgm:scene3d>
+    <dgm:sp3d/>
+    <dgm:txPr/>
+    <dgm:style>
+      <a:lnRef idx="2">
+        <a:scrgbClr r="0" g="0" b="0"/>
+      </a:lnRef>
+      <a:fillRef idx="1">
+        <a:scrgbClr r="0" g="0" b="0"/>
+      </a:fillRef>
+      <a:effectRef idx="0">
+        <a:scrgbClr r="0" g="0" b="0"/>
+      </a:effectRef>
+      <a:fontRef idx="minor">
+        <a:schemeClr val="lt1"/>
+      </a:fontRef>
+    </dgm:style>
+  </dgm:styleLbl>
+  <dgm:styleLbl name="parChTrans2D2">
+    <dgm:scene3d>
+      <a:camera prst="orthographicFront"/>
+      <a:lightRig rig="threePt" dir="t"/>
+    </dgm:scene3d>
+    <dgm:sp3d/>
+    <dgm:txPr/>
+    <dgm:style>
+      <a:lnRef idx="2">
+        <a:scrgbClr r="0" g="0" b="0"/>
+      </a:lnRef>
+      <a:fillRef idx="1">
+        <a:scrgbClr r="0" g="0" b="0"/>
+      </a:fillRef>
+      <a:effectRef idx="0">
+        <a:scrgbClr r="0" g="0" b="0"/>
+      </a:effectRef>
+      <a:fontRef idx="minor">
+        <a:schemeClr val="lt1"/>
+      </a:fontRef>
+    </dgm:style>
+  </dgm:styleLbl>
+  <dgm:styleLbl name="parChTrans2D3">
+    <dgm:scene3d>
+      <a:camera prst="orthographicFront"/>
+      <a:lightRig rig="threePt" dir="t"/>
+    </dgm:scene3d>
+    <dgm:sp3d/>
+    <dgm:txPr/>
+    <dgm:style>
+      <a:lnRef idx="2">
+        <a:scrgbClr r="0" g="0" b="0"/>
+      </a:lnRef>
+      <a:fillRef idx="1">
+        <a:scrgbClr r="0" g="0" b="0"/>
+      </a:fillRef>
+      <a:effectRef idx="0">
+        <a:scrgbClr r="0" g="0" b="0"/>
+      </a:effectRef>
+      <a:fontRef idx="minor">
+        <a:schemeClr val="lt1"/>
+      </a:fontRef>
+    </dgm:style>
+  </dgm:styleLbl>
+  <dgm:styleLbl name="parChTrans2D4">
+    <dgm:scene3d>
+      <a:camera prst="orthographicFront"/>
+      <a:lightRig rig="threePt" dir="t"/>
+    </dgm:scene3d>
+    <dgm:sp3d/>
+    <dgm:txPr/>
+    <dgm:style>
+      <a:lnRef idx="2">
+        <a:scrgbClr r="0" g="0" b="0"/>
+      </a:lnRef>
+      <a:fillRef idx="1">
+        <a:scrgbClr r="0" g="0" b="0"/>
+      </a:fillRef>
+      <a:effectRef idx="0">
+        <a:scrgbClr r="0" g="0" b="0"/>
+      </a:effectRef>
+      <a:fontRef idx="minor">
+        <a:schemeClr val="lt1"/>
+      </a:fontRef>
+    </dgm:style>
+  </dgm:styleLbl>
+  <dgm:styleLbl name="parChTrans1D1">
+    <dgm:scene3d>
+      <a:camera prst="orthographicFront"/>
+      <a:lightRig rig="threePt" dir="t"/>
+    </dgm:scene3d>
+    <dgm:sp3d/>
+    <dgm:txPr/>
+    <dgm:style>
+      <a:lnRef idx="2">
+        <a:scrgbClr r="0" g="0" b="0"/>
+      </a:lnRef>
+      <a:fillRef idx="0">
+        <a:scrgbClr r="0" g="0" b="0"/>
+      </a:fillRef>
+      <a:effectRef idx="0">
+        <a:scrgbClr r="0" g="0" b="0"/>
+      </a:effectRef>
+      <a:fontRef idx="minor"/>
+    </dgm:style>
+  </dgm:styleLbl>
+  <dgm:styleLbl name="parChTrans1D2">
+    <dgm:scene3d>
+      <a:camera prst="orthographicFront"/>
+      <a:lightRig rig="threePt" dir="t"/>
+    </dgm:scene3d>
+    <dgm:sp3d/>
+    <dgm:txPr/>
+    <dgm:style>
+      <a:lnRef idx="2">
+        <a:scrgbClr r="0" g="0" b="0"/>
+      </a:lnRef>
+      <a:fillRef idx="0">
+        <a:scrgbClr r="0" g="0" b="0"/>
+      </a:fillRef>
+      <a:effectRef idx="0">
+        <a:scrgbClr r="0" g="0" b="0"/>
+      </a:effectRef>
+      <a:fontRef idx="minor"/>
+    </dgm:style>
+  </dgm:styleLbl>
+  <dgm:styleLbl name="parChTrans1D3">
+    <dgm:scene3d>
+      <a:camera prst="orthographicFront"/>
+      <a:lightRig rig="threePt" dir="t"/>
+    </dgm:scene3d>
+    <dgm:sp3d/>
+    <dgm:txPr/>
+    <dgm:style>
+      <a:lnRef idx="2">
+        <a:scrgbClr r="0" g="0" b="0"/>
+      </a:lnRef>
+      <a:fillRef idx="0">
+        <a:scrgbClr r="0" g="0" b="0"/>
+      </a:fillRef>
+      <a:effectRef idx="0">
+        <a:scrgbClr r="0" g="0" b="0"/>
+      </a:effectRef>
+      <a:fontRef idx="minor"/>
+    </dgm:style>
+  </dgm:styleLbl>
+  <dgm:styleLbl name="parChTrans1D4">
+    <dgm:scene3d>
+      <a:camera prst="orthographicFront"/>
+      <a:lightRig rig="threePt" dir="t"/>
+    </dgm:scene3d>
+    <dgm:sp3d/>
+    <dgm:txPr/>
+    <dgm:style>
+      <a:lnRef idx="2">
+        <a:scrgbClr r="0" g="0" b="0"/>
+      </a:lnRef>
+      <a:fillRef idx="0">
+        <a:scrgbClr r="0" g="0" b="0"/>
+      </a:fillRef>
+      <a:effectRef idx="0">
+        <a:scrgbClr r="0" g="0" b="0"/>
+      </a:effectRef>
+      <a:fontRef idx="minor"/>
+    </dgm:style>
+  </dgm:styleLbl>
+  <dgm:styleLbl name="fgAcc1">
+    <dgm:scene3d>
+      <a:camera prst="orthographicFront"/>
+      <a:lightRig rig="threePt" dir="t"/>
+    </dgm:scene3d>
+    <dgm:sp3d/>
+    <dgm:txPr/>
+    <dgm:style>
+      <a:lnRef idx="2">
+        <a:scrgbClr r="0" g="0" b="0"/>
+      </a:lnRef>
+      <a:fillRef idx="1">
+        <a:scrgbClr r="0" g="0" b="0"/>
+      </a:fillRef>
+      <a:effectRef idx="0">
+        <a:scrgbClr r="0" g="0" b="0"/>
+      </a:effectRef>
+      <a:fontRef idx="minor"/>
+    </dgm:style>
+  </dgm:styleLbl>
+  <dgm:styleLbl name="conFgAcc1">
+    <dgm:scene3d>
+      <a:camera prst="orthographicFront"/>
+      <a:lightRig rig="threePt" dir="t"/>
+    </dgm:scene3d>
+    <dgm:sp3d/>
+    <dgm:txPr/>
+    <dgm:style>
+      <a:lnRef idx="2">
+        <a:scrgbClr r="0" g="0" b="0"/>
+      </a:lnRef>
+      <a:fillRef idx="1">
+        <a:scrgbClr r="0" g="0" b="0"/>
+      </a:fillRef>
+      <a:effectRef idx="0">
+        <a:scrgbClr r="0" g="0" b="0"/>
+      </a:effectRef>
+      <a:fontRef idx="minor"/>
+    </dgm:style>
+  </dgm:styleLbl>
+  <dgm:styleLbl name="alignAcc1">
+    <dgm:scene3d>
+      <a:camera prst="orthographicFront"/>
+      <a:lightRig rig="threePt" dir="t"/>
+    </dgm:scene3d>
+    <dgm:sp3d/>
+    <dgm:txPr/>
+    <dgm:style>
+      <a:lnRef idx="2">
+        <a:scrgbClr r="0" g="0" b="0"/>
+      </a:lnRef>
+      <a:fillRef idx="1">
+        <a:scrgbClr r="0" g="0" b="0"/>
+      </a:fillRef>
+      <a:effectRef idx="0">
+        <a:scrgbClr r="0" g="0" b="0"/>
+      </a:effectRef>
+      <a:fontRef idx="minor"/>
+    </dgm:style>
+  </dgm:styleLbl>
+  <dgm:styleLbl name="trAlignAcc1">
+    <dgm:scene3d>
+      <a:camera prst="orthographicFront"/>
+      <a:lightRig rig="threePt" dir="t"/>
+    </dgm:scene3d>
+    <dgm:sp3d/>
+    <dgm:txPr/>
+    <dgm:style>
+      <a:lnRef idx="1">
+        <a:scrgbClr r="0" g="0" b="0"/>
+      </a:lnRef>
+      <a:fillRef idx="1">
+        <a:scrgbClr r="0" g="0" b="0"/>
+      </a:fillRef>
+      <a:effectRef idx="0">
+        <a:scrgbClr r="0" g="0" b="0"/>
+      </a:effectRef>
+      <a:fontRef idx="minor"/>
+    </dgm:style>
+  </dgm:styleLbl>
+  <dgm:styleLbl name="bgAcc1">
+    <dgm:scene3d>
+      <a:camera prst="orthographicFront"/>
+      <a:lightRig rig="threePt" dir="t"/>
+    </dgm:scene3d>
+    <dgm:sp3d/>
+    <dgm:txPr/>
+    <dgm:style>
+      <a:lnRef idx="2">
+        <a:scrgbClr r="0" g="0" b="0"/>
+      </a:lnRef>
+      <a:fillRef idx="1">
+        <a:scrgbClr r="0" g="0" b="0"/>
+      </a:fillRef>
+      <a:effectRef idx="0">
+        <a:scrgbClr r="0" g="0" b="0"/>
+      </a:effectRef>
+      <a:fontRef idx="minor"/>
+    </dgm:style>
+  </dgm:styleLbl>
+  <dgm:styleLbl name="solidFgAcc1">
+    <dgm:scene3d>
+      <a:camera prst="orthographicFront"/>
+      <a:lightRig rig="threePt" dir="t"/>
+    </dgm:scene3d>
+    <dgm:sp3d/>
+    <dgm:txPr/>
+    <dgm:style>
+      <a:lnRef idx="2">
+        <a:scrgbClr r="0" g="0" b="0"/>
+      </a:lnRef>
+      <a:fillRef idx="1">
+        <a:scrgbClr r="0" g="0" b="0"/>
+      </a:fillRef>
+      <a:effectRef idx="0">
+        <a:scrgbClr r="0" g="0" b="0"/>
+      </a:effectRef>
+      <a:fontRef idx="minor"/>
+    </dgm:style>
+  </dgm:styleLbl>
+  <dgm:styleLbl name="solidAlignAcc1">
+    <dgm:scene3d>
+      <a:camera prst="orthographicFront"/>
+      <a:lightRig rig="threePt" dir="t"/>
+    </dgm:scene3d>
+    <dgm:sp3d/>
+    <dgm:txPr/>
+    <dgm:style>
+      <a:lnRef idx="2">
+        <a:scrgbClr r="0" g="0" b="0"/>
+      </a:lnRef>
+      <a:fillRef idx="1">
+        <a:scrgbClr r="0" g="0" b="0"/>
+      </a:fillRef>
+      <a:effectRef idx="0">
+        <a:scrgbClr r="0" g="0" b="0"/>
+      </a:effectRef>
+      <a:fontRef idx="minor"/>
+    </dgm:style>
+  </dgm:styleLbl>
+  <dgm:styleLbl name="solidBgAcc1">
+    <dgm:scene3d>
+      <a:camera prst="orthographicFront"/>
+      <a:lightRig rig="threePt" dir="t"/>
+    </dgm:scene3d>
+    <dgm:sp3d/>
+    <dgm:txPr/>
+    <dgm:style>
+      <a:lnRef idx="2">
+        <a:scrgbClr r="0" g="0" b="0"/>
+      </a:lnRef>
+      <a:fillRef idx="1">
+        <a:scrgbClr r="0" g="0" b="0"/>
+      </a:fillRef>
+      <a:effectRef idx="0">
+        <a:scrgbClr r="0" g="0" b="0"/>
+      </a:effectRef>
+      <a:fontRef idx="minor"/>
+    </dgm:style>
+  </dgm:styleLbl>
+  <dgm:styleLbl name="fgAccFollowNode1">
+    <dgm:scene3d>
+      <a:camera prst="orthographicFront"/>
+      <a:lightRig rig="threePt" dir="t"/>
+    </dgm:scene3d>
+    <dgm:sp3d/>
+    <dgm:txPr/>
+    <dgm:style>
+      <a:lnRef idx="2">
+        <a:scrgbClr r="0" g="0" b="0"/>
+      </a:lnRef>
+      <a:fillRef idx="1">
+        <a:scrgbClr r="0" g="0" b="0"/>
+      </a:fillRef>
+      <a:effectRef idx="0">
+        <a:scrgbClr r="0" g="0" b="0"/>
+      </a:effectRef>
+      <a:fontRef idx="minor"/>
+    </dgm:style>
+  </dgm:styleLbl>
+  <dgm:styleLbl name="alignAccFollowNode1">
+    <dgm:scene3d>
+      <a:camera prst="orthographicFront"/>
+      <a:lightRig rig="threePt" dir="t"/>
+    </dgm:scene3d>
+    <dgm:sp3d/>
+    <dgm:txPr/>
+    <dgm:style>
+      <a:lnRef idx="2">
+        <a:scrgbClr r="0" g="0" b="0"/>
+      </a:lnRef>
+      <a:fillRef idx="1">
+        <a:scrgbClr r="0" g="0" b="0"/>
+      </a:fillRef>
+      <a:effectRef idx="0">
+        <a:scrgbClr r="0" g="0" b="0"/>
+      </a:effectRef>
+      <a:fontRef idx="minor"/>
+    </dgm:style>
+  </dgm:styleLbl>
+  <dgm:styleLbl name="bgAccFollowNode1">
+    <dgm:scene3d>
+      <a:camera prst="orthographicFront"/>
+      <a:lightRig rig="threePt" dir="t"/>
+    </dgm:scene3d>
+    <dgm:sp3d/>
+    <dgm:txPr/>
+    <dgm:style>
+      <a:lnRef idx="2">
+        <a:scrgbClr r="0" g="0" b="0"/>
+      </a:lnRef>
+      <a:fillRef idx="1">
+        <a:scrgbClr r="0" g="0" b="0"/>
+      </a:fillRef>
+      <a:effectRef idx="0">
+        <a:scrgbClr r="0" g="0" b="0"/>
+      </a:effectRef>
+      <a:fontRef idx="minor"/>
+    </dgm:style>
+  </dgm:styleLbl>
+  <dgm:styleLbl name="fgAcc0">
+    <dgm:scene3d>
+      <a:camera prst="orthographicFront"/>
+      <a:lightRig rig="threePt" dir="t"/>
+    </dgm:scene3d>
+    <dgm:sp3d/>
+    <dgm:txPr/>
+    <dgm:style>
+      <a:lnRef idx="2">
+        <a:scrgbClr r="0" g="0" b="0"/>
+      </a:lnRef>
+      <a:fillRef idx="1">
+        <a:scrgbClr r="0" g="0" b="0"/>
+      </a:fillRef>
+      <a:effectRef idx="0">
+        <a:scrgbClr r="0" g="0" b="0"/>
+      </a:effectRef>
+      <a:fontRef idx="minor"/>
+    </dgm:style>
+  </dgm:styleLbl>
+  <dgm:styleLbl name="fgAcc2">
+    <dgm:scene3d>
+      <a:camera prst="orthographicFront"/>
+      <a:lightRig rig="threePt" dir="t"/>
+    </dgm:scene3d>
+    <dgm:sp3d/>
+    <dgm:txPr/>
+    <dgm:style>
+      <a:lnRef idx="2">
+        <a:scrgbClr r="0" g="0" b="0"/>
+      </a:lnRef>
+      <a:fillRef idx="1">
+        <a:scrgbClr r="0" g="0" b="0"/>
+      </a:fillRef>
+      <a:effectRef idx="0">
+        <a:scrgbClr r="0" g="0" b="0"/>
+      </a:effectRef>
+      <a:fontRef idx="minor"/>
+    </dgm:style>
+  </dgm:styleLbl>
+  <dgm:styleLbl name="fgAcc3">
+    <dgm:scene3d>
+      <a:camera prst="orthographicFront"/>
+      <a:lightRig rig="threePt" dir="t"/>
+    </dgm:scene3d>
+    <dgm:sp3d/>
+    <dgm:txPr/>
+    <dgm:style>
+      <a:lnRef idx="2">
+        <a:scrgbClr r="0" g="0" b="0"/>
+      </a:lnRef>
+      <a:fillRef idx="1">
+        <a:scrgbClr r="0" g="0" b="0"/>
+      </a:fillRef>
+      <a:effectRef idx="0">
+        <a:scrgbClr r="0" g="0" b="0"/>
+      </a:effectRef>
+      <a:fontRef idx="minor"/>
+    </dgm:style>
+  </dgm:styleLbl>
+  <dgm:styleLbl name="fgAcc4">
+    <dgm:scene3d>
+      <a:camera prst="orthographicFront"/>
+      <a:lightRig rig="threePt" dir="t"/>
+    </dgm:scene3d>
+    <dgm:sp3d/>
+    <dgm:txPr/>
+    <dgm:style>
+      <a:lnRef idx="2">
+        <a:scrgbClr r="0" g="0" b="0"/>
+      </a:lnRef>
+      <a:fillRef idx="1">
+        <a:scrgbClr r="0" g="0" b="0"/>
+      </a:fillRef>
+      <a:effectRef idx="0">
+        <a:scrgbClr r="0" g="0" b="0"/>
+      </a:effectRef>
+      <a:fontRef idx="minor"/>
+    </dgm:style>
+  </dgm:styleLbl>
+  <dgm:styleLbl name="bgShp">
+    <dgm:scene3d>
+      <a:camera prst="orthographicFront"/>
+      <a:lightRig rig="threePt" dir="t"/>
+    </dgm:scene3d>
+    <dgm:sp3d/>
+    <dgm:txPr/>
+    <dgm:style>
+      <a:lnRef idx="0">
+        <a:scrgbClr r="0" g="0" b="0"/>
+      </a:lnRef>
+      <a:fillRef idx="1">
+        <a:scrgbClr r="0" g="0" b="0"/>
+      </a:fillRef>
+      <a:effectRef idx="0">
+        <a:scrgbClr r="0" g="0" b="0"/>
+      </a:effectRef>
+      <a:fontRef idx="minor"/>
+    </dgm:style>
+  </dgm:styleLbl>
+  <dgm:styleLbl name="dkBgShp">
+    <dgm:scene3d>
+      <a:camera prst="orthographicFront"/>
+      <a:lightRig rig="threePt" dir="t"/>
+    </dgm:scene3d>
+    <dgm:sp3d/>
+    <dgm:txPr/>
+    <dgm:style>
+      <a:lnRef idx="0">
+        <a:scrgbClr r="0" g="0" b="0"/>
+      </a:lnRef>
+      <a:fillRef idx="1">
+        <a:scrgbClr r="0" g="0" b="0"/>
+      </a:fillRef>
+      <a:effectRef idx="0">
+        <a:scrgbClr r="0" g="0" b="0"/>
+      </a:effectRef>
+      <a:fontRef idx="minor"/>
+    </dgm:style>
+  </dgm:styleLbl>
+  <dgm:styleLbl name="trBgShp">
+    <dgm:scene3d>
+      <a:camera prst="orthographicFront"/>
+      <a:lightRig rig="threePt" dir="t"/>
+    </dgm:scene3d>
+    <dgm:sp3d/>
+    <dgm:txPr/>
+    <dgm:style>
+      <a:lnRef idx="0">
+        <a:scrgbClr r="0" g="0" b="0"/>
+      </a:lnRef>
+      <a:fillRef idx="1">
+        <a:scrgbClr r="0" g="0" b="0"/>
+      </a:fillRef>
+      <a:effectRef idx="0">
+        <a:scrgbClr r="0" g="0" b="0"/>
+      </a:effectRef>
+      <a:fontRef idx="minor"/>
+    </dgm:style>
+  </dgm:styleLbl>
+  <dgm:styleLbl name="fgShp">
+    <dgm:scene3d>
+      <a:camera prst="orthographicFront"/>
+      <a:lightRig rig="threePt" dir="t"/>
+    </dgm:scene3d>
+    <dgm:sp3d/>
+    <dgm:txPr/>
+    <dgm:style>
+      <a:lnRef idx="2">
+        <a:scrgbClr r="0" g="0" b="0"/>
+      </a:lnRef>
+      <a:fillRef idx="1">
+        <a:scrgbClr r="0" g="0" b="0"/>
+      </a:fillRef>
+      <a:effectRef idx="0">
+        <a:scrgbClr r="0" g="0" b="0"/>
+      </a:effectRef>
+      <a:fontRef idx="minor"/>
+    </dgm:style>
+  </dgm:styleLbl>
+  <dgm:styleLbl name="revTx">
+    <dgm:scene3d>
+      <a:camera prst="orthographicFront"/>
+      <a:lightRig rig="threePt" dir="t"/>
+    </dgm:scene3d>
+    <dgm:sp3d/>
+    <dgm:txPr/>
+    <dgm:style>
+      <a:lnRef idx="0">
+        <a:scrgbClr r="0" g="0" b="0"/>
+      </a:lnRef>
+      <a:fillRef idx="0">
+        <a:scrgbClr r="0" g="0" b="0"/>
+      </a:fillRef>
+      <a:effectRef idx="0">
+        <a:scrgbClr r="0" g="0" b="0"/>
+      </a:effectRef>
+      <a:fontRef idx="minor"/>
+    </dgm:style>
+  </dgm:styleLbl>
+</dgm:styleDef>
 </file>
 
 <file path=ppt/slideLayouts/slideLayout1.xml><?xml version="1.0" encoding="utf-8"?>
@@ -3431,6 +6157,1020 @@
           <a:chExt cx="0" cy="0"/>
         </a:xfrm>
       </p:grpSpPr>
+      <p:sp>
+        <p:nvSpPr>
+          <p:cNvPr id="5" name="Title 4">
+            <a:extLst>
+              <a:ext uri="{FF2B5EF4-FFF2-40B4-BE49-F238E27FC236}">
+                <a16:creationId xmlns:a16="http://schemas.microsoft.com/office/drawing/2014/main" id="{033B78F1-892C-1A40-B14A-E7D785E893C4}"/>
+              </a:ext>
+            </a:extLst>
+          </p:cNvPr>
+          <p:cNvSpPr>
+            <a:spLocks noGrp="1"/>
+          </p:cNvSpPr>
+          <p:nvPr>
+            <p:ph type="title"/>
+          </p:nvPr>
+        </p:nvSpPr>
+        <p:spPr/>
+        <p:txBody>
+          <a:bodyPr/>
+          <a:lstStyle/>
+          <a:p>
+            <a:r>
+              <a:rPr lang="en-US" dirty="0"/>
+              <a:t>4) Analysis of feature importance</a:t>
+            </a:r>
+          </a:p>
+        </p:txBody>
+      </p:sp>
+      <p:sp>
+        <p:nvSpPr>
+          <p:cNvPr id="10" name="Rectangle 9">
+            <a:extLst>
+              <a:ext uri="{FF2B5EF4-FFF2-40B4-BE49-F238E27FC236}">
+                <a16:creationId xmlns:a16="http://schemas.microsoft.com/office/drawing/2014/main" id="{4C23B152-D3F0-0E4C-BD20-CC625C7AECDD}"/>
+              </a:ext>
+            </a:extLst>
+          </p:cNvPr>
+          <p:cNvSpPr/>
+          <p:nvPr/>
+        </p:nvSpPr>
+        <p:spPr>
+          <a:xfrm>
+            <a:off x="3873850" y="1937781"/>
+            <a:ext cx="3101546" cy="3237464"/>
+          </a:xfrm>
+          <a:prstGeom prst="rect">
+            <a:avLst/>
+          </a:prstGeom>
+        </p:spPr>
+        <p:style>
+          <a:lnRef idx="2">
+            <a:schemeClr val="accent1">
+              <a:shade val="50000"/>
+            </a:schemeClr>
+          </a:lnRef>
+          <a:fillRef idx="1">
+            <a:schemeClr val="accent1"/>
+          </a:fillRef>
+          <a:effectRef idx="0">
+            <a:schemeClr val="accent1"/>
+          </a:effectRef>
+          <a:fontRef idx="minor">
+            <a:schemeClr val="lt1"/>
+          </a:fontRef>
+        </p:style>
+        <p:txBody>
+          <a:bodyPr rtlCol="0" anchor="ctr"/>
+          <a:lstStyle/>
+          <a:p>
+            <a:pPr algn="ctr"/>
+            <a:r>
+              <a:rPr lang="en-US" sz="2800" b="1" dirty="0"/>
+              <a:t>Performance Output Function</a:t>
+            </a:r>
+          </a:p>
+          <a:p>
+            <a:pPr algn="ctr"/>
+            <a:endParaRPr lang="en-US" dirty="0"/>
+          </a:p>
+        </p:txBody>
+      </p:sp>
+      <p:cxnSp>
+        <p:nvCxnSpPr>
+          <p:cNvPr id="11" name="Straight Arrow Connector 10">
+            <a:extLst>
+              <a:ext uri="{FF2B5EF4-FFF2-40B4-BE49-F238E27FC236}">
+                <a16:creationId xmlns:a16="http://schemas.microsoft.com/office/drawing/2014/main" id="{1E1DF40A-E274-CC40-8EAA-31E73F873AF8}"/>
+              </a:ext>
+            </a:extLst>
+          </p:cNvPr>
+          <p:cNvCxnSpPr/>
+          <p:nvPr/>
+        </p:nvCxnSpPr>
+        <p:spPr>
+          <a:xfrm>
+            <a:off x="2508423" y="2613455"/>
+            <a:ext cx="1124464" cy="0"/>
+          </a:xfrm>
+          <a:prstGeom prst="straightConnector1">
+            <a:avLst/>
+          </a:prstGeom>
+          <a:ln>
+            <a:tailEnd type="triangle"/>
+          </a:ln>
+        </p:spPr>
+        <p:style>
+          <a:lnRef idx="1">
+            <a:schemeClr val="accent1"/>
+          </a:lnRef>
+          <a:fillRef idx="0">
+            <a:schemeClr val="accent1"/>
+          </a:fillRef>
+          <a:effectRef idx="0">
+            <a:schemeClr val="accent1"/>
+          </a:effectRef>
+          <a:fontRef idx="minor">
+            <a:schemeClr val="tx1"/>
+          </a:fontRef>
+        </p:style>
+      </p:cxnSp>
+      <p:cxnSp>
+        <p:nvCxnSpPr>
+          <p:cNvPr id="12" name="Straight Arrow Connector 11">
+            <a:extLst>
+              <a:ext uri="{FF2B5EF4-FFF2-40B4-BE49-F238E27FC236}">
+                <a16:creationId xmlns:a16="http://schemas.microsoft.com/office/drawing/2014/main" id="{7FE3C7AF-3AAB-C84C-AC65-9D8993A953C7}"/>
+              </a:ext>
+            </a:extLst>
+          </p:cNvPr>
+          <p:cNvCxnSpPr/>
+          <p:nvPr/>
+        </p:nvCxnSpPr>
+        <p:spPr>
+          <a:xfrm>
+            <a:off x="7216352" y="2520780"/>
+            <a:ext cx="1124464" cy="0"/>
+          </a:xfrm>
+          <a:prstGeom prst="straightConnector1">
+            <a:avLst/>
+          </a:prstGeom>
+          <a:ln>
+            <a:tailEnd type="triangle"/>
+          </a:ln>
+        </p:spPr>
+        <p:style>
+          <a:lnRef idx="1">
+            <a:schemeClr val="accent1"/>
+          </a:lnRef>
+          <a:fillRef idx="0">
+            <a:schemeClr val="accent1"/>
+          </a:fillRef>
+          <a:effectRef idx="0">
+            <a:schemeClr val="accent1"/>
+          </a:effectRef>
+          <a:fontRef idx="minor">
+            <a:schemeClr val="tx1"/>
+          </a:fontRef>
+        </p:style>
+      </p:cxnSp>
+      <p:sp>
+        <p:nvSpPr>
+          <p:cNvPr id="15" name="TextBox 14">
+            <a:extLst>
+              <a:ext uri="{FF2B5EF4-FFF2-40B4-BE49-F238E27FC236}">
+                <a16:creationId xmlns:a16="http://schemas.microsoft.com/office/drawing/2014/main" id="{D9B08230-DFF5-284C-BD8A-5602F4D7B711}"/>
+              </a:ext>
+            </a:extLst>
+          </p:cNvPr>
+          <p:cNvSpPr txBox="1"/>
+          <p:nvPr/>
+        </p:nvSpPr>
+        <p:spPr>
+          <a:xfrm>
+            <a:off x="8489095" y="2032001"/>
+            <a:ext cx="2323070" cy="646331"/>
+          </a:xfrm>
+          <a:prstGeom prst="rect">
+            <a:avLst/>
+          </a:prstGeom>
+          <a:noFill/>
+        </p:spPr>
+        <p:txBody>
+          <a:bodyPr wrap="square" rtlCol="0">
+            <a:spAutoFit/>
+          </a:bodyPr>
+          <a:lstStyle/>
+          <a:p>
+            <a:r>
+              <a:rPr lang="en-US" dirty="0" err="1"/>
+              <a:t>Coeficients</a:t>
+            </a:r>
+            <a:endParaRPr lang="en-US" dirty="0"/>
+          </a:p>
+          <a:p>
+            <a:r>
+              <a:rPr lang="en-US" dirty="0"/>
+              <a:t>Trees</a:t>
+            </a:r>
+          </a:p>
+        </p:txBody>
+      </p:sp>
+      <p:sp>
+        <p:nvSpPr>
+          <p:cNvPr id="8" name="TextBox 7">
+            <a:extLst>
+              <a:ext uri="{FF2B5EF4-FFF2-40B4-BE49-F238E27FC236}">
+                <a16:creationId xmlns:a16="http://schemas.microsoft.com/office/drawing/2014/main" id="{7DB971E1-D06F-BB4C-A9F5-04E9D18E0AD9}"/>
+              </a:ext>
+            </a:extLst>
+          </p:cNvPr>
+          <p:cNvSpPr txBox="1"/>
+          <p:nvPr/>
+        </p:nvSpPr>
+        <p:spPr>
+          <a:xfrm>
+            <a:off x="590039" y="2383917"/>
+            <a:ext cx="2323070" cy="369332"/>
+          </a:xfrm>
+          <a:prstGeom prst="rect">
+            <a:avLst/>
+          </a:prstGeom>
+          <a:noFill/>
+        </p:spPr>
+        <p:txBody>
+          <a:bodyPr wrap="square" rtlCol="0">
+            <a:spAutoFit/>
+          </a:bodyPr>
+          <a:lstStyle/>
+          <a:p>
+            <a:r>
+              <a:rPr lang="en-US" dirty="0" err="1"/>
+              <a:t>Adaboost</a:t>
+            </a:r>
+            <a:r>
+              <a:rPr lang="en-US" dirty="0"/>
+              <a:t> model</a:t>
+            </a:r>
+          </a:p>
+        </p:txBody>
+      </p:sp>
+    </p:spTree>
+    <p:extLst>
+      <p:ext uri="{BB962C8B-B14F-4D97-AF65-F5344CB8AC3E}">
+        <p14:creationId xmlns:p14="http://schemas.microsoft.com/office/powerpoint/2010/main" val="3213189194"/>
+      </p:ext>
+    </p:extLst>
+  </p:cSld>
+  <p:clrMapOvr>
+    <a:masterClrMapping/>
+  </p:clrMapOvr>
+</p:sld>
+</file>
+
+<file path=ppt/slides/slide11.xml><?xml version="1.0" encoding="utf-8"?>
+<p:sld xmlns:a="http://schemas.openxmlformats.org/drawingml/2006/main" xmlns:r="http://schemas.openxmlformats.org/officeDocument/2006/relationships" xmlns:p="http://schemas.openxmlformats.org/presentationml/2006/main">
+  <p:cSld>
+    <p:spTree>
+      <p:nvGrpSpPr>
+        <p:cNvPr id="1" name=""/>
+        <p:cNvGrpSpPr/>
+        <p:nvPr/>
+      </p:nvGrpSpPr>
+      <p:grpSpPr>
+        <a:xfrm>
+          <a:off x="0" y="0"/>
+          <a:ext cx="0" cy="0"/>
+          <a:chOff x="0" y="0"/>
+          <a:chExt cx="0" cy="0"/>
+        </a:xfrm>
+      </p:grpSpPr>
+      <p:sp>
+        <p:nvSpPr>
+          <p:cNvPr id="2" name="Title 1">
+            <a:extLst>
+              <a:ext uri="{FF2B5EF4-FFF2-40B4-BE49-F238E27FC236}">
+                <a16:creationId xmlns:a16="http://schemas.microsoft.com/office/drawing/2014/main" id="{CC46D4D4-584B-454B-8ACE-518E466DBB52}"/>
+              </a:ext>
+            </a:extLst>
+          </p:cNvPr>
+          <p:cNvSpPr>
+            <a:spLocks noGrp="1"/>
+          </p:cNvSpPr>
+          <p:nvPr>
+            <p:ph type="title"/>
+          </p:nvPr>
+        </p:nvSpPr>
+        <p:spPr/>
+        <p:txBody>
+          <a:bodyPr/>
+          <a:lstStyle/>
+          <a:p>
+            <a:r>
+              <a:rPr lang="en-US" dirty="0"/>
+              <a:t>FINAL MODEL SHOULD CALCULATE VALUE OF THE TOKEN EVERY DAY</a:t>
+            </a:r>
+          </a:p>
+        </p:txBody>
+      </p:sp>
+      <p:sp>
+        <p:nvSpPr>
+          <p:cNvPr id="7" name="Rectangle 6">
+            <a:extLst>
+              <a:ext uri="{FF2B5EF4-FFF2-40B4-BE49-F238E27FC236}">
+                <a16:creationId xmlns:a16="http://schemas.microsoft.com/office/drawing/2014/main" id="{AE946F25-5DAE-1F45-B34F-0979B5B15031}"/>
+              </a:ext>
+            </a:extLst>
+          </p:cNvPr>
+          <p:cNvSpPr/>
+          <p:nvPr/>
+        </p:nvSpPr>
+        <p:spPr>
+          <a:xfrm>
+            <a:off x="1365429" y="3731741"/>
+            <a:ext cx="3101546" cy="1900704"/>
+          </a:xfrm>
+          <a:prstGeom prst="rect">
+            <a:avLst/>
+          </a:prstGeom>
+        </p:spPr>
+        <p:style>
+          <a:lnRef idx="2">
+            <a:schemeClr val="accent1">
+              <a:shade val="50000"/>
+            </a:schemeClr>
+          </a:lnRef>
+          <a:fillRef idx="1">
+            <a:schemeClr val="accent1"/>
+          </a:fillRef>
+          <a:effectRef idx="0">
+            <a:schemeClr val="accent1"/>
+          </a:effectRef>
+          <a:fontRef idx="minor">
+            <a:schemeClr val="lt1"/>
+          </a:fontRef>
+        </p:style>
+        <p:txBody>
+          <a:bodyPr rtlCol="0" anchor="ctr"/>
+          <a:lstStyle/>
+          <a:p>
+            <a:pPr algn="ctr"/>
+            <a:r>
+              <a:rPr lang="en-US" sz="2800" b="1" dirty="0"/>
+              <a:t>VIXCOIN Token Prediction and Valuation Function</a:t>
+            </a:r>
+            <a:endParaRPr lang="en-US" dirty="0"/>
+          </a:p>
+        </p:txBody>
+      </p:sp>
+      <p:cxnSp>
+        <p:nvCxnSpPr>
+          <p:cNvPr id="9" name="Straight Arrow Connector 8">
+            <a:extLst>
+              <a:ext uri="{FF2B5EF4-FFF2-40B4-BE49-F238E27FC236}">
+                <a16:creationId xmlns:a16="http://schemas.microsoft.com/office/drawing/2014/main" id="{ADBA7AB5-E5E0-E946-8378-2ED5E21C3C45}"/>
+              </a:ext>
+            </a:extLst>
+          </p:cNvPr>
+          <p:cNvCxnSpPr>
+            <a:stCxn id="7" idx="3"/>
+          </p:cNvCxnSpPr>
+          <p:nvPr/>
+        </p:nvCxnSpPr>
+        <p:spPr>
+          <a:xfrm>
+            <a:off x="4466975" y="4682093"/>
+            <a:ext cx="834074" cy="0"/>
+          </a:xfrm>
+          <a:prstGeom prst="straightConnector1">
+            <a:avLst/>
+          </a:prstGeom>
+          <a:ln>
+            <a:tailEnd type="triangle"/>
+          </a:ln>
+        </p:spPr>
+        <p:style>
+          <a:lnRef idx="1">
+            <a:schemeClr val="accent1"/>
+          </a:lnRef>
+          <a:fillRef idx="0">
+            <a:schemeClr val="accent1"/>
+          </a:fillRef>
+          <a:effectRef idx="0">
+            <a:schemeClr val="accent1"/>
+          </a:effectRef>
+          <a:fontRef idx="minor">
+            <a:schemeClr val="tx1"/>
+          </a:fontRef>
+        </p:style>
+      </p:cxnSp>
+      <p:sp>
+        <p:nvSpPr>
+          <p:cNvPr id="10" name="TextBox 9">
+            <a:extLst>
+              <a:ext uri="{FF2B5EF4-FFF2-40B4-BE49-F238E27FC236}">
+                <a16:creationId xmlns:a16="http://schemas.microsoft.com/office/drawing/2014/main" id="{670402CB-0FA7-3E4D-9C10-CFF5532C5DC5}"/>
+              </a:ext>
+            </a:extLst>
+          </p:cNvPr>
+          <p:cNvSpPr txBox="1"/>
+          <p:nvPr/>
+        </p:nvSpPr>
+        <p:spPr>
+          <a:xfrm>
+            <a:off x="5572896" y="4081928"/>
+            <a:ext cx="4547287" cy="1477328"/>
+          </a:xfrm>
+          <a:prstGeom prst="rect">
+            <a:avLst/>
+          </a:prstGeom>
+          <a:noFill/>
+        </p:spPr>
+        <p:txBody>
+          <a:bodyPr wrap="square" rtlCol="0">
+            <a:spAutoFit/>
+          </a:bodyPr>
+          <a:lstStyle/>
+          <a:p>
+            <a:r>
+              <a:rPr lang="en-US" dirty="0"/>
+              <a:t>*Signal predicted for the next day (0 or 1)</a:t>
+            </a:r>
+          </a:p>
+          <a:p>
+            <a:r>
+              <a:rPr lang="en-US" dirty="0"/>
+              <a:t>*Value of token on date and time</a:t>
+            </a:r>
+          </a:p>
+          <a:p>
+            <a:r>
+              <a:rPr lang="en-US" dirty="0"/>
+              <a:t>*</a:t>
+            </a:r>
+            <a:r>
+              <a:rPr lang="en-US" dirty="0" err="1"/>
+              <a:t>DataFrame</a:t>
+            </a:r>
+            <a:r>
+              <a:rPr lang="en-US" dirty="0"/>
+              <a:t> with all historical values</a:t>
+            </a:r>
+          </a:p>
+          <a:p>
+            <a:endParaRPr lang="en-US" dirty="0"/>
+          </a:p>
+          <a:p>
+            <a:r>
+              <a:rPr lang="en-US" dirty="0"/>
+              <a:t>*</a:t>
+            </a:r>
+            <a:r>
+              <a:rPr lang="en-US" dirty="0" err="1"/>
+              <a:t>Dataframe</a:t>
+            </a:r>
+            <a:r>
+              <a:rPr lang="en-US" dirty="0"/>
+              <a:t> with all historical signals</a:t>
+            </a:r>
+          </a:p>
+        </p:txBody>
+      </p:sp>
+      <p:cxnSp>
+        <p:nvCxnSpPr>
+          <p:cNvPr id="11" name="Straight Arrow Connector 10">
+            <a:extLst>
+              <a:ext uri="{FF2B5EF4-FFF2-40B4-BE49-F238E27FC236}">
+                <a16:creationId xmlns:a16="http://schemas.microsoft.com/office/drawing/2014/main" id="{AEB2663B-5A0E-2249-92BF-33F8FC00BA87}"/>
+              </a:ext>
+            </a:extLst>
+          </p:cNvPr>
+          <p:cNvCxnSpPr>
+            <a:cxnSpLocks/>
+          </p:cNvCxnSpPr>
+          <p:nvPr/>
+        </p:nvCxnSpPr>
+        <p:spPr>
+          <a:xfrm>
+            <a:off x="2395166" y="2832698"/>
+            <a:ext cx="0" cy="899043"/>
+          </a:xfrm>
+          <a:prstGeom prst="straightConnector1">
+            <a:avLst/>
+          </a:prstGeom>
+          <a:ln>
+            <a:tailEnd type="triangle"/>
+          </a:ln>
+        </p:spPr>
+        <p:style>
+          <a:lnRef idx="1">
+            <a:schemeClr val="accent1"/>
+          </a:lnRef>
+          <a:fillRef idx="0">
+            <a:schemeClr val="accent1"/>
+          </a:fillRef>
+          <a:effectRef idx="0">
+            <a:schemeClr val="accent1"/>
+          </a:effectRef>
+          <a:fontRef idx="minor">
+            <a:schemeClr val="tx1"/>
+          </a:fontRef>
+        </p:style>
+      </p:cxnSp>
+      <p:sp>
+        <p:nvSpPr>
+          <p:cNvPr id="13" name="TextBox 12">
+            <a:extLst>
+              <a:ext uri="{FF2B5EF4-FFF2-40B4-BE49-F238E27FC236}">
+                <a16:creationId xmlns:a16="http://schemas.microsoft.com/office/drawing/2014/main" id="{789953DC-9D8B-A94C-8357-70F71AE6B8E2}"/>
+              </a:ext>
+            </a:extLst>
+          </p:cNvPr>
+          <p:cNvSpPr txBox="1"/>
+          <p:nvPr/>
+        </p:nvSpPr>
+        <p:spPr>
+          <a:xfrm>
+            <a:off x="1507531" y="2463366"/>
+            <a:ext cx="2817341" cy="646331"/>
+          </a:xfrm>
+          <a:prstGeom prst="rect">
+            <a:avLst/>
+          </a:prstGeom>
+          <a:noFill/>
+        </p:spPr>
+        <p:txBody>
+          <a:bodyPr wrap="square" rtlCol="0">
+            <a:spAutoFit/>
+          </a:bodyPr>
+          <a:lstStyle/>
+          <a:p>
+            <a:r>
+              <a:rPr lang="en-US" dirty="0"/>
+              <a:t>Date of last close</a:t>
+            </a:r>
+          </a:p>
+          <a:p>
+            <a:r>
+              <a:rPr lang="en-US" dirty="0"/>
+              <a:t>Date and time</a:t>
+            </a:r>
+          </a:p>
+        </p:txBody>
+      </p:sp>
+    </p:spTree>
+    <p:extLst>
+      <p:ext uri="{BB962C8B-B14F-4D97-AF65-F5344CB8AC3E}">
+        <p14:creationId xmlns:p14="http://schemas.microsoft.com/office/powerpoint/2010/main" val="2619504051"/>
+      </p:ext>
+    </p:extLst>
+  </p:cSld>
+  <p:clrMapOvr>
+    <a:masterClrMapping/>
+  </p:clrMapOvr>
+</p:sld>
+</file>
+
+<file path=ppt/slides/slide12.xml><?xml version="1.0" encoding="utf-8"?>
+<p:sld xmlns:a="http://schemas.openxmlformats.org/drawingml/2006/main" xmlns:r="http://schemas.openxmlformats.org/officeDocument/2006/relationships" xmlns:p="http://schemas.openxmlformats.org/presentationml/2006/main">
+  <p:cSld>
+    <p:spTree>
+      <p:nvGrpSpPr>
+        <p:cNvPr id="1" name=""/>
+        <p:cNvGrpSpPr/>
+        <p:nvPr/>
+      </p:nvGrpSpPr>
+      <p:grpSpPr>
+        <a:xfrm>
+          <a:off x="0" y="0"/>
+          <a:ext cx="0" cy="0"/>
+          <a:chOff x="0" y="0"/>
+          <a:chExt cx="0" cy="0"/>
+        </a:xfrm>
+      </p:grpSpPr>
+      <p:sp>
+        <p:nvSpPr>
+          <p:cNvPr id="2" name="Title 1">
+            <a:extLst>
+              <a:ext uri="{FF2B5EF4-FFF2-40B4-BE49-F238E27FC236}">
+                <a16:creationId xmlns:a16="http://schemas.microsoft.com/office/drawing/2014/main" id="{563AEFF8-3D4C-A44B-968D-F62E3F81EAD5}"/>
+              </a:ext>
+            </a:extLst>
+          </p:cNvPr>
+          <p:cNvSpPr>
+            <a:spLocks noGrp="1"/>
+          </p:cNvSpPr>
+          <p:nvPr>
+            <p:ph type="title"/>
+          </p:nvPr>
+        </p:nvSpPr>
+        <p:spPr/>
+        <p:txBody>
+          <a:bodyPr/>
+          <a:lstStyle/>
+          <a:p>
+            <a:r>
+              <a:rPr lang="en-US" dirty="0"/>
+              <a:t>Final Function </a:t>
+            </a:r>
+          </a:p>
+        </p:txBody>
+      </p:sp>
+      <p:graphicFrame>
+        <p:nvGraphicFramePr>
+          <p:cNvPr id="7" name="Diagram 6">
+            <a:extLst>
+              <a:ext uri="{FF2B5EF4-FFF2-40B4-BE49-F238E27FC236}">
+                <a16:creationId xmlns:a16="http://schemas.microsoft.com/office/drawing/2014/main" id="{BEC8A972-CFC4-0043-A1D7-A6E7EF6D670E}"/>
+              </a:ext>
+            </a:extLst>
+          </p:cNvPr>
+          <p:cNvGraphicFramePr/>
+          <p:nvPr>
+            <p:extLst>
+              <p:ext uri="{D42A27DB-BD31-4B8C-83A1-F6EECF244321}">
+                <p14:modId xmlns:p14="http://schemas.microsoft.com/office/powerpoint/2010/main" val="3476362109"/>
+              </p:ext>
+            </p:extLst>
+          </p:nvPr>
+        </p:nvGraphicFramePr>
+        <p:xfrm>
+          <a:off x="1723081" y="-355372"/>
+          <a:ext cx="8128000" cy="5418667"/>
+        </p:xfrm>
+        <a:graphic>
+          <a:graphicData uri="http://schemas.openxmlformats.org/drawingml/2006/diagram">
+            <dgm:relIds xmlns:dgm="http://schemas.openxmlformats.org/drawingml/2006/diagram" xmlns:r="http://schemas.openxmlformats.org/officeDocument/2006/relationships" r:dm="rId2" r:lo="rId3" r:qs="rId4" r:cs="rId5"/>
+          </a:graphicData>
+        </a:graphic>
+      </p:graphicFrame>
+      <p:sp>
+        <p:nvSpPr>
+          <p:cNvPr id="8" name="Rectangle 7">
+            <a:extLst>
+              <a:ext uri="{FF2B5EF4-FFF2-40B4-BE49-F238E27FC236}">
+                <a16:creationId xmlns:a16="http://schemas.microsoft.com/office/drawing/2014/main" id="{49CF7EF5-69F9-0740-91B2-D87C8ED75F00}"/>
+              </a:ext>
+            </a:extLst>
+          </p:cNvPr>
+          <p:cNvSpPr/>
+          <p:nvPr/>
+        </p:nvSpPr>
+        <p:spPr>
+          <a:xfrm>
+            <a:off x="3588948" y="3898542"/>
+            <a:ext cx="3101546" cy="1900704"/>
+          </a:xfrm>
+          <a:prstGeom prst="rect">
+            <a:avLst/>
+          </a:prstGeom>
+        </p:spPr>
+        <p:style>
+          <a:lnRef idx="2">
+            <a:schemeClr val="accent1">
+              <a:shade val="50000"/>
+            </a:schemeClr>
+          </a:lnRef>
+          <a:fillRef idx="1">
+            <a:schemeClr val="accent1"/>
+          </a:fillRef>
+          <a:effectRef idx="0">
+            <a:schemeClr val="accent1"/>
+          </a:effectRef>
+          <a:fontRef idx="minor">
+            <a:schemeClr val="lt1"/>
+          </a:fontRef>
+        </p:style>
+        <p:txBody>
+          <a:bodyPr rtlCol="0" anchor="ctr"/>
+          <a:lstStyle/>
+          <a:p>
+            <a:pPr algn="ctr"/>
+            <a:r>
+              <a:rPr lang="en-US" sz="2800" b="1" dirty="0"/>
+              <a:t>VIXCOIN Token Prediction and Valuation Function</a:t>
+            </a:r>
+            <a:endParaRPr lang="en-US" dirty="0"/>
+          </a:p>
+        </p:txBody>
+      </p:sp>
+      <p:sp>
+        <p:nvSpPr>
+          <p:cNvPr id="9" name="TextBox 8">
+            <a:extLst>
+              <a:ext uri="{FF2B5EF4-FFF2-40B4-BE49-F238E27FC236}">
+                <a16:creationId xmlns:a16="http://schemas.microsoft.com/office/drawing/2014/main" id="{0B582E18-FF33-264B-9DC0-73EB9A5A4746}"/>
+              </a:ext>
+            </a:extLst>
+          </p:cNvPr>
+          <p:cNvSpPr txBox="1"/>
+          <p:nvPr/>
+        </p:nvSpPr>
+        <p:spPr>
+          <a:xfrm>
+            <a:off x="674131" y="4638712"/>
+            <a:ext cx="1872736" cy="369332"/>
+          </a:xfrm>
+          <a:prstGeom prst="rect">
+            <a:avLst/>
+          </a:prstGeom>
+          <a:noFill/>
+        </p:spPr>
+        <p:txBody>
+          <a:bodyPr wrap="square" rtlCol="0">
+            <a:spAutoFit/>
+          </a:bodyPr>
+          <a:lstStyle/>
+          <a:p>
+            <a:r>
+              <a:rPr lang="en-US" dirty="0"/>
+              <a:t>Date of last close</a:t>
+            </a:r>
+          </a:p>
+        </p:txBody>
+      </p:sp>
+      <p:cxnSp>
+        <p:nvCxnSpPr>
+          <p:cNvPr id="10" name="Straight Arrow Connector 9">
+            <a:extLst>
+              <a:ext uri="{FF2B5EF4-FFF2-40B4-BE49-F238E27FC236}">
+                <a16:creationId xmlns:a16="http://schemas.microsoft.com/office/drawing/2014/main" id="{6443AE3F-25B2-6B4F-8E67-FB79F3A7579C}"/>
+              </a:ext>
+            </a:extLst>
+          </p:cNvPr>
+          <p:cNvCxnSpPr/>
+          <p:nvPr/>
+        </p:nvCxnSpPr>
+        <p:spPr>
+          <a:xfrm>
+            <a:off x="6793484" y="4823379"/>
+            <a:ext cx="834074" cy="0"/>
+          </a:xfrm>
+          <a:prstGeom prst="straightConnector1">
+            <a:avLst/>
+          </a:prstGeom>
+          <a:ln>
+            <a:tailEnd type="triangle"/>
+          </a:ln>
+        </p:spPr>
+        <p:style>
+          <a:lnRef idx="1">
+            <a:schemeClr val="accent1"/>
+          </a:lnRef>
+          <a:fillRef idx="0">
+            <a:schemeClr val="accent1"/>
+          </a:fillRef>
+          <a:effectRef idx="0">
+            <a:schemeClr val="accent1"/>
+          </a:effectRef>
+          <a:fontRef idx="minor">
+            <a:schemeClr val="tx1"/>
+          </a:fontRef>
+        </p:style>
+      </p:cxnSp>
+      <p:sp>
+        <p:nvSpPr>
+          <p:cNvPr id="11" name="TextBox 10">
+            <a:extLst>
+              <a:ext uri="{FF2B5EF4-FFF2-40B4-BE49-F238E27FC236}">
+                <a16:creationId xmlns:a16="http://schemas.microsoft.com/office/drawing/2014/main" id="{17792BB6-A455-2048-B486-6154050312BF}"/>
+              </a:ext>
+            </a:extLst>
+          </p:cNvPr>
+          <p:cNvSpPr txBox="1"/>
+          <p:nvPr/>
+        </p:nvSpPr>
+        <p:spPr>
+          <a:xfrm>
+            <a:off x="7730548" y="4248729"/>
+            <a:ext cx="4547287" cy="1477328"/>
+          </a:xfrm>
+          <a:prstGeom prst="rect">
+            <a:avLst/>
+          </a:prstGeom>
+          <a:noFill/>
+        </p:spPr>
+        <p:txBody>
+          <a:bodyPr wrap="square" rtlCol="0">
+            <a:spAutoFit/>
+          </a:bodyPr>
+          <a:lstStyle/>
+          <a:p>
+            <a:r>
+              <a:rPr lang="en-US" dirty="0"/>
+              <a:t>*Signal predicted for the next day (0 or 1)</a:t>
+            </a:r>
+          </a:p>
+          <a:p>
+            <a:r>
+              <a:rPr lang="en-US" dirty="0"/>
+              <a:t>*Value of token on input Date</a:t>
+            </a:r>
+          </a:p>
+          <a:p>
+            <a:r>
+              <a:rPr lang="en-US" dirty="0"/>
+              <a:t>*</a:t>
+            </a:r>
+            <a:r>
+              <a:rPr lang="en-US" dirty="0" err="1"/>
+              <a:t>DataFrame</a:t>
+            </a:r>
+            <a:r>
+              <a:rPr lang="en-US" dirty="0"/>
+              <a:t> with all historical values</a:t>
+            </a:r>
+          </a:p>
+          <a:p>
+            <a:r>
+              <a:rPr lang="en-US" dirty="0"/>
+              <a:t>*</a:t>
+            </a:r>
+            <a:r>
+              <a:rPr lang="en-US" dirty="0" err="1"/>
+              <a:t>Dataframe</a:t>
+            </a:r>
+            <a:r>
+              <a:rPr lang="en-US" dirty="0"/>
+              <a:t> with all historical signals</a:t>
+            </a:r>
+          </a:p>
+          <a:p>
+            <a:endParaRPr lang="en-US" dirty="0"/>
+          </a:p>
+        </p:txBody>
+      </p:sp>
+      <p:cxnSp>
+        <p:nvCxnSpPr>
+          <p:cNvPr id="12" name="Straight Arrow Connector 11">
+            <a:extLst>
+              <a:ext uri="{FF2B5EF4-FFF2-40B4-BE49-F238E27FC236}">
+                <a16:creationId xmlns:a16="http://schemas.microsoft.com/office/drawing/2014/main" id="{1114E108-5B2F-2749-8482-3103724BD71F}"/>
+              </a:ext>
+            </a:extLst>
+          </p:cNvPr>
+          <p:cNvCxnSpPr/>
+          <p:nvPr/>
+        </p:nvCxnSpPr>
+        <p:spPr>
+          <a:xfrm>
+            <a:off x="2682790" y="4852209"/>
+            <a:ext cx="834074" cy="0"/>
+          </a:xfrm>
+          <a:prstGeom prst="straightConnector1">
+            <a:avLst/>
+          </a:prstGeom>
+          <a:ln>
+            <a:tailEnd type="triangle"/>
+          </a:ln>
+        </p:spPr>
+        <p:style>
+          <a:lnRef idx="1">
+            <a:schemeClr val="accent1"/>
+          </a:lnRef>
+          <a:fillRef idx="0">
+            <a:schemeClr val="accent1"/>
+          </a:fillRef>
+          <a:effectRef idx="0">
+            <a:schemeClr val="accent1"/>
+          </a:effectRef>
+          <a:fontRef idx="minor">
+            <a:schemeClr val="tx1"/>
+          </a:fontRef>
+        </p:style>
+      </p:cxnSp>
+      <p:cxnSp>
+        <p:nvCxnSpPr>
+          <p:cNvPr id="19" name="Straight Arrow Connector 18">
+            <a:extLst>
+              <a:ext uri="{FF2B5EF4-FFF2-40B4-BE49-F238E27FC236}">
+                <a16:creationId xmlns:a16="http://schemas.microsoft.com/office/drawing/2014/main" id="{A0B6E71B-D25A-CC46-AE40-90A67AB979DB}"/>
+              </a:ext>
+            </a:extLst>
+          </p:cNvPr>
+          <p:cNvCxnSpPr/>
+          <p:nvPr/>
+        </p:nvCxnSpPr>
+        <p:spPr>
+          <a:xfrm flipH="1">
+            <a:off x="5399903" y="2866768"/>
+            <a:ext cx="3669956" cy="939113"/>
+          </a:xfrm>
+          <a:prstGeom prst="straightConnector1">
+            <a:avLst/>
+          </a:prstGeom>
+          <a:ln>
+            <a:tailEnd type="triangle"/>
+          </a:ln>
+        </p:spPr>
+        <p:style>
+          <a:lnRef idx="1">
+            <a:schemeClr val="accent1"/>
+          </a:lnRef>
+          <a:fillRef idx="0">
+            <a:schemeClr val="accent1"/>
+          </a:fillRef>
+          <a:effectRef idx="0">
+            <a:schemeClr val="accent1"/>
+          </a:effectRef>
+          <a:fontRef idx="minor">
+            <a:schemeClr val="tx1"/>
+          </a:fontRef>
+        </p:style>
+      </p:cxnSp>
+      <p:sp>
+        <p:nvSpPr>
+          <p:cNvPr id="20" name="TextBox 19">
+            <a:extLst>
+              <a:ext uri="{FF2B5EF4-FFF2-40B4-BE49-F238E27FC236}">
+                <a16:creationId xmlns:a16="http://schemas.microsoft.com/office/drawing/2014/main" id="{B8681D2E-2BE4-2D48-B62B-9B0D4883A3F5}"/>
+              </a:ext>
+            </a:extLst>
+          </p:cNvPr>
+          <p:cNvSpPr txBox="1"/>
+          <p:nvPr/>
+        </p:nvSpPr>
+        <p:spPr>
+          <a:xfrm>
+            <a:off x="183261" y="3205716"/>
+            <a:ext cx="3163296" cy="1200329"/>
+          </a:xfrm>
+          <a:prstGeom prst="rect">
+            <a:avLst/>
+          </a:prstGeom>
+          <a:noFill/>
+        </p:spPr>
+        <p:txBody>
+          <a:bodyPr wrap="square" rtlCol="0">
+            <a:spAutoFit/>
+          </a:bodyPr>
+          <a:lstStyle/>
+          <a:p>
+            <a:r>
+              <a:rPr lang="en-US" dirty="0"/>
+              <a:t>Keep the previous results in a database or somewhere, so we don’t need to wait for the calculations every time</a:t>
+            </a:r>
+          </a:p>
+        </p:txBody>
+      </p:sp>
+      <p:sp>
+        <p:nvSpPr>
+          <p:cNvPr id="21" name="Magnetic Disk 20">
+            <a:extLst>
+              <a:ext uri="{FF2B5EF4-FFF2-40B4-BE49-F238E27FC236}">
+                <a16:creationId xmlns:a16="http://schemas.microsoft.com/office/drawing/2014/main" id="{4F07F3B6-5A33-9C46-9387-2788A6580452}"/>
+              </a:ext>
+            </a:extLst>
+          </p:cNvPr>
+          <p:cNvSpPr/>
+          <p:nvPr/>
+        </p:nvSpPr>
+        <p:spPr>
+          <a:xfrm>
+            <a:off x="428361" y="2866768"/>
+            <a:ext cx="961527" cy="376304"/>
+          </a:xfrm>
+          <a:prstGeom prst="flowChartMagneticDisk">
+            <a:avLst/>
+          </a:prstGeom>
+        </p:spPr>
+        <p:style>
+          <a:lnRef idx="2">
+            <a:schemeClr val="accent1">
+              <a:shade val="50000"/>
+            </a:schemeClr>
+          </a:lnRef>
+          <a:fillRef idx="1">
+            <a:schemeClr val="accent1"/>
+          </a:fillRef>
+          <a:effectRef idx="0">
+            <a:schemeClr val="accent1"/>
+          </a:effectRef>
+          <a:fontRef idx="minor">
+            <a:schemeClr val="lt1"/>
+          </a:fontRef>
+        </p:style>
+        <p:txBody>
+          <a:bodyPr rtlCol="0" anchor="ctr"/>
+          <a:lstStyle/>
+          <a:p>
+            <a:pPr algn="ctr"/>
+            <a:endParaRPr lang="en-US"/>
+          </a:p>
+        </p:txBody>
+      </p:sp>
+    </p:spTree>
+    <p:extLst>
+      <p:ext uri="{BB962C8B-B14F-4D97-AF65-F5344CB8AC3E}">
+        <p14:creationId xmlns:p14="http://schemas.microsoft.com/office/powerpoint/2010/main" val="1548646426"/>
+      </p:ext>
+    </p:extLst>
+  </p:cSld>
+  <p:clrMapOvr>
+    <a:masterClrMapping/>
+  </p:clrMapOvr>
+</p:sld>
+</file>
+
+<file path=ppt/slides/slide13.xml><?xml version="1.0" encoding="utf-8"?>
+<p:sld xmlns:a="http://schemas.openxmlformats.org/drawingml/2006/main" xmlns:r="http://schemas.openxmlformats.org/officeDocument/2006/relationships" xmlns:p="http://schemas.openxmlformats.org/presentationml/2006/main">
+  <p:cSld>
+    <p:spTree>
+      <p:nvGrpSpPr>
+        <p:cNvPr id="1" name=""/>
+        <p:cNvGrpSpPr/>
+        <p:nvPr/>
+      </p:nvGrpSpPr>
+      <p:grpSpPr>
+        <a:xfrm>
+          <a:off x="0" y="0"/>
+          <a:ext cx="0" cy="0"/>
+          <a:chOff x="0" y="0"/>
+          <a:chExt cx="0" cy="0"/>
+        </a:xfrm>
+      </p:grpSpPr>
       <p:pic>
         <p:nvPicPr>
           <p:cNvPr id="5" name="Picture 4">
@@ -3453,7 +7193,7 @@
         </p:blipFill>
         <p:spPr>
           <a:xfrm>
-            <a:off x="130969" y="0"/>
+            <a:off x="168039" y="-56474"/>
             <a:ext cx="4564062" cy="3806428"/>
           </a:xfrm>
           <a:prstGeom prst="rect">
@@ -3475,8 +7215,8 @@
         </p:nvSpPr>
         <p:spPr>
           <a:xfrm>
-            <a:off x="7715250" y="1414463"/>
-            <a:ext cx="3143250" cy="1200329"/>
+            <a:off x="6096000" y="1414463"/>
+            <a:ext cx="4762500" cy="646331"/>
           </a:xfrm>
           <a:prstGeom prst="rect">
             <a:avLst/>
@@ -3539,7 +7279,7 @@
 </p:sld>
 </file>
 
-<file path=ppt/slides/slide11.xml><?xml version="1.0" encoding="utf-8"?>
+<file path=ppt/slides/slide14.xml><?xml version="1.0" encoding="utf-8"?>
 <p:sld xmlns:a="http://schemas.openxmlformats.org/drawingml/2006/main" xmlns:r="http://schemas.openxmlformats.org/officeDocument/2006/relationships" xmlns:p="http://schemas.openxmlformats.org/presentationml/2006/main">
   <p:cSld>
     <p:spTree>
@@ -3570,7 +7310,7 @@
         </p:nvSpPr>
         <p:spPr>
           <a:xfrm>
-            <a:off x="2728913" y="4514850"/>
+            <a:off x="2976048" y="5206828"/>
             <a:ext cx="5943600" cy="369332"/>
           </a:xfrm>
           <a:prstGeom prst="rect">
@@ -3591,36 +7331,385 @@
           </a:p>
         </p:txBody>
       </p:sp>
-      <p:pic>
-        <p:nvPicPr>
-          <p:cNvPr id="7" name="Picture 6">
-            <a:extLst>
-              <a:ext uri="{FF2B5EF4-FFF2-40B4-BE49-F238E27FC236}">
-                <a16:creationId xmlns:a16="http://schemas.microsoft.com/office/drawing/2014/main" id="{9F9452FE-06E4-D44B-9DFA-705221BEEFEB}"/>
-              </a:ext>
-            </a:extLst>
-          </p:cNvPr>
-          <p:cNvPicPr>
-            <a:picLocks noChangeAspect="1"/>
-          </p:cNvPicPr>
+      <p:grpSp>
+        <p:nvGrpSpPr>
+          <p:cNvPr id="16" name="Group 15">
+            <a:extLst>
+              <a:ext uri="{FF2B5EF4-FFF2-40B4-BE49-F238E27FC236}">
+                <a16:creationId xmlns:a16="http://schemas.microsoft.com/office/drawing/2014/main" id="{C500D209-BFEA-C446-BB20-21144BCDC139}"/>
+              </a:ext>
+            </a:extLst>
+          </p:cNvPr>
+          <p:cNvGrpSpPr/>
           <p:nvPr/>
-        </p:nvPicPr>
-        <p:blipFill>
-          <a:blip r:embed="rId2"/>
-          <a:stretch>
-            <a:fillRect/>
-          </a:stretch>
-        </p:blipFill>
-        <p:spPr>
+        </p:nvGrpSpPr>
+        <p:grpSpPr>
           <a:xfrm>
-            <a:off x="1541463" y="609600"/>
+            <a:off x="1034835" y="1281840"/>
             <a:ext cx="8318500" cy="3467100"/>
+            <a:chOff x="1541463" y="1116227"/>
+            <a:chExt cx="8318500" cy="3467100"/>
           </a:xfrm>
-          <a:prstGeom prst="rect">
-            <a:avLst/>
-          </a:prstGeom>
-        </p:spPr>
-      </p:pic>
+        </p:grpSpPr>
+        <p:pic>
+          <p:nvPicPr>
+            <p:cNvPr id="7" name="Picture 6">
+              <a:extLst>
+                <a:ext uri="{FF2B5EF4-FFF2-40B4-BE49-F238E27FC236}">
+                  <a16:creationId xmlns:a16="http://schemas.microsoft.com/office/drawing/2014/main" id="{9F9452FE-06E4-D44B-9DFA-705221BEEFEB}"/>
+                </a:ext>
+              </a:extLst>
+            </p:cNvPr>
+            <p:cNvPicPr>
+              <a:picLocks noChangeAspect="1"/>
+            </p:cNvPicPr>
+            <p:nvPr/>
+          </p:nvPicPr>
+          <p:blipFill>
+            <a:blip r:embed="rId2"/>
+            <a:stretch>
+              <a:fillRect/>
+            </a:stretch>
+          </p:blipFill>
+          <p:spPr>
+            <a:xfrm>
+              <a:off x="1541463" y="1116227"/>
+              <a:ext cx="8318500" cy="3467100"/>
+            </a:xfrm>
+            <a:prstGeom prst="rect">
+              <a:avLst/>
+            </a:prstGeom>
+          </p:spPr>
+        </p:pic>
+        <p:sp>
+          <p:nvSpPr>
+            <p:cNvPr id="8" name="TextBox 7">
+              <a:extLst>
+                <a:ext uri="{FF2B5EF4-FFF2-40B4-BE49-F238E27FC236}">
+                  <a16:creationId xmlns:a16="http://schemas.microsoft.com/office/drawing/2014/main" id="{DB113A1B-9C46-2E41-A20F-FA8730C12172}"/>
+                </a:ext>
+              </a:extLst>
+            </p:cNvPr>
+            <p:cNvSpPr txBox="1"/>
+            <p:nvPr/>
+          </p:nvSpPr>
+          <p:spPr>
+            <a:xfrm>
+              <a:off x="3468857" y="2897414"/>
+              <a:ext cx="1136821" cy="369332"/>
+            </a:xfrm>
+            <a:prstGeom prst="rect">
+              <a:avLst/>
+            </a:prstGeom>
+            <a:noFill/>
+          </p:spPr>
+          <p:txBody>
+            <a:bodyPr wrap="square" rtlCol="0">
+              <a:spAutoFit/>
+            </a:bodyPr>
+            <a:lstStyle/>
+            <a:p>
+              <a:r>
+                <a:rPr lang="en-US" dirty="0">
+                  <a:solidFill>
+                    <a:schemeClr val="accent6">
+                      <a:lumMod val="50000"/>
+                    </a:schemeClr>
+                  </a:solidFill>
+                </a:rPr>
+                <a:t>1.5</a:t>
+              </a:r>
+            </a:p>
+          </p:txBody>
+        </p:sp>
+        <p:sp>
+          <p:nvSpPr>
+            <p:cNvPr id="9" name="TextBox 8">
+              <a:extLst>
+                <a:ext uri="{FF2B5EF4-FFF2-40B4-BE49-F238E27FC236}">
+                  <a16:creationId xmlns:a16="http://schemas.microsoft.com/office/drawing/2014/main" id="{5325A996-9D38-C144-B3C3-1BA6F74A7E14}"/>
+                </a:ext>
+              </a:extLst>
+            </p:cNvPr>
+            <p:cNvSpPr txBox="1"/>
+            <p:nvPr/>
+          </p:nvSpPr>
+          <p:spPr>
+            <a:xfrm>
+              <a:off x="5626445" y="1734066"/>
+              <a:ext cx="1136821" cy="369332"/>
+            </a:xfrm>
+            <a:prstGeom prst="rect">
+              <a:avLst/>
+            </a:prstGeom>
+            <a:noFill/>
+          </p:spPr>
+          <p:txBody>
+            <a:bodyPr wrap="square" rtlCol="0">
+              <a:spAutoFit/>
+            </a:bodyPr>
+            <a:lstStyle/>
+            <a:p>
+              <a:r>
+                <a:rPr lang="en-US" dirty="0">
+                  <a:solidFill>
+                    <a:schemeClr val="accent6">
+                      <a:lumMod val="50000"/>
+                    </a:schemeClr>
+                  </a:solidFill>
+                </a:rPr>
+                <a:t>3.37</a:t>
+              </a:r>
+            </a:p>
+          </p:txBody>
+        </p:sp>
+        <p:sp>
+          <p:nvSpPr>
+            <p:cNvPr id="10" name="TextBox 9">
+              <a:extLst>
+                <a:ext uri="{FF2B5EF4-FFF2-40B4-BE49-F238E27FC236}">
+                  <a16:creationId xmlns:a16="http://schemas.microsoft.com/office/drawing/2014/main" id="{867AC8FF-08BF-8344-A0A2-8A3CC77AB985}"/>
+                </a:ext>
+              </a:extLst>
+            </p:cNvPr>
+            <p:cNvSpPr txBox="1"/>
+            <p:nvPr/>
+          </p:nvSpPr>
+          <p:spPr>
+            <a:xfrm>
+              <a:off x="7410464" y="1364734"/>
+              <a:ext cx="1136821" cy="369332"/>
+            </a:xfrm>
+            <a:prstGeom prst="rect">
+              <a:avLst/>
+            </a:prstGeom>
+            <a:noFill/>
+          </p:spPr>
+          <p:txBody>
+            <a:bodyPr wrap="square" rtlCol="0">
+              <a:spAutoFit/>
+            </a:bodyPr>
+            <a:lstStyle/>
+            <a:p>
+              <a:r>
+                <a:rPr lang="en-US" dirty="0">
+                  <a:solidFill>
+                    <a:schemeClr val="accent6">
+                      <a:lumMod val="50000"/>
+                    </a:schemeClr>
+                  </a:solidFill>
+                </a:rPr>
+                <a:t>3.16</a:t>
+              </a:r>
+            </a:p>
+          </p:txBody>
+        </p:sp>
+        <p:sp>
+          <p:nvSpPr>
+            <p:cNvPr id="11" name="TextBox 10">
+              <a:extLst>
+                <a:ext uri="{FF2B5EF4-FFF2-40B4-BE49-F238E27FC236}">
+                  <a16:creationId xmlns:a16="http://schemas.microsoft.com/office/drawing/2014/main" id="{6DDDE3A7-0750-9448-953D-5F70D0EA3208}"/>
+                </a:ext>
+              </a:extLst>
+            </p:cNvPr>
+            <p:cNvSpPr txBox="1"/>
+            <p:nvPr/>
+          </p:nvSpPr>
+          <p:spPr>
+            <a:xfrm>
+              <a:off x="2332037" y="3225889"/>
+              <a:ext cx="1136821" cy="369332"/>
+            </a:xfrm>
+            <a:prstGeom prst="rect">
+              <a:avLst/>
+            </a:prstGeom>
+            <a:noFill/>
+          </p:spPr>
+          <p:txBody>
+            <a:bodyPr wrap="square" rtlCol="0">
+              <a:spAutoFit/>
+            </a:bodyPr>
+            <a:lstStyle/>
+            <a:p>
+              <a:r>
+                <a:rPr lang="en-US" dirty="0">
+                  <a:solidFill>
+                    <a:schemeClr val="accent6">
+                      <a:lumMod val="50000"/>
+                    </a:schemeClr>
+                  </a:solidFill>
+                </a:rPr>
+                <a:t>1.0</a:t>
+              </a:r>
+            </a:p>
+          </p:txBody>
+        </p:sp>
+        <p:sp>
+          <p:nvSpPr>
+            <p:cNvPr id="12" name="TextBox 11">
+              <a:extLst>
+                <a:ext uri="{FF2B5EF4-FFF2-40B4-BE49-F238E27FC236}">
+                  <a16:creationId xmlns:a16="http://schemas.microsoft.com/office/drawing/2014/main" id="{5582F8F6-0090-8F4D-9956-48E9829E6A39}"/>
+                </a:ext>
+              </a:extLst>
+            </p:cNvPr>
+            <p:cNvSpPr txBox="1"/>
+            <p:nvPr/>
+          </p:nvSpPr>
+          <p:spPr>
+            <a:xfrm>
+              <a:off x="2332036" y="3688156"/>
+              <a:ext cx="1136821" cy="369332"/>
+            </a:xfrm>
+            <a:prstGeom prst="rect">
+              <a:avLst/>
+            </a:prstGeom>
+            <a:noFill/>
+          </p:spPr>
+          <p:txBody>
+            <a:bodyPr wrap="square" rtlCol="0">
+              <a:spAutoFit/>
+            </a:bodyPr>
+            <a:lstStyle/>
+            <a:p>
+              <a:r>
+                <a:rPr lang="en-US" dirty="0">
+                  <a:solidFill>
+                    <a:schemeClr val="accent5">
+                      <a:lumMod val="50000"/>
+                    </a:schemeClr>
+                  </a:solidFill>
+                </a:rPr>
+                <a:t>1.0</a:t>
+              </a:r>
+            </a:p>
+          </p:txBody>
+        </p:sp>
+        <p:sp>
+          <p:nvSpPr>
+            <p:cNvPr id="13" name="TextBox 12">
+              <a:extLst>
+                <a:ext uri="{FF2B5EF4-FFF2-40B4-BE49-F238E27FC236}">
+                  <a16:creationId xmlns:a16="http://schemas.microsoft.com/office/drawing/2014/main" id="{132AE039-D47E-9445-9E9F-45EDF231D8CC}"/>
+                </a:ext>
+              </a:extLst>
+            </p:cNvPr>
+            <p:cNvSpPr txBox="1"/>
+            <p:nvPr/>
+          </p:nvSpPr>
+          <p:spPr>
+            <a:xfrm>
+              <a:off x="3521672" y="3705581"/>
+              <a:ext cx="1136821" cy="369332"/>
+            </a:xfrm>
+            <a:prstGeom prst="rect">
+              <a:avLst/>
+            </a:prstGeom>
+            <a:noFill/>
+          </p:spPr>
+          <p:txBody>
+            <a:bodyPr wrap="square" rtlCol="0">
+              <a:spAutoFit/>
+            </a:bodyPr>
+            <a:lstStyle/>
+            <a:p>
+              <a:r>
+                <a:rPr lang="en-US" dirty="0">
+                  <a:solidFill>
+                    <a:schemeClr val="accent5">
+                      <a:lumMod val="50000"/>
+                    </a:schemeClr>
+                  </a:solidFill>
+                </a:rPr>
+                <a:t>0.75</a:t>
+              </a:r>
+            </a:p>
+          </p:txBody>
+        </p:sp>
+        <p:sp>
+          <p:nvSpPr>
+            <p:cNvPr id="14" name="TextBox 13">
+              <a:extLst>
+                <a:ext uri="{FF2B5EF4-FFF2-40B4-BE49-F238E27FC236}">
+                  <a16:creationId xmlns:a16="http://schemas.microsoft.com/office/drawing/2014/main" id="{5802FA20-BC7D-1842-BC12-4D426821B56A}"/>
+                </a:ext>
+              </a:extLst>
+            </p:cNvPr>
+            <p:cNvSpPr txBox="1"/>
+            <p:nvPr/>
+          </p:nvSpPr>
+          <p:spPr>
+            <a:xfrm>
+              <a:off x="5634155" y="3410555"/>
+              <a:ext cx="630721" cy="369332"/>
+            </a:xfrm>
+            <a:prstGeom prst="rect">
+              <a:avLst/>
+            </a:prstGeom>
+            <a:noFill/>
+          </p:spPr>
+          <p:txBody>
+            <a:bodyPr wrap="square" rtlCol="0">
+              <a:spAutoFit/>
+            </a:bodyPr>
+            <a:lstStyle/>
+            <a:p>
+              <a:r>
+                <a:rPr lang="en-US" dirty="0">
+                  <a:solidFill>
+                    <a:schemeClr val="accent5">
+                      <a:lumMod val="50000"/>
+                    </a:schemeClr>
+                  </a:solidFill>
+                </a:rPr>
+                <a:t>1.33</a:t>
+              </a:r>
+            </a:p>
+          </p:txBody>
+        </p:sp>
+        <p:sp>
+          <p:nvSpPr>
+            <p:cNvPr id="15" name="TextBox 14">
+              <a:extLst>
+                <a:ext uri="{FF2B5EF4-FFF2-40B4-BE49-F238E27FC236}">
+                  <a16:creationId xmlns:a16="http://schemas.microsoft.com/office/drawing/2014/main" id="{FA48A33A-2EE7-6B49-8916-B78976E449FF}"/>
+                </a:ext>
+              </a:extLst>
+            </p:cNvPr>
+            <p:cNvSpPr txBox="1"/>
+            <p:nvPr/>
+          </p:nvSpPr>
+          <p:spPr>
+            <a:xfrm>
+              <a:off x="7348154" y="3216371"/>
+              <a:ext cx="630721" cy="369332"/>
+            </a:xfrm>
+            <a:prstGeom prst="rect">
+              <a:avLst/>
+            </a:prstGeom>
+            <a:noFill/>
+          </p:spPr>
+          <p:txBody>
+            <a:bodyPr wrap="square" rtlCol="0">
+              <a:spAutoFit/>
+            </a:bodyPr>
+            <a:lstStyle/>
+            <a:p>
+              <a:r>
+                <a:rPr lang="en-US" dirty="0">
+                  <a:solidFill>
+                    <a:schemeClr val="accent5">
+                      <a:lumMod val="50000"/>
+                    </a:schemeClr>
+                  </a:solidFill>
+                </a:rPr>
+                <a:t>1.62</a:t>
+              </a:r>
+            </a:p>
+          </p:txBody>
+        </p:sp>
+      </p:grpSp>
     </p:spTree>
     <p:extLst>
       <p:ext uri="{BB962C8B-B14F-4D97-AF65-F5344CB8AC3E}">
@@ -5284,7 +9373,7 @@
         <p:spPr>
           <a:xfrm>
             <a:off x="7525265" y="2032001"/>
-            <a:ext cx="1643449" cy="923330"/>
+            <a:ext cx="2008879" cy="2031325"/>
           </a:xfrm>
           <a:prstGeom prst="rect">
             <a:avLst/>
@@ -5299,15 +9388,7 @@
           <a:p>
             <a:r>
               <a:rPr lang="en-US" dirty="0"/>
-              <a:t>Predictions (</a:t>
-            </a:r>
-            <a:r>
-              <a:rPr lang="en-US" dirty="0" err="1"/>
-              <a:t>y_hat</a:t>
-            </a:r>
-            <a:r>
-              <a:rPr lang="en-US" dirty="0"/>
-              <a:t>)</a:t>
+              <a:t>Predictions (0 or 1)</a:t>
             </a:r>
           </a:p>
           <a:p>
@@ -5315,6 +9396,39 @@
               <a:rPr lang="en-US" dirty="0"/>
               <a:t>X</a:t>
             </a:r>
+          </a:p>
+          <a:p>
+            <a:r>
+              <a:rPr lang="en-US" dirty="0"/>
+              <a:t>Y</a:t>
+            </a:r>
+          </a:p>
+          <a:p>
+            <a:r>
+              <a:rPr lang="en-US" dirty="0" err="1"/>
+              <a:t>X_train_scaled</a:t>
+            </a:r>
+            <a:endParaRPr lang="en-US" dirty="0"/>
+          </a:p>
+          <a:p>
+            <a:r>
+              <a:rPr lang="en-US" dirty="0" err="1"/>
+              <a:t>Y_train_scaled</a:t>
+            </a:r>
+            <a:endParaRPr lang="en-US" dirty="0"/>
+          </a:p>
+          <a:p>
+            <a:r>
+              <a:rPr lang="en-US" dirty="0" err="1"/>
+              <a:t>Adaboost</a:t>
+            </a:r>
+            <a:r>
+              <a:rPr lang="en-US" dirty="0"/>
+              <a:t> model</a:t>
+            </a:r>
+          </a:p>
+          <a:p>
+            <a:endParaRPr lang="en-US" dirty="0"/>
           </a:p>
         </p:txBody>
       </p:sp>
@@ -5865,10 +9979,38 @@
       </p:grpSpPr>
       <p:sp>
         <p:nvSpPr>
-          <p:cNvPr id="4" name="Rectangle 3">
-            <a:extLst>
-              <a:ext uri="{FF2B5EF4-FFF2-40B4-BE49-F238E27FC236}">
-                <a16:creationId xmlns:a16="http://schemas.microsoft.com/office/drawing/2014/main" id="{3115F3E8-BAA6-6D4E-8FB3-DD2CA133CF3A}"/>
+          <p:cNvPr id="5" name="Title 4">
+            <a:extLst>
+              <a:ext uri="{FF2B5EF4-FFF2-40B4-BE49-F238E27FC236}">
+                <a16:creationId xmlns:a16="http://schemas.microsoft.com/office/drawing/2014/main" id="{033B78F1-892C-1A40-B14A-E7D785E893C4}"/>
+              </a:ext>
+            </a:extLst>
+          </p:cNvPr>
+          <p:cNvSpPr>
+            <a:spLocks noGrp="1"/>
+          </p:cNvSpPr>
+          <p:nvPr>
+            <p:ph type="title"/>
+          </p:nvPr>
+        </p:nvSpPr>
+        <p:spPr/>
+        <p:txBody>
+          <a:bodyPr/>
+          <a:lstStyle/>
+          <a:p>
+            <a:r>
+              <a:rPr lang="en-US" dirty="0"/>
+              <a:t>3) Performance results </a:t>
+            </a:r>
+          </a:p>
+        </p:txBody>
+      </p:sp>
+      <p:sp>
+        <p:nvSpPr>
+          <p:cNvPr id="10" name="Rectangle 9">
+            <a:extLst>
+              <a:ext uri="{FF2B5EF4-FFF2-40B4-BE49-F238E27FC236}">
+                <a16:creationId xmlns:a16="http://schemas.microsoft.com/office/drawing/2014/main" id="{4C23B152-D3F0-0E4C-BD20-CC625C7AECDD}"/>
               </a:ext>
             </a:extLst>
           </p:cNvPr>
@@ -5877,8 +10019,8 @@
         </p:nvSpPr>
         <p:spPr>
           <a:xfrm>
-            <a:off x="1128713" y="1328738"/>
-            <a:ext cx="2689526" cy="2243137"/>
+            <a:off x="3873850" y="1937781"/>
+            <a:ext cx="3101546" cy="3237464"/>
           </a:xfrm>
           <a:prstGeom prst="rect">
             <a:avLst/>
@@ -5906,165 +10048,100 @@
           <a:p>
             <a:pPr algn="ctr"/>
             <a:r>
-              <a:rPr lang="en-US" dirty="0" err="1"/>
-              <a:t>X_filtered</a:t>
-            </a:r>
+              <a:rPr lang="en-US" sz="2800" b="1" dirty="0"/>
+              <a:t>Performance Output Function</a:t>
+            </a:r>
+          </a:p>
+          <a:p>
+            <a:pPr algn="ctr"/>
             <a:endParaRPr lang="en-US" dirty="0"/>
           </a:p>
         </p:txBody>
       </p:sp>
-      <p:sp>
-        <p:nvSpPr>
-          <p:cNvPr id="5" name="Rectangle 4">
-            <a:extLst>
-              <a:ext uri="{FF2B5EF4-FFF2-40B4-BE49-F238E27FC236}">
-                <a16:creationId xmlns:a16="http://schemas.microsoft.com/office/drawing/2014/main" id="{B906ACDE-9E18-8648-BA83-88BC40B2C7ED}"/>
-              </a:ext>
-            </a:extLst>
-          </p:cNvPr>
-          <p:cNvSpPr/>
+      <p:cxnSp>
+        <p:nvCxnSpPr>
+          <p:cNvPr id="11" name="Straight Arrow Connector 10">
+            <a:extLst>
+              <a:ext uri="{FF2B5EF4-FFF2-40B4-BE49-F238E27FC236}">
+                <a16:creationId xmlns:a16="http://schemas.microsoft.com/office/drawing/2014/main" id="{1E1DF40A-E274-CC40-8EAA-31E73F873AF8}"/>
+              </a:ext>
+            </a:extLst>
+          </p:cNvPr>
+          <p:cNvCxnSpPr/>
           <p:nvPr/>
-        </p:nvSpPr>
+        </p:nvCxnSpPr>
         <p:spPr>
           <a:xfrm>
-            <a:off x="5029201" y="1328738"/>
-            <a:ext cx="1210962" cy="2243137"/>
+            <a:off x="2508423" y="2613455"/>
+            <a:ext cx="1124464" cy="0"/>
           </a:xfrm>
-          <a:prstGeom prst="rect">
+          <a:prstGeom prst="straightConnector1">
             <a:avLst/>
           </a:prstGeom>
-          <a:solidFill>
-            <a:schemeClr val="accent2"/>
-          </a:solidFill>
+          <a:ln>
+            <a:tailEnd type="triangle"/>
+          </a:ln>
         </p:spPr>
         <p:style>
-          <a:lnRef idx="2">
-            <a:schemeClr val="accent1">
-              <a:shade val="50000"/>
-            </a:schemeClr>
+          <a:lnRef idx="1">
+            <a:schemeClr val="accent1"/>
           </a:lnRef>
-          <a:fillRef idx="1">
+          <a:fillRef idx="0">
             <a:schemeClr val="accent1"/>
           </a:fillRef>
           <a:effectRef idx="0">
             <a:schemeClr val="accent1"/>
           </a:effectRef>
           <a:fontRef idx="minor">
-            <a:schemeClr val="lt1"/>
+            <a:schemeClr val="tx1"/>
           </a:fontRef>
         </p:style>
-        <p:txBody>
-          <a:bodyPr rtlCol="0" anchor="ctr"/>
-          <a:lstStyle/>
-          <a:p>
-            <a:pPr algn="ctr"/>
-            <a:r>
-              <a:rPr lang="en-US" dirty="0"/>
-              <a:t>VIX prediction</a:t>
-            </a:r>
-          </a:p>
-        </p:txBody>
-      </p:sp>
-      <p:sp>
-        <p:nvSpPr>
-          <p:cNvPr id="6" name="Rectangle 5">
-            <a:extLst>
-              <a:ext uri="{FF2B5EF4-FFF2-40B4-BE49-F238E27FC236}">
-                <a16:creationId xmlns:a16="http://schemas.microsoft.com/office/drawing/2014/main" id="{89A52A67-229C-794B-BCB4-9E2EAEBC341D}"/>
-              </a:ext>
-            </a:extLst>
-          </p:cNvPr>
-          <p:cNvSpPr/>
+      </p:cxnSp>
+      <p:cxnSp>
+        <p:nvCxnSpPr>
+          <p:cNvPr id="12" name="Straight Arrow Connector 11">
+            <a:extLst>
+              <a:ext uri="{FF2B5EF4-FFF2-40B4-BE49-F238E27FC236}">
+                <a16:creationId xmlns:a16="http://schemas.microsoft.com/office/drawing/2014/main" id="{7FE3C7AF-3AAB-C84C-AC65-9D8993A953C7}"/>
+              </a:ext>
+            </a:extLst>
+          </p:cNvPr>
+          <p:cNvCxnSpPr/>
           <p:nvPr/>
-        </p:nvSpPr>
+        </p:nvCxnSpPr>
         <p:spPr>
           <a:xfrm>
-            <a:off x="8263462" y="1328737"/>
-            <a:ext cx="1210962" cy="2243137"/>
+            <a:off x="7216352" y="2520780"/>
+            <a:ext cx="1124464" cy="0"/>
           </a:xfrm>
-          <a:prstGeom prst="rect">
+          <a:prstGeom prst="straightConnector1">
             <a:avLst/>
           </a:prstGeom>
+          <a:ln>
+            <a:tailEnd type="triangle"/>
+          </a:ln>
         </p:spPr>
         <p:style>
-          <a:lnRef idx="2">
-            <a:schemeClr val="accent1">
-              <a:shade val="50000"/>
-            </a:schemeClr>
+          <a:lnRef idx="1">
+            <a:schemeClr val="accent1"/>
           </a:lnRef>
-          <a:fillRef idx="1">
+          <a:fillRef idx="0">
             <a:schemeClr val="accent1"/>
           </a:fillRef>
           <a:effectRef idx="0">
             <a:schemeClr val="accent1"/>
           </a:effectRef>
           <a:fontRef idx="minor">
-            <a:schemeClr val="lt1"/>
-          </a:fontRef>
-        </p:style>
-        <p:txBody>
-          <a:bodyPr rtlCol="0" anchor="ctr"/>
-          <a:lstStyle/>
-          <a:p>
-            <a:pPr algn="ctr"/>
-            <a:r>
-              <a:rPr lang="en-US" dirty="0"/>
-              <a:t>VIXM&gt;0</a:t>
-            </a:r>
-          </a:p>
-        </p:txBody>
-      </p:sp>
-      <p:sp>
-        <p:nvSpPr>
-          <p:cNvPr id="7" name="Left Brace 6">
-            <a:extLst>
-              <a:ext uri="{FF2B5EF4-FFF2-40B4-BE49-F238E27FC236}">
-                <a16:creationId xmlns:a16="http://schemas.microsoft.com/office/drawing/2014/main" id="{3CBE76A8-585F-3B4C-ADBC-BA981EF51621}"/>
-              </a:ext>
-            </a:extLst>
-          </p:cNvPr>
-          <p:cNvSpPr/>
-          <p:nvPr/>
-        </p:nvSpPr>
-        <p:spPr>
-          <a:xfrm rot="16200000">
-            <a:off x="3379767" y="1349780"/>
-            <a:ext cx="638303" cy="5082489"/>
-          </a:xfrm>
-          <a:prstGeom prst="leftBrace">
-            <a:avLst/>
-          </a:prstGeom>
-          <a:ln w="38100"/>
-        </p:spPr>
-        <p:style>
-          <a:lnRef idx="1">
-            <a:schemeClr val="accent2"/>
-          </a:lnRef>
-          <a:fillRef idx="0">
-            <a:schemeClr val="accent2"/>
-          </a:fillRef>
-          <a:effectRef idx="0">
-            <a:schemeClr val="accent2"/>
-          </a:effectRef>
-          <a:fontRef idx="minor">
             <a:schemeClr val="tx1"/>
           </a:fontRef>
         </p:style>
-        <p:txBody>
-          <a:bodyPr rtlCol="0" anchor="ctr"/>
-          <a:lstStyle/>
-          <a:p>
-            <a:pPr algn="ctr"/>
-            <a:endParaRPr lang="en-US"/>
-          </a:p>
-        </p:txBody>
-      </p:sp>
-      <p:sp>
-        <p:nvSpPr>
-          <p:cNvPr id="8" name="TextBox 7">
-            <a:extLst>
-              <a:ext uri="{FF2B5EF4-FFF2-40B4-BE49-F238E27FC236}">
-                <a16:creationId xmlns:a16="http://schemas.microsoft.com/office/drawing/2014/main" id="{9D530900-C9A7-5849-A7F0-E3E294E6D24A}"/>
+      </p:cxnSp>
+      <p:sp>
+        <p:nvSpPr>
+          <p:cNvPr id="15" name="TextBox 14">
+            <a:extLst>
+              <a:ext uri="{FF2B5EF4-FFF2-40B4-BE49-F238E27FC236}">
+                <a16:creationId xmlns:a16="http://schemas.microsoft.com/office/drawing/2014/main" id="{D9B08230-DFF5-284C-BD8A-5602F4D7B711}"/>
               </a:ext>
             </a:extLst>
           </p:cNvPr>
@@ -6073,8 +10150,8 @@
         </p:nvSpPr>
         <p:spPr>
           <a:xfrm>
-            <a:off x="3534031" y="4349578"/>
-            <a:ext cx="988539" cy="584775"/>
+            <a:off x="8489095" y="2032001"/>
+            <a:ext cx="2323070" cy="1477328"/>
           </a:xfrm>
           <a:prstGeom prst="rect">
             <a:avLst/>
@@ -6088,18 +10165,27 @@
           <a:lstStyle/>
           <a:p>
             <a:r>
-              <a:rPr lang="en-US" sz="3200" b="1" dirty="0"/>
-              <a:t>X</a:t>
-            </a:r>
-          </a:p>
-        </p:txBody>
-      </p:sp>
-      <p:sp>
-        <p:nvSpPr>
-          <p:cNvPr id="9" name="TextBox 8">
-            <a:extLst>
-              <a:ext uri="{FF2B5EF4-FFF2-40B4-BE49-F238E27FC236}">
-                <a16:creationId xmlns:a16="http://schemas.microsoft.com/office/drawing/2014/main" id="{703C7E53-DD04-C043-A58E-A3482BDED68A}"/>
+              <a:rPr lang="en-US" dirty="0"/>
+              <a:t>Comparative line time series graph</a:t>
+            </a:r>
+          </a:p>
+          <a:p>
+            <a:endParaRPr lang="en-US" dirty="0"/>
+          </a:p>
+          <a:p>
+            <a:r>
+              <a:rPr lang="en-US" dirty="0"/>
+              <a:t>Histogram of good and bad predictions</a:t>
+            </a:r>
+          </a:p>
+        </p:txBody>
+      </p:sp>
+      <p:sp>
+        <p:nvSpPr>
+          <p:cNvPr id="26" name="TextBox 25">
+            <a:extLst>
+              <a:ext uri="{FF2B5EF4-FFF2-40B4-BE49-F238E27FC236}">
+                <a16:creationId xmlns:a16="http://schemas.microsoft.com/office/drawing/2014/main" id="{70C20D53-87CB-964B-A53D-25FFDE52D8E4}"/>
               </a:ext>
             </a:extLst>
           </p:cNvPr>
@@ -6108,8 +10194,8 @@
         </p:nvSpPr>
         <p:spPr>
           <a:xfrm>
-            <a:off x="5003649" y="128408"/>
-            <a:ext cx="4245125" cy="1200329"/>
+            <a:off x="315106" y="2151790"/>
+            <a:ext cx="2323070" cy="923330"/>
           </a:xfrm>
           <a:prstGeom prst="rect">
             <a:avLst/>
@@ -6123,225 +10209,20 @@
           <a:lstStyle/>
           <a:p>
             <a:r>
-              <a:rPr lang="en-US" b="1" dirty="0">
-                <a:solidFill>
-                  <a:schemeClr val="accent2">
-                    <a:lumMod val="75000"/>
-                  </a:schemeClr>
-                </a:solidFill>
-              </a:rPr>
-              <a:t>2. Create Function to predict VIX. Arguments are tickers and </a:t>
-            </a:r>
-            <a:r>
-              <a:rPr lang="en-US" b="1" dirty="0" err="1">
-                <a:solidFill>
-                  <a:schemeClr val="accent2">
-                    <a:lumMod val="75000"/>
-                  </a:schemeClr>
-                </a:solidFill>
-              </a:rPr>
-              <a:t>adaboost</a:t>
-            </a:r>
-            <a:r>
-              <a:rPr lang="en-US" b="1" dirty="0">
-                <a:solidFill>
-                  <a:schemeClr val="accent2">
-                    <a:lumMod val="75000"/>
-                  </a:schemeClr>
-                </a:solidFill>
-              </a:rPr>
-              <a:t> parameters. Good to apply modular concept for functions</a:t>
-            </a:r>
-          </a:p>
-        </p:txBody>
-      </p:sp>
-      <p:sp>
-        <p:nvSpPr>
-          <p:cNvPr id="10" name="TextBox 9">
-            <a:extLst>
-              <a:ext uri="{FF2B5EF4-FFF2-40B4-BE49-F238E27FC236}">
-                <a16:creationId xmlns:a16="http://schemas.microsoft.com/office/drawing/2014/main" id="{43F38730-AEA5-5D42-8DA6-9572737982E2}"/>
-              </a:ext>
-            </a:extLst>
-          </p:cNvPr>
-          <p:cNvSpPr txBox="1"/>
-          <p:nvPr/>
-        </p:nvSpPr>
-        <p:spPr>
-          <a:xfrm>
-            <a:off x="8263462" y="4362393"/>
-            <a:ext cx="1210962" cy="584775"/>
-          </a:xfrm>
-          <a:prstGeom prst="rect">
-            <a:avLst/>
-          </a:prstGeom>
-          <a:noFill/>
-        </p:spPr>
-        <p:txBody>
-          <a:bodyPr wrap="square" rtlCol="0">
-            <a:spAutoFit/>
-          </a:bodyPr>
-          <a:lstStyle/>
-          <a:p>
-            <a:pPr algn="ctr"/>
-            <a:r>
-              <a:rPr lang="en-US" sz="3200" b="1" dirty="0"/>
+              <a:rPr lang="en-US" dirty="0"/>
+              <a:t>Predictions</a:t>
+            </a:r>
+          </a:p>
+          <a:p>
+            <a:r>
+              <a:rPr lang="en-US" dirty="0"/>
               <a:t>Y</a:t>
             </a:r>
           </a:p>
-        </p:txBody>
-      </p:sp>
-      <p:sp>
-        <p:nvSpPr>
-          <p:cNvPr id="11" name="TextBox 10">
-            <a:extLst>
-              <a:ext uri="{FF2B5EF4-FFF2-40B4-BE49-F238E27FC236}">
-                <a16:creationId xmlns:a16="http://schemas.microsoft.com/office/drawing/2014/main" id="{FABD6CAC-70E2-1D4A-B2F4-C4DD4D9FE3C1}"/>
-              </a:ext>
-            </a:extLst>
-          </p:cNvPr>
-          <p:cNvSpPr txBox="1"/>
-          <p:nvPr/>
-        </p:nvSpPr>
-        <p:spPr>
-          <a:xfrm>
-            <a:off x="944454" y="5073755"/>
-            <a:ext cx="10442683" cy="1200329"/>
-          </a:xfrm>
-          <a:prstGeom prst="rect">
-            <a:avLst/>
-          </a:prstGeom>
-          <a:noFill/>
-        </p:spPr>
-        <p:txBody>
-          <a:bodyPr wrap="square" rtlCol="0">
-            <a:spAutoFit/>
-          </a:bodyPr>
-          <a:lstStyle/>
-          <a:p>
-            <a:r>
-              <a:rPr lang="en-US" b="1" dirty="0"/>
-              <a:t>3. Study on seasonality of VIXM in prophet (PAOLA - DONE)</a:t>
-            </a:r>
-          </a:p>
-          <a:p>
-            <a:r>
-              <a:rPr lang="en-US" b="1" dirty="0"/>
-              <a:t>4. Create VIXM </a:t>
-            </a:r>
-            <a:r>
-              <a:rPr lang="en-US" b="1" dirty="0" err="1"/>
-              <a:t>jupyter</a:t>
-            </a:r>
-            <a:r>
-              <a:rPr lang="en-US" b="1" dirty="0"/>
-              <a:t> lab code to run VIXM prediction (PAOLA)</a:t>
-            </a:r>
-          </a:p>
-          <a:p>
-            <a:r>
-              <a:rPr lang="en-US" b="1" dirty="0"/>
-              <a:t>5. Tunning VIXM model to get maximum accuracy &amp; profitability (as of now we have only care about accuracy metrics) (make as a function)</a:t>
-            </a:r>
-          </a:p>
-        </p:txBody>
-      </p:sp>
-      <p:sp>
-        <p:nvSpPr>
-          <p:cNvPr id="12" name="TextBox 11">
-            <a:extLst>
-              <a:ext uri="{FF2B5EF4-FFF2-40B4-BE49-F238E27FC236}">
-                <a16:creationId xmlns:a16="http://schemas.microsoft.com/office/drawing/2014/main" id="{0CAE652C-6765-FB44-9133-4FABE5B8B8FB}"/>
-              </a:ext>
-            </a:extLst>
-          </p:cNvPr>
-          <p:cNvSpPr txBox="1"/>
-          <p:nvPr/>
-        </p:nvSpPr>
-        <p:spPr>
-          <a:xfrm>
-            <a:off x="626912" y="128408"/>
-            <a:ext cx="4245125" cy="1200329"/>
-          </a:xfrm>
-          <a:prstGeom prst="rect">
-            <a:avLst/>
-          </a:prstGeom>
-          <a:noFill/>
-        </p:spPr>
-        <p:txBody>
-          <a:bodyPr wrap="square" rtlCol="0">
-            <a:spAutoFit/>
-          </a:bodyPr>
-          <a:lstStyle/>
-          <a:p>
-            <a:r>
-              <a:rPr lang="en-US" b="1" dirty="0"/>
-              <a:t>0. filter model for important variables – DONE</a:t>
-            </a:r>
-          </a:p>
-          <a:p>
-            <a:r>
-              <a:rPr lang="en-US" b="1" dirty="0"/>
-              <a:t>1. Learn to include tuning model per depth of decision trees. DONE</a:t>
-            </a:r>
-          </a:p>
-        </p:txBody>
-      </p:sp>
-      <p:sp>
-        <p:nvSpPr>
-          <p:cNvPr id="13" name="Rectangle 12">
-            <a:extLst>
-              <a:ext uri="{FF2B5EF4-FFF2-40B4-BE49-F238E27FC236}">
-                <a16:creationId xmlns:a16="http://schemas.microsoft.com/office/drawing/2014/main" id="{434A01DD-04A7-1749-B0BD-811D9529E946}"/>
-              </a:ext>
-            </a:extLst>
-          </p:cNvPr>
-          <p:cNvSpPr/>
-          <p:nvPr/>
-        </p:nvSpPr>
-        <p:spPr>
-          <a:xfrm>
-            <a:off x="3818239" y="1324609"/>
-            <a:ext cx="1210962" cy="2243137"/>
-          </a:xfrm>
-          <a:prstGeom prst="rect">
-            <a:avLst/>
-          </a:prstGeom>
-          <a:solidFill>
-            <a:schemeClr val="accent2"/>
-          </a:solidFill>
-        </p:spPr>
-        <p:style>
-          <a:lnRef idx="2">
-            <a:schemeClr val="accent1">
-              <a:shade val="50000"/>
-            </a:schemeClr>
-          </a:lnRef>
-          <a:fillRef idx="1">
-            <a:schemeClr val="accent1"/>
-          </a:fillRef>
-          <a:effectRef idx="0">
-            <a:schemeClr val="accent1"/>
-          </a:effectRef>
-          <a:fontRef idx="minor">
-            <a:schemeClr val="lt1"/>
-          </a:fontRef>
-        </p:style>
-        <p:txBody>
-          <a:bodyPr rtlCol="0" anchor="ctr"/>
-          <a:lstStyle/>
-          <a:p>
-            <a:pPr algn="ctr"/>
+          <a:p>
             <a:r>
               <a:rPr lang="en-US" dirty="0"/>
-              <a:t>VIX close, volatility, volume</a:t>
-            </a:r>
-          </a:p>
-          <a:p>
-            <a:pPr algn="ctr"/>
-            <a:r>
-              <a:rPr lang="en-US" dirty="0"/>
-              <a:t>(DONE)</a:t>
+              <a:t>Benchmark ticker</a:t>
             </a:r>
           </a:p>
         </p:txBody>
@@ -6349,7 +10230,7 @@
     </p:spTree>
     <p:extLst>
       <p:ext uri="{BB962C8B-B14F-4D97-AF65-F5344CB8AC3E}">
-        <p14:creationId xmlns:p14="http://schemas.microsoft.com/office/powerpoint/2010/main" val="396654740"/>
+        <p14:creationId xmlns:p14="http://schemas.microsoft.com/office/powerpoint/2010/main" val="432568711"/>
       </p:ext>
     </p:extLst>
   </p:cSld>

</xml_diff>